<commit_message>
adding direct and cp style
</commit_message>
<xml_diff>
--- a/docs/diy-continuations.pptx
+++ b/docs/diy-continuations.pptx
@@ -5,10 +5,10 @@
     <p:sldMasterId id="2147483648" r:id="rId1"/>
   </p:sldMasterIdLst>
   <p:notesMasterIdLst>
-    <p:notesMasterId r:id="rId15"/>
+    <p:notesMasterId r:id="rId16"/>
   </p:notesMasterIdLst>
   <p:handoutMasterIdLst>
-    <p:handoutMasterId r:id="rId16"/>
+    <p:handoutMasterId r:id="rId17"/>
   </p:handoutMasterIdLst>
   <p:sldIdLst>
     <p:sldId id="259" r:id="rId2"/>
@@ -20,10 +20,11 @@
     <p:sldId id="349" r:id="rId8"/>
     <p:sldId id="350" r:id="rId9"/>
     <p:sldId id="351" r:id="rId10"/>
-    <p:sldId id="343" r:id="rId11"/>
-    <p:sldId id="339" r:id="rId12"/>
-    <p:sldId id="280" r:id="rId13"/>
-    <p:sldId id="341" r:id="rId14"/>
+    <p:sldId id="353" r:id="rId11"/>
+    <p:sldId id="343" r:id="rId12"/>
+    <p:sldId id="339" r:id="rId13"/>
+    <p:sldId id="280" r:id="rId14"/>
+    <p:sldId id="341" r:id="rId15"/>
   </p:sldIdLst>
   <p:sldSz cx="11704638" cy="6583363"/>
   <p:notesSz cx="6797675" cy="9928225"/>
@@ -1557,794 +1558,7 @@
 </p:notes>
 </file>
 
-<file path=ppt/notesSlides/notesSlide2.xml><?xml version="1.0" encoding="utf-8"?>
-<p:notes xmlns:a="http://schemas.openxmlformats.org/drawingml/2006/main" xmlns:r="http://schemas.openxmlformats.org/officeDocument/2006/relationships" xmlns:p="http://schemas.openxmlformats.org/presentationml/2006/main">
-  <p:cSld>
-    <p:spTree>
-      <p:nvGrpSpPr>
-        <p:cNvPr id="1" name=""/>
-        <p:cNvGrpSpPr/>
-        <p:nvPr/>
-      </p:nvGrpSpPr>
-      <p:grpSpPr>
-        <a:xfrm>
-          <a:off x="0" y="0"/>
-          <a:ext cx="0" cy="0"/>
-          <a:chOff x="0" y="0"/>
-          <a:chExt cx="0" cy="0"/>
-        </a:xfrm>
-      </p:grpSpPr>
-      <p:sp>
-        <p:nvSpPr>
-          <p:cNvPr id="2" name="Slide Image Placeholder 1"/>
-          <p:cNvSpPr>
-            <a:spLocks noGrp="1" noRot="1" noChangeAspect="1"/>
-          </p:cNvSpPr>
-          <p:nvPr>
-            <p:ph type="sldImg"/>
-          </p:nvPr>
-        </p:nvSpPr>
-        <p:spPr>
-          <a:xfrm>
-            <a:off x="90488" y="744538"/>
-            <a:ext cx="6616700" cy="3722687"/>
-          </a:xfrm>
-        </p:spPr>
-      </p:sp>
-      <p:sp>
-        <p:nvSpPr>
-          <p:cNvPr id="3" name="Notes Placeholder 2"/>
-          <p:cNvSpPr>
-            <a:spLocks noGrp="1"/>
-          </p:cNvSpPr>
-          <p:nvPr>
-            <p:ph type="body" idx="1"/>
-          </p:nvPr>
-        </p:nvSpPr>
-        <p:spPr/>
-        <p:txBody>
-          <a:bodyPr/>
-          <a:lstStyle/>
-          <a:p>
-            <a:r>
-              <a:rPr lang="en-US" dirty="0" smtClean="0"/>
-              <a:t>How</a:t>
-            </a:r>
-            <a:r>
-              <a:rPr lang="en-US" baseline="0" dirty="0" smtClean="0"/>
-              <a:t> do you </a:t>
-            </a:r>
-            <a:r>
-              <a:rPr lang="en-US" baseline="0" dirty="0" err="1" smtClean="0"/>
-              <a:t>evaluete</a:t>
-            </a:r>
-            <a:r>
-              <a:rPr lang="en-US" baseline="0" dirty="0" smtClean="0"/>
-              <a:t> this expression?</a:t>
-            </a:r>
-            <a:endParaRPr lang="en-US" dirty="0" smtClean="0"/>
-          </a:p>
-          <a:p>
-            <a:endParaRPr lang="en-US" dirty="0"/>
-          </a:p>
-        </p:txBody>
-      </p:sp>
-      <p:sp>
-        <p:nvSpPr>
-          <p:cNvPr id="4" name="Slide Number Placeholder 3"/>
-          <p:cNvSpPr>
-            <a:spLocks noGrp="1"/>
-          </p:cNvSpPr>
-          <p:nvPr>
-            <p:ph type="sldNum" sz="quarter" idx="10"/>
-          </p:nvPr>
-        </p:nvSpPr>
-        <p:spPr/>
-        <p:txBody>
-          <a:bodyPr/>
-          <a:lstStyle/>
-          <a:p>
-            <a:fld id="{FC59884A-FAD0-DE4F-8C4F-A27A5B8B9F19}" type="slidenum">
-              <a:rPr lang="en-US" smtClean="0"/>
-              <a:t>4</a:t>
-            </a:fld>
-            <a:endParaRPr lang="en-US"/>
-          </a:p>
-        </p:txBody>
-      </p:sp>
-    </p:spTree>
-    <p:extLst>
-      <p:ext uri="{BB962C8B-B14F-4D97-AF65-F5344CB8AC3E}">
-        <p14:creationId xmlns:p14="http://schemas.microsoft.com/office/powerpoint/2010/main" val="1849615942"/>
-      </p:ext>
-    </p:extLst>
-  </p:cSld>
-  <p:clrMapOvr>
-    <a:masterClrMapping/>
-  </p:clrMapOvr>
-</p:notes>
-</file>
-
-<file path=ppt/notesSlides/notesSlide3.xml><?xml version="1.0" encoding="utf-8"?>
-<p:notes xmlns:a="http://schemas.openxmlformats.org/drawingml/2006/main" xmlns:r="http://schemas.openxmlformats.org/officeDocument/2006/relationships" xmlns:p="http://schemas.openxmlformats.org/presentationml/2006/main">
-  <p:cSld>
-    <p:spTree>
-      <p:nvGrpSpPr>
-        <p:cNvPr id="1" name=""/>
-        <p:cNvGrpSpPr/>
-        <p:nvPr/>
-      </p:nvGrpSpPr>
-      <p:grpSpPr>
-        <a:xfrm>
-          <a:off x="0" y="0"/>
-          <a:ext cx="0" cy="0"/>
-          <a:chOff x="0" y="0"/>
-          <a:chExt cx="0" cy="0"/>
-        </a:xfrm>
-      </p:grpSpPr>
-      <p:sp>
-        <p:nvSpPr>
-          <p:cNvPr id="2" name="Slide Image Placeholder 1"/>
-          <p:cNvSpPr>
-            <a:spLocks noGrp="1" noRot="1" noChangeAspect="1"/>
-          </p:cNvSpPr>
-          <p:nvPr>
-            <p:ph type="sldImg"/>
-          </p:nvPr>
-        </p:nvSpPr>
-        <p:spPr>
-          <a:xfrm>
-            <a:off x="90488" y="744538"/>
-            <a:ext cx="6616700" cy="3722687"/>
-          </a:xfrm>
-        </p:spPr>
-      </p:sp>
-      <p:sp>
-        <p:nvSpPr>
-          <p:cNvPr id="3" name="Notes Placeholder 2"/>
-          <p:cNvSpPr>
-            <a:spLocks noGrp="1"/>
-          </p:cNvSpPr>
-          <p:nvPr>
-            <p:ph type="body" idx="1"/>
-          </p:nvPr>
-        </p:nvSpPr>
-        <p:spPr/>
-        <p:txBody>
-          <a:bodyPr/>
-          <a:lstStyle/>
-          <a:p>
-            <a:r>
-              <a:rPr lang="en-US" dirty="0" smtClean="0"/>
-              <a:t>The</a:t>
-            </a:r>
-            <a:r>
-              <a:rPr lang="en-US" baseline="0" dirty="0" smtClean="0"/>
-              <a:t> green area is the continuation for 4</a:t>
-            </a:r>
-            <a:endParaRPr lang="en-US" dirty="0" smtClean="0"/>
-          </a:p>
-          <a:p>
-            <a:endParaRPr lang="en-US" dirty="0"/>
-          </a:p>
-        </p:txBody>
-      </p:sp>
-      <p:sp>
-        <p:nvSpPr>
-          <p:cNvPr id="4" name="Slide Number Placeholder 3"/>
-          <p:cNvSpPr>
-            <a:spLocks noGrp="1"/>
-          </p:cNvSpPr>
-          <p:nvPr>
-            <p:ph type="sldNum" sz="quarter" idx="10"/>
-          </p:nvPr>
-        </p:nvSpPr>
-        <p:spPr/>
-        <p:txBody>
-          <a:bodyPr/>
-          <a:lstStyle/>
-          <a:p>
-            <a:fld id="{FC59884A-FAD0-DE4F-8C4F-A27A5B8B9F19}" type="slidenum">
-              <a:rPr lang="en-US" smtClean="0"/>
-              <a:t>5</a:t>
-            </a:fld>
-            <a:endParaRPr lang="en-US"/>
-          </a:p>
-        </p:txBody>
-      </p:sp>
-    </p:spTree>
-    <p:extLst>
-      <p:ext uri="{BB962C8B-B14F-4D97-AF65-F5344CB8AC3E}">
-        <p14:creationId xmlns:p14="http://schemas.microsoft.com/office/powerpoint/2010/main" val="744069184"/>
-      </p:ext>
-    </p:extLst>
-  </p:cSld>
-  <p:clrMapOvr>
-    <a:masterClrMapping/>
-  </p:clrMapOvr>
-</p:notes>
-</file>
-
-<file path=ppt/notesSlides/notesSlide4.xml><?xml version="1.0" encoding="utf-8"?>
-<p:notes xmlns:a="http://schemas.openxmlformats.org/drawingml/2006/main" xmlns:r="http://schemas.openxmlformats.org/officeDocument/2006/relationships" xmlns:p="http://schemas.openxmlformats.org/presentationml/2006/main">
-  <p:cSld>
-    <p:spTree>
-      <p:nvGrpSpPr>
-        <p:cNvPr id="1" name=""/>
-        <p:cNvGrpSpPr/>
-        <p:nvPr/>
-      </p:nvGrpSpPr>
-      <p:grpSpPr>
-        <a:xfrm>
-          <a:off x="0" y="0"/>
-          <a:ext cx="0" cy="0"/>
-          <a:chOff x="0" y="0"/>
-          <a:chExt cx="0" cy="0"/>
-        </a:xfrm>
-      </p:grpSpPr>
-      <p:sp>
-        <p:nvSpPr>
-          <p:cNvPr id="2" name="Slide Image Placeholder 1"/>
-          <p:cNvSpPr>
-            <a:spLocks noGrp="1" noRot="1" noChangeAspect="1"/>
-          </p:cNvSpPr>
-          <p:nvPr>
-            <p:ph type="sldImg"/>
-          </p:nvPr>
-        </p:nvSpPr>
-        <p:spPr>
-          <a:xfrm>
-            <a:off x="90488" y="744538"/>
-            <a:ext cx="6616700" cy="3722687"/>
-          </a:xfrm>
-        </p:spPr>
-      </p:sp>
-      <p:sp>
-        <p:nvSpPr>
-          <p:cNvPr id="3" name="Notes Placeholder 2"/>
-          <p:cNvSpPr>
-            <a:spLocks noGrp="1"/>
-          </p:cNvSpPr>
-          <p:nvPr>
-            <p:ph type="body" idx="1"/>
-          </p:nvPr>
-        </p:nvSpPr>
-        <p:spPr/>
-        <p:txBody>
-          <a:bodyPr/>
-          <a:lstStyle/>
-          <a:p>
-            <a:pPr marL="0" marR="0" indent="0" algn="l" defTabSz="914400" rtl="0" eaLnBrk="1" fontAlgn="auto" latinLnBrk="0" hangingPunct="1">
-              <a:lnSpc>
-                <a:spcPct val="100000"/>
-              </a:lnSpc>
-              <a:spcBef>
-                <a:spcPts val="0"/>
-              </a:spcBef>
-              <a:spcAft>
-                <a:spcPts val="0"/>
-              </a:spcAft>
-              <a:buClrTx/>
-              <a:buSzTx/>
-              <a:buFontTx/>
-              <a:buNone/>
-              <a:tabLst/>
-              <a:defRPr/>
-            </a:pPr>
-            <a:r>
-              <a:rPr lang="en-US" dirty="0" smtClean="0"/>
-              <a:t>Green area is the continuation</a:t>
-            </a:r>
-            <a:endParaRPr lang="en-US" dirty="0" smtClean="0"/>
-          </a:p>
-          <a:p>
-            <a:endParaRPr lang="en-US" dirty="0" smtClean="0"/>
-          </a:p>
-          <a:p>
-            <a:endParaRPr lang="en-US" dirty="0"/>
-          </a:p>
-        </p:txBody>
-      </p:sp>
-      <p:sp>
-        <p:nvSpPr>
-          <p:cNvPr id="4" name="Slide Number Placeholder 3"/>
-          <p:cNvSpPr>
-            <a:spLocks noGrp="1"/>
-          </p:cNvSpPr>
-          <p:nvPr>
-            <p:ph type="sldNum" sz="quarter" idx="10"/>
-          </p:nvPr>
-        </p:nvSpPr>
-        <p:spPr/>
-        <p:txBody>
-          <a:bodyPr/>
-          <a:lstStyle/>
-          <a:p>
-            <a:fld id="{FC59884A-FAD0-DE4F-8C4F-A27A5B8B9F19}" type="slidenum">
-              <a:rPr lang="en-US" smtClean="0"/>
-              <a:t>6</a:t>
-            </a:fld>
-            <a:endParaRPr lang="en-US"/>
-          </a:p>
-        </p:txBody>
-      </p:sp>
-    </p:spTree>
-    <p:extLst>
-      <p:ext uri="{BB962C8B-B14F-4D97-AF65-F5344CB8AC3E}">
-        <p14:creationId xmlns:p14="http://schemas.microsoft.com/office/powerpoint/2010/main" val="192018670"/>
-      </p:ext>
-    </p:extLst>
-  </p:cSld>
-  <p:clrMapOvr>
-    <a:masterClrMapping/>
-  </p:clrMapOvr>
-</p:notes>
-</file>
-
-<file path=ppt/notesSlides/notesSlide5.xml><?xml version="1.0" encoding="utf-8"?>
-<p:notes xmlns:a="http://schemas.openxmlformats.org/drawingml/2006/main" xmlns:r="http://schemas.openxmlformats.org/officeDocument/2006/relationships" xmlns:p="http://schemas.openxmlformats.org/presentationml/2006/main">
-  <p:cSld>
-    <p:spTree>
-      <p:nvGrpSpPr>
-        <p:cNvPr id="1" name=""/>
-        <p:cNvGrpSpPr/>
-        <p:nvPr/>
-      </p:nvGrpSpPr>
-      <p:grpSpPr>
-        <a:xfrm>
-          <a:off x="0" y="0"/>
-          <a:ext cx="0" cy="0"/>
-          <a:chOff x="0" y="0"/>
-          <a:chExt cx="0" cy="0"/>
-        </a:xfrm>
-      </p:grpSpPr>
-      <p:sp>
-        <p:nvSpPr>
-          <p:cNvPr id="2" name="Slide Image Placeholder 1"/>
-          <p:cNvSpPr>
-            <a:spLocks noGrp="1" noRot="1" noChangeAspect="1"/>
-          </p:cNvSpPr>
-          <p:nvPr>
-            <p:ph type="sldImg"/>
-          </p:nvPr>
-        </p:nvSpPr>
-        <p:spPr>
-          <a:xfrm>
-            <a:off x="90488" y="744538"/>
-            <a:ext cx="6616700" cy="3722687"/>
-          </a:xfrm>
-        </p:spPr>
-      </p:sp>
-      <p:sp>
-        <p:nvSpPr>
-          <p:cNvPr id="3" name="Notes Placeholder 2"/>
-          <p:cNvSpPr>
-            <a:spLocks noGrp="1"/>
-          </p:cNvSpPr>
-          <p:nvPr>
-            <p:ph type="body" idx="1"/>
-          </p:nvPr>
-        </p:nvSpPr>
-        <p:spPr/>
-        <p:txBody>
-          <a:bodyPr/>
-          <a:lstStyle/>
-          <a:p>
-            <a:pPr marL="0" marR="0" indent="0" algn="l" defTabSz="914400" rtl="0" eaLnBrk="1" fontAlgn="auto" latinLnBrk="0" hangingPunct="1">
-              <a:lnSpc>
-                <a:spcPct val="100000"/>
-              </a:lnSpc>
-              <a:spcBef>
-                <a:spcPts val="0"/>
-              </a:spcBef>
-              <a:spcAft>
-                <a:spcPts val="0"/>
-              </a:spcAft>
-              <a:buClrTx/>
-              <a:buSzTx/>
-              <a:buFontTx/>
-              <a:buNone/>
-              <a:tabLst/>
-              <a:defRPr/>
-            </a:pPr>
-            <a:r>
-              <a:rPr lang="en-US" dirty="0" smtClean="0"/>
-              <a:t>Green area is the continuation</a:t>
-            </a:r>
-            <a:endParaRPr lang="en-US" dirty="0" smtClean="0"/>
-          </a:p>
-          <a:p>
-            <a:endParaRPr lang="en-US" dirty="0" smtClean="0"/>
-          </a:p>
-          <a:p>
-            <a:endParaRPr lang="en-US" dirty="0"/>
-          </a:p>
-        </p:txBody>
-      </p:sp>
-      <p:sp>
-        <p:nvSpPr>
-          <p:cNvPr id="4" name="Slide Number Placeholder 3"/>
-          <p:cNvSpPr>
-            <a:spLocks noGrp="1"/>
-          </p:cNvSpPr>
-          <p:nvPr>
-            <p:ph type="sldNum" sz="quarter" idx="10"/>
-          </p:nvPr>
-        </p:nvSpPr>
-        <p:spPr/>
-        <p:txBody>
-          <a:bodyPr/>
-          <a:lstStyle/>
-          <a:p>
-            <a:fld id="{FC59884A-FAD0-DE4F-8C4F-A27A5B8B9F19}" type="slidenum">
-              <a:rPr lang="en-US" smtClean="0"/>
-              <a:t>7</a:t>
-            </a:fld>
-            <a:endParaRPr lang="en-US"/>
-          </a:p>
-        </p:txBody>
-      </p:sp>
-    </p:spTree>
-    <p:extLst>
-      <p:ext uri="{BB962C8B-B14F-4D97-AF65-F5344CB8AC3E}">
-        <p14:creationId xmlns:p14="http://schemas.microsoft.com/office/powerpoint/2010/main" val="571324907"/>
-      </p:ext>
-    </p:extLst>
-  </p:cSld>
-  <p:clrMapOvr>
-    <a:masterClrMapping/>
-  </p:clrMapOvr>
-</p:notes>
-</file>
-
-<file path=ppt/notesSlides/notesSlide6.xml><?xml version="1.0" encoding="utf-8"?>
-<p:notes xmlns:a="http://schemas.openxmlformats.org/drawingml/2006/main" xmlns:r="http://schemas.openxmlformats.org/officeDocument/2006/relationships" xmlns:p="http://schemas.openxmlformats.org/presentationml/2006/main">
-  <p:cSld>
-    <p:spTree>
-      <p:nvGrpSpPr>
-        <p:cNvPr id="1" name=""/>
-        <p:cNvGrpSpPr/>
-        <p:nvPr/>
-      </p:nvGrpSpPr>
-      <p:grpSpPr>
-        <a:xfrm>
-          <a:off x="0" y="0"/>
-          <a:ext cx="0" cy="0"/>
-          <a:chOff x="0" y="0"/>
-          <a:chExt cx="0" cy="0"/>
-        </a:xfrm>
-      </p:grpSpPr>
-      <p:sp>
-        <p:nvSpPr>
-          <p:cNvPr id="2" name="Slide Image Placeholder 1"/>
-          <p:cNvSpPr>
-            <a:spLocks noGrp="1" noRot="1" noChangeAspect="1"/>
-          </p:cNvSpPr>
-          <p:nvPr>
-            <p:ph type="sldImg"/>
-          </p:nvPr>
-        </p:nvSpPr>
-        <p:spPr>
-          <a:xfrm>
-            <a:off x="90488" y="744538"/>
-            <a:ext cx="6616700" cy="3722687"/>
-          </a:xfrm>
-        </p:spPr>
-      </p:sp>
-      <p:sp>
-        <p:nvSpPr>
-          <p:cNvPr id="3" name="Notes Placeholder 2"/>
-          <p:cNvSpPr>
-            <a:spLocks noGrp="1"/>
-          </p:cNvSpPr>
-          <p:nvPr>
-            <p:ph type="body" idx="1"/>
-          </p:nvPr>
-        </p:nvSpPr>
-        <p:spPr/>
-        <p:txBody>
-          <a:bodyPr/>
-          <a:lstStyle/>
-          <a:p>
-            <a:pPr marL="0" marR="0" indent="0" algn="l" defTabSz="914400" rtl="0" eaLnBrk="1" fontAlgn="auto" latinLnBrk="0" hangingPunct="1">
-              <a:lnSpc>
-                <a:spcPct val="100000"/>
-              </a:lnSpc>
-              <a:spcBef>
-                <a:spcPts val="0"/>
-              </a:spcBef>
-              <a:spcAft>
-                <a:spcPts val="0"/>
-              </a:spcAft>
-              <a:buClrTx/>
-              <a:buSzTx/>
-              <a:buFontTx/>
-              <a:buNone/>
-              <a:tabLst/>
-              <a:defRPr/>
-            </a:pPr>
-            <a:r>
-              <a:rPr lang="en-US" dirty="0" smtClean="0"/>
-              <a:t>Green area is the continuation</a:t>
-            </a:r>
-            <a:endParaRPr lang="en-US" dirty="0" smtClean="0"/>
-          </a:p>
-          <a:p>
-            <a:endParaRPr lang="en-US" dirty="0" smtClean="0"/>
-          </a:p>
-          <a:p>
-            <a:endParaRPr lang="en-US" dirty="0"/>
-          </a:p>
-        </p:txBody>
-      </p:sp>
-      <p:sp>
-        <p:nvSpPr>
-          <p:cNvPr id="4" name="Slide Number Placeholder 3"/>
-          <p:cNvSpPr>
-            <a:spLocks noGrp="1"/>
-          </p:cNvSpPr>
-          <p:nvPr>
-            <p:ph type="sldNum" sz="quarter" idx="10"/>
-          </p:nvPr>
-        </p:nvSpPr>
-        <p:spPr/>
-        <p:txBody>
-          <a:bodyPr/>
-          <a:lstStyle/>
-          <a:p>
-            <a:fld id="{FC59884A-FAD0-DE4F-8C4F-A27A5B8B9F19}" type="slidenum">
-              <a:rPr lang="en-US" smtClean="0"/>
-              <a:t>8</a:t>
-            </a:fld>
-            <a:endParaRPr lang="en-US"/>
-          </a:p>
-        </p:txBody>
-      </p:sp>
-    </p:spTree>
-    <p:extLst>
-      <p:ext uri="{BB962C8B-B14F-4D97-AF65-F5344CB8AC3E}">
-        <p14:creationId xmlns:p14="http://schemas.microsoft.com/office/powerpoint/2010/main" val="581778521"/>
-      </p:ext>
-    </p:extLst>
-  </p:cSld>
-  <p:clrMapOvr>
-    <a:masterClrMapping/>
-  </p:clrMapOvr>
-</p:notes>
-</file>
-
-<file path=ppt/notesSlides/notesSlide7.xml><?xml version="1.0" encoding="utf-8"?>
-<p:notes xmlns:a="http://schemas.openxmlformats.org/drawingml/2006/main" xmlns:r="http://schemas.openxmlformats.org/officeDocument/2006/relationships" xmlns:p="http://schemas.openxmlformats.org/presentationml/2006/main">
-  <p:cSld>
-    <p:spTree>
-      <p:nvGrpSpPr>
-        <p:cNvPr id="1" name=""/>
-        <p:cNvGrpSpPr/>
-        <p:nvPr/>
-      </p:nvGrpSpPr>
-      <p:grpSpPr>
-        <a:xfrm>
-          <a:off x="0" y="0"/>
-          <a:ext cx="0" cy="0"/>
-          <a:chOff x="0" y="0"/>
-          <a:chExt cx="0" cy="0"/>
-        </a:xfrm>
-      </p:grpSpPr>
-      <p:sp>
-        <p:nvSpPr>
-          <p:cNvPr id="2" name="Slide Image Placeholder 1"/>
-          <p:cNvSpPr>
-            <a:spLocks noGrp="1" noRot="1" noChangeAspect="1"/>
-          </p:cNvSpPr>
-          <p:nvPr>
-            <p:ph type="sldImg"/>
-          </p:nvPr>
-        </p:nvSpPr>
-        <p:spPr>
-          <a:xfrm>
-            <a:off x="90488" y="744538"/>
-            <a:ext cx="6616700" cy="3722687"/>
-          </a:xfrm>
-        </p:spPr>
-      </p:sp>
-      <p:sp>
-        <p:nvSpPr>
-          <p:cNvPr id="3" name="Notes Placeholder 2"/>
-          <p:cNvSpPr>
-            <a:spLocks noGrp="1"/>
-          </p:cNvSpPr>
-          <p:nvPr>
-            <p:ph type="body" idx="1"/>
-          </p:nvPr>
-        </p:nvSpPr>
-        <p:spPr/>
-        <p:txBody>
-          <a:bodyPr/>
-          <a:lstStyle/>
-          <a:p>
-            <a:pPr marL="0" marR="0" indent="0" algn="l" defTabSz="914400" rtl="0" eaLnBrk="1" fontAlgn="auto" latinLnBrk="0" hangingPunct="1">
-              <a:lnSpc>
-                <a:spcPct val="100000"/>
-              </a:lnSpc>
-              <a:spcBef>
-                <a:spcPts val="0"/>
-              </a:spcBef>
-              <a:spcAft>
-                <a:spcPts val="0"/>
-              </a:spcAft>
-              <a:buClrTx/>
-              <a:buSzTx/>
-              <a:buFontTx/>
-              <a:buNone/>
-              <a:tabLst/>
-              <a:defRPr/>
-            </a:pPr>
-            <a:r>
-              <a:rPr lang="en-US" dirty="0" smtClean="0"/>
-              <a:t>Green area is the continuation</a:t>
-            </a:r>
-            <a:endParaRPr lang="en-US" dirty="0" smtClean="0"/>
-          </a:p>
-          <a:p>
-            <a:endParaRPr lang="en-US" dirty="0" smtClean="0"/>
-          </a:p>
-          <a:p>
-            <a:endParaRPr lang="en-US" dirty="0"/>
-          </a:p>
-        </p:txBody>
-      </p:sp>
-      <p:sp>
-        <p:nvSpPr>
-          <p:cNvPr id="4" name="Slide Number Placeholder 3"/>
-          <p:cNvSpPr>
-            <a:spLocks noGrp="1"/>
-          </p:cNvSpPr>
-          <p:nvPr>
-            <p:ph type="sldNum" sz="quarter" idx="10"/>
-          </p:nvPr>
-        </p:nvSpPr>
-        <p:spPr/>
-        <p:txBody>
-          <a:bodyPr/>
-          <a:lstStyle/>
-          <a:p>
-            <a:fld id="{FC59884A-FAD0-DE4F-8C4F-A27A5B8B9F19}" type="slidenum">
-              <a:rPr lang="en-US" smtClean="0"/>
-              <a:t>9</a:t>
-            </a:fld>
-            <a:endParaRPr lang="en-US"/>
-          </a:p>
-        </p:txBody>
-      </p:sp>
-    </p:spTree>
-    <p:extLst>
-      <p:ext uri="{BB962C8B-B14F-4D97-AF65-F5344CB8AC3E}">
-        <p14:creationId xmlns:p14="http://schemas.microsoft.com/office/powerpoint/2010/main" val="1504588864"/>
-      </p:ext>
-    </p:extLst>
-  </p:cSld>
-  <p:clrMapOvr>
-    <a:masterClrMapping/>
-  </p:clrMapOvr>
-</p:notes>
-</file>
-
-<file path=ppt/notesSlides/notesSlide8.xml><?xml version="1.0" encoding="utf-8"?>
-<p:notes xmlns:a="http://schemas.openxmlformats.org/drawingml/2006/main" xmlns:r="http://schemas.openxmlformats.org/officeDocument/2006/relationships" xmlns:p="http://schemas.openxmlformats.org/presentationml/2006/main">
-  <p:cSld>
-    <p:spTree>
-      <p:nvGrpSpPr>
-        <p:cNvPr id="1" name=""/>
-        <p:cNvGrpSpPr/>
-        <p:nvPr/>
-      </p:nvGrpSpPr>
-      <p:grpSpPr>
-        <a:xfrm>
-          <a:off x="0" y="0"/>
-          <a:ext cx="0" cy="0"/>
-          <a:chOff x="0" y="0"/>
-          <a:chExt cx="0" cy="0"/>
-        </a:xfrm>
-      </p:grpSpPr>
-      <p:sp>
-        <p:nvSpPr>
-          <p:cNvPr id="2" name="Slide Image Placeholder 1"/>
-          <p:cNvSpPr>
-            <a:spLocks noGrp="1" noRot="1" noChangeAspect="1"/>
-          </p:cNvSpPr>
-          <p:nvPr>
-            <p:ph type="sldImg"/>
-          </p:nvPr>
-        </p:nvSpPr>
-        <p:spPr>
-          <a:xfrm>
-            <a:off x="90488" y="744538"/>
-            <a:ext cx="6616700" cy="3722687"/>
-          </a:xfrm>
-        </p:spPr>
-      </p:sp>
-      <p:sp>
-        <p:nvSpPr>
-          <p:cNvPr id="3" name="Notes Placeholder 2"/>
-          <p:cNvSpPr>
-            <a:spLocks noGrp="1"/>
-          </p:cNvSpPr>
-          <p:nvPr>
-            <p:ph type="body" idx="1"/>
-          </p:nvPr>
-        </p:nvSpPr>
-        <p:spPr/>
-        <p:txBody>
-          <a:bodyPr/>
-          <a:lstStyle/>
-          <a:p>
-            <a:pPr marL="0" marR="0" indent="0" algn="l" defTabSz="914400" rtl="0" eaLnBrk="1" fontAlgn="auto" latinLnBrk="0" hangingPunct="1">
-              <a:lnSpc>
-                <a:spcPct val="100000"/>
-              </a:lnSpc>
-              <a:spcBef>
-                <a:spcPts val="0"/>
-              </a:spcBef>
-              <a:spcAft>
-                <a:spcPts val="0"/>
-              </a:spcAft>
-              <a:buClrTx/>
-              <a:buSzTx/>
-              <a:buFontTx/>
-              <a:buNone/>
-              <a:tabLst/>
-              <a:defRPr/>
-            </a:pPr>
-            <a:r>
-              <a:rPr lang="en-US" dirty="0" smtClean="0"/>
-              <a:t>mention default clear in constructor injection example</a:t>
-            </a:r>
-          </a:p>
-          <a:p>
-            <a:endParaRPr lang="en-US" dirty="0" smtClean="0"/>
-          </a:p>
-          <a:p>
-            <a:endParaRPr lang="en-US" dirty="0"/>
-          </a:p>
-        </p:txBody>
-      </p:sp>
-      <p:sp>
-        <p:nvSpPr>
-          <p:cNvPr id="4" name="Slide Number Placeholder 3"/>
-          <p:cNvSpPr>
-            <a:spLocks noGrp="1"/>
-          </p:cNvSpPr>
-          <p:nvPr>
-            <p:ph type="sldNum" sz="quarter" idx="10"/>
-          </p:nvPr>
-        </p:nvSpPr>
-        <p:spPr/>
-        <p:txBody>
-          <a:bodyPr/>
-          <a:lstStyle/>
-          <a:p>
-            <a:fld id="{FC59884A-FAD0-DE4F-8C4F-A27A5B8B9F19}" type="slidenum">
-              <a:rPr lang="en-US" smtClean="0"/>
-              <a:t>10</a:t>
-            </a:fld>
-            <a:endParaRPr lang="en-US"/>
-          </a:p>
-        </p:txBody>
-      </p:sp>
-    </p:spTree>
-    <p:extLst>
-      <p:ext uri="{BB962C8B-B14F-4D97-AF65-F5344CB8AC3E}">
-        <p14:creationId xmlns:p14="http://schemas.microsoft.com/office/powerpoint/2010/main" val="825034843"/>
-      </p:ext>
-    </p:extLst>
-  </p:cSld>
-  <p:clrMapOvr>
-    <a:masterClrMapping/>
-  </p:clrMapOvr>
-</p:notes>
-</file>
-
-<file path=ppt/notesSlides/notesSlide9.xml><?xml version="1.0" encoding="utf-8"?>
+<file path=ppt/notesSlides/notesSlide10.xml><?xml version="1.0" encoding="utf-8"?>
 <p:notes xmlns:a="http://schemas.openxmlformats.org/drawingml/2006/main" xmlns:r="http://schemas.openxmlformats.org/officeDocument/2006/relationships" xmlns:p="http://schemas.openxmlformats.org/presentationml/2006/main">
   <p:cSld>
     <p:spTree>
@@ -2507,7 +1721,7 @@
                 <a:tabLst/>
                 <a:defRPr/>
               </a:pPr>
-              <a:t>11</a:t>
+              <a:t>12</a:t>
             </a:fld>
             <a:endParaRPr kumimoji="0" lang="en-US" sz="1200" b="0" i="0" u="none" strike="noStrike" kern="1200" cap="none" spc="0" normalizeH="0" baseline="0" noProof="0">
               <a:ln>
@@ -2527,6 +1741,948 @@
         </p:txBody>
       </p:sp>
     </p:spTree>
+  </p:cSld>
+  <p:clrMapOvr>
+    <a:masterClrMapping/>
+  </p:clrMapOvr>
+</p:notes>
+</file>
+
+<file path=ppt/notesSlides/notesSlide2.xml><?xml version="1.0" encoding="utf-8"?>
+<p:notes xmlns:a="http://schemas.openxmlformats.org/drawingml/2006/main" xmlns:r="http://schemas.openxmlformats.org/officeDocument/2006/relationships" xmlns:p="http://schemas.openxmlformats.org/presentationml/2006/main">
+  <p:cSld>
+    <p:spTree>
+      <p:nvGrpSpPr>
+        <p:cNvPr id="1" name=""/>
+        <p:cNvGrpSpPr/>
+        <p:nvPr/>
+      </p:nvGrpSpPr>
+      <p:grpSpPr>
+        <a:xfrm>
+          <a:off x="0" y="0"/>
+          <a:ext cx="0" cy="0"/>
+          <a:chOff x="0" y="0"/>
+          <a:chExt cx="0" cy="0"/>
+        </a:xfrm>
+      </p:grpSpPr>
+      <p:sp>
+        <p:nvSpPr>
+          <p:cNvPr id="2" name="Slide Image Placeholder 1"/>
+          <p:cNvSpPr>
+            <a:spLocks noGrp="1" noRot="1" noChangeAspect="1"/>
+          </p:cNvSpPr>
+          <p:nvPr>
+            <p:ph type="sldImg"/>
+          </p:nvPr>
+        </p:nvSpPr>
+        <p:spPr>
+          <a:xfrm>
+            <a:off x="90488" y="744538"/>
+            <a:ext cx="6616700" cy="3722687"/>
+          </a:xfrm>
+        </p:spPr>
+      </p:sp>
+      <p:sp>
+        <p:nvSpPr>
+          <p:cNvPr id="3" name="Notes Placeholder 2"/>
+          <p:cNvSpPr>
+            <a:spLocks noGrp="1"/>
+          </p:cNvSpPr>
+          <p:nvPr>
+            <p:ph type="body" idx="1"/>
+          </p:nvPr>
+        </p:nvSpPr>
+        <p:spPr/>
+        <p:txBody>
+          <a:bodyPr/>
+          <a:lstStyle/>
+          <a:p>
+            <a:r>
+              <a:rPr lang="en-US" dirty="0" smtClean="0"/>
+              <a:t>How</a:t>
+            </a:r>
+            <a:r>
+              <a:rPr lang="en-US" baseline="0" dirty="0" smtClean="0"/>
+              <a:t> do you </a:t>
+            </a:r>
+            <a:r>
+              <a:rPr lang="en-US" baseline="0" dirty="0" err="1" smtClean="0"/>
+              <a:t>evaluete</a:t>
+            </a:r>
+            <a:r>
+              <a:rPr lang="en-US" baseline="0" dirty="0" smtClean="0"/>
+              <a:t> this expression?</a:t>
+            </a:r>
+            <a:endParaRPr lang="en-US" dirty="0" smtClean="0"/>
+          </a:p>
+          <a:p>
+            <a:endParaRPr lang="en-US" dirty="0"/>
+          </a:p>
+        </p:txBody>
+      </p:sp>
+      <p:sp>
+        <p:nvSpPr>
+          <p:cNvPr id="4" name="Slide Number Placeholder 3"/>
+          <p:cNvSpPr>
+            <a:spLocks noGrp="1"/>
+          </p:cNvSpPr>
+          <p:nvPr>
+            <p:ph type="sldNum" sz="quarter" idx="10"/>
+          </p:nvPr>
+        </p:nvSpPr>
+        <p:spPr/>
+        <p:txBody>
+          <a:bodyPr/>
+          <a:lstStyle/>
+          <a:p>
+            <a:fld id="{FC59884A-FAD0-DE4F-8C4F-A27A5B8B9F19}" type="slidenum">
+              <a:rPr lang="en-US" smtClean="0"/>
+              <a:t>4</a:t>
+            </a:fld>
+            <a:endParaRPr lang="en-US"/>
+          </a:p>
+        </p:txBody>
+      </p:sp>
+    </p:spTree>
+    <p:extLst>
+      <p:ext uri="{BB962C8B-B14F-4D97-AF65-F5344CB8AC3E}">
+        <p14:creationId xmlns:p14="http://schemas.microsoft.com/office/powerpoint/2010/main" val="1849615942"/>
+      </p:ext>
+    </p:extLst>
+  </p:cSld>
+  <p:clrMapOvr>
+    <a:masterClrMapping/>
+  </p:clrMapOvr>
+</p:notes>
+</file>
+
+<file path=ppt/notesSlides/notesSlide3.xml><?xml version="1.0" encoding="utf-8"?>
+<p:notes xmlns:a="http://schemas.openxmlformats.org/drawingml/2006/main" xmlns:r="http://schemas.openxmlformats.org/officeDocument/2006/relationships" xmlns:p="http://schemas.openxmlformats.org/presentationml/2006/main">
+  <p:cSld>
+    <p:spTree>
+      <p:nvGrpSpPr>
+        <p:cNvPr id="1" name=""/>
+        <p:cNvGrpSpPr/>
+        <p:nvPr/>
+      </p:nvGrpSpPr>
+      <p:grpSpPr>
+        <a:xfrm>
+          <a:off x="0" y="0"/>
+          <a:ext cx="0" cy="0"/>
+          <a:chOff x="0" y="0"/>
+          <a:chExt cx="0" cy="0"/>
+        </a:xfrm>
+      </p:grpSpPr>
+      <p:sp>
+        <p:nvSpPr>
+          <p:cNvPr id="2" name="Slide Image Placeholder 1"/>
+          <p:cNvSpPr>
+            <a:spLocks noGrp="1" noRot="1" noChangeAspect="1"/>
+          </p:cNvSpPr>
+          <p:nvPr>
+            <p:ph type="sldImg"/>
+          </p:nvPr>
+        </p:nvSpPr>
+        <p:spPr>
+          <a:xfrm>
+            <a:off x="90488" y="744538"/>
+            <a:ext cx="6616700" cy="3722687"/>
+          </a:xfrm>
+        </p:spPr>
+      </p:sp>
+      <p:sp>
+        <p:nvSpPr>
+          <p:cNvPr id="3" name="Notes Placeholder 2"/>
+          <p:cNvSpPr>
+            <a:spLocks noGrp="1"/>
+          </p:cNvSpPr>
+          <p:nvPr>
+            <p:ph type="body" idx="1"/>
+          </p:nvPr>
+        </p:nvSpPr>
+        <p:spPr/>
+        <p:txBody>
+          <a:bodyPr/>
+          <a:lstStyle/>
+          <a:p>
+            <a:r>
+              <a:rPr lang="en-US" dirty="0" smtClean="0"/>
+              <a:t>The</a:t>
+            </a:r>
+            <a:r>
+              <a:rPr lang="en-US" baseline="0" dirty="0" smtClean="0"/>
+              <a:t> green area is the continuation for 4</a:t>
+            </a:r>
+            <a:endParaRPr lang="en-US" dirty="0" smtClean="0"/>
+          </a:p>
+          <a:p>
+            <a:endParaRPr lang="en-US" dirty="0"/>
+          </a:p>
+        </p:txBody>
+      </p:sp>
+      <p:sp>
+        <p:nvSpPr>
+          <p:cNvPr id="4" name="Slide Number Placeholder 3"/>
+          <p:cNvSpPr>
+            <a:spLocks noGrp="1"/>
+          </p:cNvSpPr>
+          <p:nvPr>
+            <p:ph type="sldNum" sz="quarter" idx="10"/>
+          </p:nvPr>
+        </p:nvSpPr>
+        <p:spPr/>
+        <p:txBody>
+          <a:bodyPr/>
+          <a:lstStyle/>
+          <a:p>
+            <a:fld id="{FC59884A-FAD0-DE4F-8C4F-A27A5B8B9F19}" type="slidenum">
+              <a:rPr lang="en-US" smtClean="0"/>
+              <a:t>5</a:t>
+            </a:fld>
+            <a:endParaRPr lang="en-US"/>
+          </a:p>
+        </p:txBody>
+      </p:sp>
+    </p:spTree>
+    <p:extLst>
+      <p:ext uri="{BB962C8B-B14F-4D97-AF65-F5344CB8AC3E}">
+        <p14:creationId xmlns:p14="http://schemas.microsoft.com/office/powerpoint/2010/main" val="744069184"/>
+      </p:ext>
+    </p:extLst>
+  </p:cSld>
+  <p:clrMapOvr>
+    <a:masterClrMapping/>
+  </p:clrMapOvr>
+</p:notes>
+</file>
+
+<file path=ppt/notesSlides/notesSlide4.xml><?xml version="1.0" encoding="utf-8"?>
+<p:notes xmlns:a="http://schemas.openxmlformats.org/drawingml/2006/main" xmlns:r="http://schemas.openxmlformats.org/officeDocument/2006/relationships" xmlns:p="http://schemas.openxmlformats.org/presentationml/2006/main">
+  <p:cSld>
+    <p:spTree>
+      <p:nvGrpSpPr>
+        <p:cNvPr id="1" name=""/>
+        <p:cNvGrpSpPr/>
+        <p:nvPr/>
+      </p:nvGrpSpPr>
+      <p:grpSpPr>
+        <a:xfrm>
+          <a:off x="0" y="0"/>
+          <a:ext cx="0" cy="0"/>
+          <a:chOff x="0" y="0"/>
+          <a:chExt cx="0" cy="0"/>
+        </a:xfrm>
+      </p:grpSpPr>
+      <p:sp>
+        <p:nvSpPr>
+          <p:cNvPr id="2" name="Slide Image Placeholder 1"/>
+          <p:cNvSpPr>
+            <a:spLocks noGrp="1" noRot="1" noChangeAspect="1"/>
+          </p:cNvSpPr>
+          <p:nvPr>
+            <p:ph type="sldImg"/>
+          </p:nvPr>
+        </p:nvSpPr>
+        <p:spPr>
+          <a:xfrm>
+            <a:off x="90488" y="744538"/>
+            <a:ext cx="6616700" cy="3722687"/>
+          </a:xfrm>
+        </p:spPr>
+      </p:sp>
+      <p:sp>
+        <p:nvSpPr>
+          <p:cNvPr id="3" name="Notes Placeholder 2"/>
+          <p:cNvSpPr>
+            <a:spLocks noGrp="1"/>
+          </p:cNvSpPr>
+          <p:nvPr>
+            <p:ph type="body" idx="1"/>
+          </p:nvPr>
+        </p:nvSpPr>
+        <p:spPr/>
+        <p:txBody>
+          <a:bodyPr/>
+          <a:lstStyle/>
+          <a:p>
+            <a:pPr marL="0" marR="0" indent="0" algn="l" defTabSz="914400" rtl="0" eaLnBrk="1" fontAlgn="auto" latinLnBrk="0" hangingPunct="1">
+              <a:lnSpc>
+                <a:spcPct val="100000"/>
+              </a:lnSpc>
+              <a:spcBef>
+                <a:spcPts val="0"/>
+              </a:spcBef>
+              <a:spcAft>
+                <a:spcPts val="0"/>
+              </a:spcAft>
+              <a:buClrTx/>
+              <a:buSzTx/>
+              <a:buFontTx/>
+              <a:buNone/>
+              <a:tabLst/>
+              <a:defRPr/>
+            </a:pPr>
+            <a:r>
+              <a:rPr lang="en-US" dirty="0" smtClean="0"/>
+              <a:t>Green area is the continuation</a:t>
+            </a:r>
+            <a:endParaRPr lang="en-US" dirty="0" smtClean="0"/>
+          </a:p>
+          <a:p>
+            <a:endParaRPr lang="en-US" dirty="0" smtClean="0"/>
+          </a:p>
+          <a:p>
+            <a:endParaRPr lang="en-US" dirty="0"/>
+          </a:p>
+        </p:txBody>
+      </p:sp>
+      <p:sp>
+        <p:nvSpPr>
+          <p:cNvPr id="4" name="Slide Number Placeholder 3"/>
+          <p:cNvSpPr>
+            <a:spLocks noGrp="1"/>
+          </p:cNvSpPr>
+          <p:nvPr>
+            <p:ph type="sldNum" sz="quarter" idx="10"/>
+          </p:nvPr>
+        </p:nvSpPr>
+        <p:spPr/>
+        <p:txBody>
+          <a:bodyPr/>
+          <a:lstStyle/>
+          <a:p>
+            <a:fld id="{FC59884A-FAD0-DE4F-8C4F-A27A5B8B9F19}" type="slidenum">
+              <a:rPr lang="en-US" smtClean="0"/>
+              <a:t>6</a:t>
+            </a:fld>
+            <a:endParaRPr lang="en-US"/>
+          </a:p>
+        </p:txBody>
+      </p:sp>
+    </p:spTree>
+    <p:extLst>
+      <p:ext uri="{BB962C8B-B14F-4D97-AF65-F5344CB8AC3E}">
+        <p14:creationId xmlns:p14="http://schemas.microsoft.com/office/powerpoint/2010/main" val="192018670"/>
+      </p:ext>
+    </p:extLst>
+  </p:cSld>
+  <p:clrMapOvr>
+    <a:masterClrMapping/>
+  </p:clrMapOvr>
+</p:notes>
+</file>
+
+<file path=ppt/notesSlides/notesSlide5.xml><?xml version="1.0" encoding="utf-8"?>
+<p:notes xmlns:a="http://schemas.openxmlformats.org/drawingml/2006/main" xmlns:r="http://schemas.openxmlformats.org/officeDocument/2006/relationships" xmlns:p="http://schemas.openxmlformats.org/presentationml/2006/main">
+  <p:cSld>
+    <p:spTree>
+      <p:nvGrpSpPr>
+        <p:cNvPr id="1" name=""/>
+        <p:cNvGrpSpPr/>
+        <p:nvPr/>
+      </p:nvGrpSpPr>
+      <p:grpSpPr>
+        <a:xfrm>
+          <a:off x="0" y="0"/>
+          <a:ext cx="0" cy="0"/>
+          <a:chOff x="0" y="0"/>
+          <a:chExt cx="0" cy="0"/>
+        </a:xfrm>
+      </p:grpSpPr>
+      <p:sp>
+        <p:nvSpPr>
+          <p:cNvPr id="2" name="Slide Image Placeholder 1"/>
+          <p:cNvSpPr>
+            <a:spLocks noGrp="1" noRot="1" noChangeAspect="1"/>
+          </p:cNvSpPr>
+          <p:nvPr>
+            <p:ph type="sldImg"/>
+          </p:nvPr>
+        </p:nvSpPr>
+        <p:spPr>
+          <a:xfrm>
+            <a:off x="90488" y="744538"/>
+            <a:ext cx="6616700" cy="3722687"/>
+          </a:xfrm>
+        </p:spPr>
+      </p:sp>
+      <p:sp>
+        <p:nvSpPr>
+          <p:cNvPr id="3" name="Notes Placeholder 2"/>
+          <p:cNvSpPr>
+            <a:spLocks noGrp="1"/>
+          </p:cNvSpPr>
+          <p:nvPr>
+            <p:ph type="body" idx="1"/>
+          </p:nvPr>
+        </p:nvSpPr>
+        <p:spPr/>
+        <p:txBody>
+          <a:bodyPr/>
+          <a:lstStyle/>
+          <a:p>
+            <a:pPr marL="0" marR="0" indent="0" algn="l" defTabSz="914400" rtl="0" eaLnBrk="1" fontAlgn="auto" latinLnBrk="0" hangingPunct="1">
+              <a:lnSpc>
+                <a:spcPct val="100000"/>
+              </a:lnSpc>
+              <a:spcBef>
+                <a:spcPts val="0"/>
+              </a:spcBef>
+              <a:spcAft>
+                <a:spcPts val="0"/>
+              </a:spcAft>
+              <a:buClrTx/>
+              <a:buSzTx/>
+              <a:buFontTx/>
+              <a:buNone/>
+              <a:tabLst/>
+              <a:defRPr/>
+            </a:pPr>
+            <a:r>
+              <a:rPr lang="en-US" dirty="0" smtClean="0"/>
+              <a:t>Green area is the continuation</a:t>
+            </a:r>
+            <a:endParaRPr lang="en-US" dirty="0" smtClean="0"/>
+          </a:p>
+          <a:p>
+            <a:endParaRPr lang="en-US" dirty="0" smtClean="0"/>
+          </a:p>
+          <a:p>
+            <a:endParaRPr lang="en-US" dirty="0"/>
+          </a:p>
+        </p:txBody>
+      </p:sp>
+      <p:sp>
+        <p:nvSpPr>
+          <p:cNvPr id="4" name="Slide Number Placeholder 3"/>
+          <p:cNvSpPr>
+            <a:spLocks noGrp="1"/>
+          </p:cNvSpPr>
+          <p:nvPr>
+            <p:ph type="sldNum" sz="quarter" idx="10"/>
+          </p:nvPr>
+        </p:nvSpPr>
+        <p:spPr/>
+        <p:txBody>
+          <a:bodyPr/>
+          <a:lstStyle/>
+          <a:p>
+            <a:fld id="{FC59884A-FAD0-DE4F-8C4F-A27A5B8B9F19}" type="slidenum">
+              <a:rPr lang="en-US" smtClean="0"/>
+              <a:t>7</a:t>
+            </a:fld>
+            <a:endParaRPr lang="en-US"/>
+          </a:p>
+        </p:txBody>
+      </p:sp>
+    </p:spTree>
+    <p:extLst>
+      <p:ext uri="{BB962C8B-B14F-4D97-AF65-F5344CB8AC3E}">
+        <p14:creationId xmlns:p14="http://schemas.microsoft.com/office/powerpoint/2010/main" val="571324907"/>
+      </p:ext>
+    </p:extLst>
+  </p:cSld>
+  <p:clrMapOvr>
+    <a:masterClrMapping/>
+  </p:clrMapOvr>
+</p:notes>
+</file>
+
+<file path=ppt/notesSlides/notesSlide6.xml><?xml version="1.0" encoding="utf-8"?>
+<p:notes xmlns:a="http://schemas.openxmlformats.org/drawingml/2006/main" xmlns:r="http://schemas.openxmlformats.org/officeDocument/2006/relationships" xmlns:p="http://schemas.openxmlformats.org/presentationml/2006/main">
+  <p:cSld>
+    <p:spTree>
+      <p:nvGrpSpPr>
+        <p:cNvPr id="1" name=""/>
+        <p:cNvGrpSpPr/>
+        <p:nvPr/>
+      </p:nvGrpSpPr>
+      <p:grpSpPr>
+        <a:xfrm>
+          <a:off x="0" y="0"/>
+          <a:ext cx="0" cy="0"/>
+          <a:chOff x="0" y="0"/>
+          <a:chExt cx="0" cy="0"/>
+        </a:xfrm>
+      </p:grpSpPr>
+      <p:sp>
+        <p:nvSpPr>
+          <p:cNvPr id="2" name="Slide Image Placeholder 1"/>
+          <p:cNvSpPr>
+            <a:spLocks noGrp="1" noRot="1" noChangeAspect="1"/>
+          </p:cNvSpPr>
+          <p:nvPr>
+            <p:ph type="sldImg"/>
+          </p:nvPr>
+        </p:nvSpPr>
+        <p:spPr>
+          <a:xfrm>
+            <a:off x="90488" y="744538"/>
+            <a:ext cx="6616700" cy="3722687"/>
+          </a:xfrm>
+        </p:spPr>
+      </p:sp>
+      <p:sp>
+        <p:nvSpPr>
+          <p:cNvPr id="3" name="Notes Placeholder 2"/>
+          <p:cNvSpPr>
+            <a:spLocks noGrp="1"/>
+          </p:cNvSpPr>
+          <p:nvPr>
+            <p:ph type="body" idx="1"/>
+          </p:nvPr>
+        </p:nvSpPr>
+        <p:spPr/>
+        <p:txBody>
+          <a:bodyPr/>
+          <a:lstStyle/>
+          <a:p>
+            <a:pPr marL="0" marR="0" indent="0" algn="l" defTabSz="914400" rtl="0" eaLnBrk="1" fontAlgn="auto" latinLnBrk="0" hangingPunct="1">
+              <a:lnSpc>
+                <a:spcPct val="100000"/>
+              </a:lnSpc>
+              <a:spcBef>
+                <a:spcPts val="0"/>
+              </a:spcBef>
+              <a:spcAft>
+                <a:spcPts val="0"/>
+              </a:spcAft>
+              <a:buClrTx/>
+              <a:buSzTx/>
+              <a:buFontTx/>
+              <a:buNone/>
+              <a:tabLst/>
+              <a:defRPr/>
+            </a:pPr>
+            <a:r>
+              <a:rPr lang="en-US" dirty="0" smtClean="0"/>
+              <a:t>Green area is the continuation</a:t>
+            </a:r>
+            <a:endParaRPr lang="en-US" dirty="0" smtClean="0"/>
+          </a:p>
+          <a:p>
+            <a:endParaRPr lang="en-US" dirty="0" smtClean="0"/>
+          </a:p>
+          <a:p>
+            <a:endParaRPr lang="en-US" dirty="0"/>
+          </a:p>
+        </p:txBody>
+      </p:sp>
+      <p:sp>
+        <p:nvSpPr>
+          <p:cNvPr id="4" name="Slide Number Placeholder 3"/>
+          <p:cNvSpPr>
+            <a:spLocks noGrp="1"/>
+          </p:cNvSpPr>
+          <p:nvPr>
+            <p:ph type="sldNum" sz="quarter" idx="10"/>
+          </p:nvPr>
+        </p:nvSpPr>
+        <p:spPr/>
+        <p:txBody>
+          <a:bodyPr/>
+          <a:lstStyle/>
+          <a:p>
+            <a:fld id="{FC59884A-FAD0-DE4F-8C4F-A27A5B8B9F19}" type="slidenum">
+              <a:rPr lang="en-US" smtClean="0"/>
+              <a:t>8</a:t>
+            </a:fld>
+            <a:endParaRPr lang="en-US"/>
+          </a:p>
+        </p:txBody>
+      </p:sp>
+    </p:spTree>
+    <p:extLst>
+      <p:ext uri="{BB962C8B-B14F-4D97-AF65-F5344CB8AC3E}">
+        <p14:creationId xmlns:p14="http://schemas.microsoft.com/office/powerpoint/2010/main" val="581778521"/>
+      </p:ext>
+    </p:extLst>
+  </p:cSld>
+  <p:clrMapOvr>
+    <a:masterClrMapping/>
+  </p:clrMapOvr>
+</p:notes>
+</file>
+
+<file path=ppt/notesSlides/notesSlide7.xml><?xml version="1.0" encoding="utf-8"?>
+<p:notes xmlns:a="http://schemas.openxmlformats.org/drawingml/2006/main" xmlns:r="http://schemas.openxmlformats.org/officeDocument/2006/relationships" xmlns:p="http://schemas.openxmlformats.org/presentationml/2006/main">
+  <p:cSld>
+    <p:spTree>
+      <p:nvGrpSpPr>
+        <p:cNvPr id="1" name=""/>
+        <p:cNvGrpSpPr/>
+        <p:nvPr/>
+      </p:nvGrpSpPr>
+      <p:grpSpPr>
+        <a:xfrm>
+          <a:off x="0" y="0"/>
+          <a:ext cx="0" cy="0"/>
+          <a:chOff x="0" y="0"/>
+          <a:chExt cx="0" cy="0"/>
+        </a:xfrm>
+      </p:grpSpPr>
+      <p:sp>
+        <p:nvSpPr>
+          <p:cNvPr id="2" name="Slide Image Placeholder 1"/>
+          <p:cNvSpPr>
+            <a:spLocks noGrp="1" noRot="1" noChangeAspect="1"/>
+          </p:cNvSpPr>
+          <p:nvPr>
+            <p:ph type="sldImg"/>
+          </p:nvPr>
+        </p:nvSpPr>
+        <p:spPr>
+          <a:xfrm>
+            <a:off x="90488" y="744538"/>
+            <a:ext cx="6616700" cy="3722687"/>
+          </a:xfrm>
+        </p:spPr>
+      </p:sp>
+      <p:sp>
+        <p:nvSpPr>
+          <p:cNvPr id="3" name="Notes Placeholder 2"/>
+          <p:cNvSpPr>
+            <a:spLocks noGrp="1"/>
+          </p:cNvSpPr>
+          <p:nvPr>
+            <p:ph type="body" idx="1"/>
+          </p:nvPr>
+        </p:nvSpPr>
+        <p:spPr/>
+        <p:txBody>
+          <a:bodyPr/>
+          <a:lstStyle/>
+          <a:p>
+            <a:pPr marL="0" marR="0" indent="0" algn="l" defTabSz="914400" rtl="0" eaLnBrk="1" fontAlgn="auto" latinLnBrk="0" hangingPunct="1">
+              <a:lnSpc>
+                <a:spcPct val="100000"/>
+              </a:lnSpc>
+              <a:spcBef>
+                <a:spcPts val="0"/>
+              </a:spcBef>
+              <a:spcAft>
+                <a:spcPts val="0"/>
+              </a:spcAft>
+              <a:buClrTx/>
+              <a:buSzTx/>
+              <a:buFontTx/>
+              <a:buNone/>
+              <a:tabLst/>
+              <a:defRPr/>
+            </a:pPr>
+            <a:r>
+              <a:rPr lang="en-US" dirty="0" smtClean="0"/>
+              <a:t>The</a:t>
+            </a:r>
+            <a:r>
+              <a:rPr lang="en-US" baseline="0" dirty="0" smtClean="0"/>
+              <a:t> style</a:t>
+            </a:r>
+            <a:r>
+              <a:rPr lang="en-US" dirty="0" smtClean="0"/>
+              <a:t> you</a:t>
+            </a:r>
+            <a:r>
+              <a:rPr lang="en-US" baseline="0" dirty="0" smtClean="0"/>
+              <a:t> use every day. </a:t>
+            </a:r>
+            <a:endParaRPr lang="en-US" dirty="0" smtClean="0"/>
+          </a:p>
+          <a:p>
+            <a:endParaRPr lang="en-US" dirty="0" smtClean="0"/>
+          </a:p>
+          <a:p>
+            <a:endParaRPr lang="en-US" dirty="0"/>
+          </a:p>
+        </p:txBody>
+      </p:sp>
+      <p:sp>
+        <p:nvSpPr>
+          <p:cNvPr id="4" name="Slide Number Placeholder 3"/>
+          <p:cNvSpPr>
+            <a:spLocks noGrp="1"/>
+          </p:cNvSpPr>
+          <p:nvPr>
+            <p:ph type="sldNum" sz="quarter" idx="10"/>
+          </p:nvPr>
+        </p:nvSpPr>
+        <p:spPr/>
+        <p:txBody>
+          <a:bodyPr/>
+          <a:lstStyle/>
+          <a:p>
+            <a:fld id="{FC59884A-FAD0-DE4F-8C4F-A27A5B8B9F19}" type="slidenum">
+              <a:rPr lang="en-US" smtClean="0"/>
+              <a:t>9</a:t>
+            </a:fld>
+            <a:endParaRPr lang="en-US"/>
+          </a:p>
+        </p:txBody>
+      </p:sp>
+    </p:spTree>
+    <p:extLst>
+      <p:ext uri="{BB962C8B-B14F-4D97-AF65-F5344CB8AC3E}">
+        <p14:creationId xmlns:p14="http://schemas.microsoft.com/office/powerpoint/2010/main" val="1504588864"/>
+      </p:ext>
+    </p:extLst>
+  </p:cSld>
+  <p:clrMapOvr>
+    <a:masterClrMapping/>
+  </p:clrMapOvr>
+</p:notes>
+</file>
+
+<file path=ppt/notesSlides/notesSlide8.xml><?xml version="1.0" encoding="utf-8"?>
+<p:notes xmlns:a="http://schemas.openxmlformats.org/drawingml/2006/main" xmlns:r="http://schemas.openxmlformats.org/officeDocument/2006/relationships" xmlns:p="http://schemas.openxmlformats.org/presentationml/2006/main">
+  <p:cSld>
+    <p:spTree>
+      <p:nvGrpSpPr>
+        <p:cNvPr id="1" name=""/>
+        <p:cNvGrpSpPr/>
+        <p:nvPr/>
+      </p:nvGrpSpPr>
+      <p:grpSpPr>
+        <a:xfrm>
+          <a:off x="0" y="0"/>
+          <a:ext cx="0" cy="0"/>
+          <a:chOff x="0" y="0"/>
+          <a:chExt cx="0" cy="0"/>
+        </a:xfrm>
+      </p:grpSpPr>
+      <p:sp>
+        <p:nvSpPr>
+          <p:cNvPr id="2" name="Slide Image Placeholder 1"/>
+          <p:cNvSpPr>
+            <a:spLocks noGrp="1" noRot="1" noChangeAspect="1"/>
+          </p:cNvSpPr>
+          <p:nvPr>
+            <p:ph type="sldImg"/>
+          </p:nvPr>
+        </p:nvSpPr>
+        <p:spPr>
+          <a:xfrm>
+            <a:off x="90488" y="744538"/>
+            <a:ext cx="6616700" cy="3722687"/>
+          </a:xfrm>
+        </p:spPr>
+      </p:sp>
+      <p:sp>
+        <p:nvSpPr>
+          <p:cNvPr id="3" name="Notes Placeholder 2"/>
+          <p:cNvSpPr>
+            <a:spLocks noGrp="1"/>
+          </p:cNvSpPr>
+          <p:nvPr>
+            <p:ph type="body" idx="1"/>
+          </p:nvPr>
+        </p:nvSpPr>
+        <p:spPr/>
+        <p:txBody>
+          <a:bodyPr/>
+          <a:lstStyle/>
+          <a:p>
+            <a:pPr marL="0" marR="0" indent="0" algn="l" defTabSz="914400" rtl="0" eaLnBrk="1" fontAlgn="auto" latinLnBrk="0" hangingPunct="1">
+              <a:lnSpc>
+                <a:spcPct val="100000"/>
+              </a:lnSpc>
+              <a:spcBef>
+                <a:spcPts val="0"/>
+              </a:spcBef>
+              <a:spcAft>
+                <a:spcPts val="0"/>
+              </a:spcAft>
+              <a:buClrTx/>
+              <a:buSzTx/>
+              <a:buFontTx/>
+              <a:buNone/>
+              <a:tabLst/>
+              <a:defRPr/>
+            </a:pPr>
+            <a:r>
+              <a:rPr lang="en-US" dirty="0" smtClean="0"/>
+              <a:t>every</a:t>
+            </a:r>
+            <a:r>
+              <a:rPr lang="en-US" baseline="0" dirty="0" smtClean="0"/>
+              <a:t> function takes an extra argument in respect of their direct style, this argument is the continuation.</a:t>
+            </a:r>
+          </a:p>
+          <a:p>
+            <a:pPr marL="0" marR="0" indent="0" algn="l" defTabSz="914400" rtl="0" eaLnBrk="1" fontAlgn="auto" latinLnBrk="0" hangingPunct="1">
+              <a:lnSpc>
+                <a:spcPct val="100000"/>
+              </a:lnSpc>
+              <a:spcBef>
+                <a:spcPts val="0"/>
+              </a:spcBef>
+              <a:spcAft>
+                <a:spcPts val="0"/>
+              </a:spcAft>
+              <a:buClrTx/>
+              <a:buSzTx/>
+              <a:buFontTx/>
+              <a:buNone/>
+              <a:tabLst/>
+              <a:defRPr/>
+            </a:pPr>
+            <a:r>
+              <a:rPr lang="en-US" baseline="0" dirty="0" smtClean="0"/>
+              <a:t>Every function doesn’t return a value explicitly but rather call the continuation.</a:t>
+            </a:r>
+            <a:endParaRPr lang="en-US" dirty="0" smtClean="0"/>
+          </a:p>
+          <a:p>
+            <a:endParaRPr lang="en-US" dirty="0" smtClean="0"/>
+          </a:p>
+          <a:p>
+            <a:endParaRPr lang="en-US" dirty="0"/>
+          </a:p>
+        </p:txBody>
+      </p:sp>
+      <p:sp>
+        <p:nvSpPr>
+          <p:cNvPr id="4" name="Slide Number Placeholder 3"/>
+          <p:cNvSpPr>
+            <a:spLocks noGrp="1"/>
+          </p:cNvSpPr>
+          <p:nvPr>
+            <p:ph type="sldNum" sz="quarter" idx="10"/>
+          </p:nvPr>
+        </p:nvSpPr>
+        <p:spPr/>
+        <p:txBody>
+          <a:bodyPr/>
+          <a:lstStyle/>
+          <a:p>
+            <a:fld id="{FC59884A-FAD0-DE4F-8C4F-A27A5B8B9F19}" type="slidenum">
+              <a:rPr lang="en-US" smtClean="0"/>
+              <a:t>10</a:t>
+            </a:fld>
+            <a:endParaRPr lang="en-US"/>
+          </a:p>
+        </p:txBody>
+      </p:sp>
+    </p:spTree>
+    <p:extLst>
+      <p:ext uri="{BB962C8B-B14F-4D97-AF65-F5344CB8AC3E}">
+        <p14:creationId xmlns:p14="http://schemas.microsoft.com/office/powerpoint/2010/main" val="1090531464"/>
+      </p:ext>
+    </p:extLst>
+  </p:cSld>
+  <p:clrMapOvr>
+    <a:masterClrMapping/>
+  </p:clrMapOvr>
+</p:notes>
+</file>
+
+<file path=ppt/notesSlides/notesSlide9.xml><?xml version="1.0" encoding="utf-8"?>
+<p:notes xmlns:a="http://schemas.openxmlformats.org/drawingml/2006/main" xmlns:r="http://schemas.openxmlformats.org/officeDocument/2006/relationships" xmlns:p="http://schemas.openxmlformats.org/presentationml/2006/main">
+  <p:cSld>
+    <p:spTree>
+      <p:nvGrpSpPr>
+        <p:cNvPr id="1" name=""/>
+        <p:cNvGrpSpPr/>
+        <p:nvPr/>
+      </p:nvGrpSpPr>
+      <p:grpSpPr>
+        <a:xfrm>
+          <a:off x="0" y="0"/>
+          <a:ext cx="0" cy="0"/>
+          <a:chOff x="0" y="0"/>
+          <a:chExt cx="0" cy="0"/>
+        </a:xfrm>
+      </p:grpSpPr>
+      <p:sp>
+        <p:nvSpPr>
+          <p:cNvPr id="2" name="Slide Image Placeholder 1"/>
+          <p:cNvSpPr>
+            <a:spLocks noGrp="1" noRot="1" noChangeAspect="1"/>
+          </p:cNvSpPr>
+          <p:nvPr>
+            <p:ph type="sldImg"/>
+          </p:nvPr>
+        </p:nvSpPr>
+        <p:spPr>
+          <a:xfrm>
+            <a:off x="90488" y="744538"/>
+            <a:ext cx="6616700" cy="3722687"/>
+          </a:xfrm>
+        </p:spPr>
+      </p:sp>
+      <p:sp>
+        <p:nvSpPr>
+          <p:cNvPr id="3" name="Notes Placeholder 2"/>
+          <p:cNvSpPr>
+            <a:spLocks noGrp="1"/>
+          </p:cNvSpPr>
+          <p:nvPr>
+            <p:ph type="body" idx="1"/>
+          </p:nvPr>
+        </p:nvSpPr>
+        <p:spPr/>
+        <p:txBody>
+          <a:bodyPr/>
+          <a:lstStyle/>
+          <a:p>
+            <a:pPr marL="0" marR="0" indent="0" algn="l" defTabSz="914400" rtl="0" eaLnBrk="1" fontAlgn="auto" latinLnBrk="0" hangingPunct="1">
+              <a:lnSpc>
+                <a:spcPct val="100000"/>
+              </a:lnSpc>
+              <a:spcBef>
+                <a:spcPts val="0"/>
+              </a:spcBef>
+              <a:spcAft>
+                <a:spcPts val="0"/>
+              </a:spcAft>
+              <a:buClrTx/>
+              <a:buSzTx/>
+              <a:buFontTx/>
+              <a:buNone/>
+              <a:tabLst/>
+              <a:defRPr/>
+            </a:pPr>
+            <a:r>
+              <a:rPr lang="en-US" dirty="0" smtClean="0"/>
+              <a:t>mention default clear in constructor injection example</a:t>
+            </a:r>
+          </a:p>
+          <a:p>
+            <a:endParaRPr lang="en-US" dirty="0" smtClean="0"/>
+          </a:p>
+          <a:p>
+            <a:endParaRPr lang="en-US" dirty="0"/>
+          </a:p>
+        </p:txBody>
+      </p:sp>
+      <p:sp>
+        <p:nvSpPr>
+          <p:cNvPr id="4" name="Slide Number Placeholder 3"/>
+          <p:cNvSpPr>
+            <a:spLocks noGrp="1"/>
+          </p:cNvSpPr>
+          <p:nvPr>
+            <p:ph type="sldNum" sz="quarter" idx="10"/>
+          </p:nvPr>
+        </p:nvSpPr>
+        <p:spPr/>
+        <p:txBody>
+          <a:bodyPr/>
+          <a:lstStyle/>
+          <a:p>
+            <a:fld id="{FC59884A-FAD0-DE4F-8C4F-A27A5B8B9F19}" type="slidenum">
+              <a:rPr lang="en-US" smtClean="0"/>
+              <a:t>11</a:t>
+            </a:fld>
+            <a:endParaRPr lang="en-US"/>
+          </a:p>
+        </p:txBody>
+      </p:sp>
+    </p:spTree>
+    <p:extLst>
+      <p:ext uri="{BB962C8B-B14F-4D97-AF65-F5344CB8AC3E}">
+        <p14:creationId xmlns:p14="http://schemas.microsoft.com/office/powerpoint/2010/main" val="825034843"/>
+      </p:ext>
+    </p:extLst>
   </p:cSld>
   <p:clrMapOvr>
     <a:masterClrMapping/>
@@ -4286,6 +4442,13 @@
   <p:clrMapOvr>
     <a:masterClrMapping/>
   </p:clrMapOvr>
+  <p:timing>
+    <p:tnLst>
+      <p:par>
+        <p:cTn id="1" dur="indefinite" restart="never" nodeType="tmRoot"/>
+      </p:par>
+    </p:tnLst>
+  </p:timing>
 </p:sld>
 </file>
 
@@ -4327,6 +4490,1074 @@
           <a:lstStyle/>
           <a:p>
             <a:r>
+              <a:rPr lang="en-US" dirty="0" smtClean="0"/>
+              <a:t>Continuation Passing Style  (CPS)</a:t>
+            </a:r>
+            <a:endParaRPr lang="en-US" dirty="0"/>
+          </a:p>
+        </p:txBody>
+      </p:sp>
+      <p:sp>
+        <p:nvSpPr>
+          <p:cNvPr id="6" name="Rectangle 5"/>
+          <p:cNvSpPr/>
+          <p:nvPr/>
+        </p:nvSpPr>
+        <p:spPr>
+          <a:xfrm>
+            <a:off x="2925763" y="1900719"/>
+            <a:ext cx="6043576" cy="446276"/>
+          </a:xfrm>
+          <a:prstGeom prst="rect">
+            <a:avLst/>
+          </a:prstGeom>
+        </p:spPr>
+        <p:txBody>
+          <a:bodyPr wrap="square">
+            <a:spAutoFit/>
+          </a:bodyPr>
+          <a:lstStyle/>
+          <a:p>
+            <a:endParaRPr lang="en-US" dirty="0"/>
+          </a:p>
+        </p:txBody>
+      </p:sp>
+      <p:pic>
+        <p:nvPicPr>
+          <p:cNvPr id="3" name="Picture 2"/>
+          <p:cNvPicPr>
+            <a:picLocks noChangeAspect="1"/>
+          </p:cNvPicPr>
+          <p:nvPr/>
+        </p:nvPicPr>
+        <p:blipFill>
+          <a:blip r:embed="rId3">
+            <a:extLst>
+              <a:ext uri="{28A0092B-C50C-407E-A947-70E740481C1C}">
+                <a14:useLocalDpi xmlns:a14="http://schemas.microsoft.com/office/drawing/2010/main" val="0"/>
+              </a:ext>
+            </a:extLst>
+          </a:blip>
+          <a:stretch>
+            <a:fillRect/>
+          </a:stretch>
+        </p:blipFill>
+        <p:spPr>
+          <a:xfrm>
+            <a:off x="8580438" y="139130"/>
+            <a:ext cx="3124200" cy="2524125"/>
+          </a:xfrm>
+          <a:prstGeom prst="rect">
+            <a:avLst/>
+          </a:prstGeom>
+        </p:spPr>
+      </p:pic>
+      <p:sp>
+        <p:nvSpPr>
+          <p:cNvPr id="5" name="TextBox 4"/>
+          <p:cNvSpPr txBox="1"/>
+          <p:nvPr/>
+        </p:nvSpPr>
+        <p:spPr>
+          <a:xfrm>
+            <a:off x="596901" y="1900719"/>
+            <a:ext cx="9212117" cy="4093428"/>
+          </a:xfrm>
+          <a:prstGeom prst="rect">
+            <a:avLst/>
+          </a:prstGeom>
+          <a:noFill/>
+        </p:spPr>
+        <p:txBody>
+          <a:bodyPr wrap="square" rtlCol="0">
+            <a:spAutoFit/>
+          </a:bodyPr>
+          <a:lstStyle/>
+          <a:p>
+            <a:r>
+              <a:rPr lang="mr-IN" sz="2000" b="1" dirty="0" err="1" smtClean="0">
+                <a:solidFill>
+                  <a:srgbClr val="000080"/>
+                </a:solidFill>
+                <a:latin typeface="Courier" charset="0"/>
+                <a:ea typeface="Courier" charset="0"/>
+                <a:cs typeface="Courier" charset="0"/>
+              </a:rPr>
+              <a:t>def</a:t>
+            </a:r>
+            <a:r>
+              <a:rPr lang="mr-IN" sz="2000" b="1" dirty="0" smtClean="0">
+                <a:solidFill>
+                  <a:srgbClr val="000080"/>
+                </a:solidFill>
+                <a:latin typeface="Courier" charset="0"/>
+                <a:ea typeface="Courier" charset="0"/>
+                <a:cs typeface="Courier" charset="0"/>
+              </a:rPr>
+              <a:t> </a:t>
+            </a:r>
+            <a:r>
+              <a:rPr lang="mr-IN" sz="2000" dirty="0" err="1">
+                <a:latin typeface="Courier" charset="0"/>
+                <a:ea typeface="Courier" charset="0"/>
+                <a:cs typeface="Courier" charset="0"/>
+              </a:rPr>
+              <a:t>square</a:t>
+            </a:r>
+            <a:r>
+              <a:rPr lang="mr-IN" sz="2000" dirty="0">
+                <a:latin typeface="Courier" charset="0"/>
+                <a:ea typeface="Courier" charset="0"/>
+                <a:cs typeface="Courier" charset="0"/>
+              </a:rPr>
+              <a:t>(</a:t>
+            </a:r>
+            <a:r>
+              <a:rPr lang="mr-IN" sz="2000" dirty="0" err="1">
+                <a:latin typeface="Courier" charset="0"/>
+                <a:ea typeface="Courier" charset="0"/>
+                <a:cs typeface="Courier" charset="0"/>
+              </a:rPr>
+              <a:t>x</a:t>
+            </a:r>
+            <a:r>
+              <a:rPr lang="mr-IN" sz="2000" dirty="0">
+                <a:latin typeface="Courier" charset="0"/>
+                <a:ea typeface="Courier" charset="0"/>
+                <a:cs typeface="Courier" charset="0"/>
+              </a:rPr>
+              <a:t>: </a:t>
+            </a:r>
+            <a:r>
+              <a:rPr lang="mr-IN" sz="2000" dirty="0" err="1">
+                <a:latin typeface="Courier" charset="0"/>
+                <a:ea typeface="Courier" charset="0"/>
+                <a:cs typeface="Courier" charset="0"/>
+              </a:rPr>
+              <a:t>Int</a:t>
+            </a:r>
+            <a:r>
+              <a:rPr lang="mr-IN" sz="2000" dirty="0">
+                <a:latin typeface="Courier" charset="0"/>
+                <a:ea typeface="Courier" charset="0"/>
+                <a:cs typeface="Courier" charset="0"/>
+              </a:rPr>
+              <a:t>, </a:t>
+            </a:r>
+            <a:r>
+              <a:rPr lang="mr-IN" sz="2000" dirty="0" err="1">
+                <a:latin typeface="Courier" charset="0"/>
+                <a:ea typeface="Courier" charset="0"/>
+                <a:cs typeface="Courier" charset="0"/>
+              </a:rPr>
+              <a:t>k</a:t>
+            </a:r>
+            <a:r>
+              <a:rPr lang="mr-IN" sz="2000" dirty="0">
+                <a:latin typeface="Courier" charset="0"/>
+                <a:ea typeface="Courier" charset="0"/>
+                <a:cs typeface="Courier" charset="0"/>
+              </a:rPr>
+              <a:t>: </a:t>
+            </a:r>
+            <a:r>
+              <a:rPr lang="mr-IN" sz="2000" dirty="0" err="1">
+                <a:latin typeface="Courier" charset="0"/>
+                <a:ea typeface="Courier" charset="0"/>
+                <a:cs typeface="Courier" charset="0"/>
+              </a:rPr>
+              <a:t>Int</a:t>
+            </a:r>
+            <a:r>
+              <a:rPr lang="mr-IN" sz="2000" dirty="0">
+                <a:latin typeface="Courier" charset="0"/>
+                <a:ea typeface="Courier" charset="0"/>
+                <a:cs typeface="Courier" charset="0"/>
+              </a:rPr>
+              <a:t> =&gt; </a:t>
+            </a:r>
+            <a:r>
+              <a:rPr lang="mr-IN" sz="2000" dirty="0" err="1">
+                <a:latin typeface="Courier" charset="0"/>
+                <a:ea typeface="Courier" charset="0"/>
+                <a:cs typeface="Courier" charset="0"/>
+              </a:rPr>
+              <a:t>Int</a:t>
+            </a:r>
+            <a:r>
+              <a:rPr lang="mr-IN" sz="2000" dirty="0">
+                <a:latin typeface="Courier" charset="0"/>
+                <a:ea typeface="Courier" charset="0"/>
+                <a:cs typeface="Courier" charset="0"/>
+              </a:rPr>
+              <a:t>): </a:t>
+            </a:r>
+            <a:r>
+              <a:rPr lang="mr-IN" sz="2000" dirty="0" err="1">
+                <a:latin typeface="Courier" charset="0"/>
+                <a:ea typeface="Courier" charset="0"/>
+                <a:cs typeface="Courier" charset="0"/>
+              </a:rPr>
+              <a:t>Int</a:t>
+            </a:r>
+            <a:r>
+              <a:rPr lang="mr-IN" sz="2000" dirty="0">
+                <a:latin typeface="Courier" charset="0"/>
+                <a:ea typeface="Courier" charset="0"/>
+                <a:cs typeface="Courier" charset="0"/>
+              </a:rPr>
+              <a:t> = </a:t>
+            </a:r>
+            <a:endParaRPr lang="en-US" sz="2000" dirty="0" smtClean="0">
+              <a:latin typeface="Courier" charset="0"/>
+              <a:ea typeface="Courier" charset="0"/>
+              <a:cs typeface="Courier" charset="0"/>
+            </a:endParaRPr>
+          </a:p>
+          <a:p>
+            <a:r>
+              <a:rPr lang="en-US" sz="2000" dirty="0">
+                <a:latin typeface="Courier" charset="0"/>
+                <a:ea typeface="Courier" charset="0"/>
+                <a:cs typeface="Courier" charset="0"/>
+              </a:rPr>
+              <a:t> </a:t>
+            </a:r>
+            <a:r>
+              <a:rPr lang="en-US" sz="2000" dirty="0" smtClean="0">
+                <a:latin typeface="Courier" charset="0"/>
+                <a:ea typeface="Courier" charset="0"/>
+                <a:cs typeface="Courier" charset="0"/>
+              </a:rPr>
+              <a:t> </a:t>
+            </a:r>
+            <a:r>
+              <a:rPr lang="mr-IN" sz="2000" dirty="0" err="1" smtClean="0">
+                <a:latin typeface="Courier" charset="0"/>
+                <a:ea typeface="Courier" charset="0"/>
+                <a:cs typeface="Courier" charset="0"/>
+              </a:rPr>
+              <a:t>k</a:t>
+            </a:r>
+            <a:r>
+              <a:rPr lang="mr-IN" sz="2000" dirty="0" smtClean="0">
+                <a:latin typeface="Courier" charset="0"/>
+                <a:ea typeface="Courier" charset="0"/>
+                <a:cs typeface="Courier" charset="0"/>
+              </a:rPr>
+              <a:t>(</a:t>
+            </a:r>
+            <a:r>
+              <a:rPr lang="mr-IN" sz="2000" dirty="0" err="1" smtClean="0">
+                <a:latin typeface="Courier" charset="0"/>
+                <a:ea typeface="Courier" charset="0"/>
+                <a:cs typeface="Courier" charset="0"/>
+              </a:rPr>
+              <a:t>x</a:t>
+            </a:r>
+            <a:r>
+              <a:rPr lang="mr-IN" sz="2000" dirty="0" smtClean="0">
+                <a:latin typeface="Courier" charset="0"/>
+                <a:ea typeface="Courier" charset="0"/>
+                <a:cs typeface="Courier" charset="0"/>
+              </a:rPr>
+              <a:t> </a:t>
+            </a:r>
+            <a:r>
+              <a:rPr lang="mr-IN" sz="2000" dirty="0">
+                <a:latin typeface="Courier" charset="0"/>
+                <a:ea typeface="Courier" charset="0"/>
+                <a:cs typeface="Courier" charset="0"/>
+              </a:rPr>
+              <a:t>* </a:t>
+            </a:r>
+            <a:r>
+              <a:rPr lang="mr-IN" sz="2000" dirty="0" err="1">
+                <a:latin typeface="Courier" charset="0"/>
+                <a:ea typeface="Courier" charset="0"/>
+                <a:cs typeface="Courier" charset="0"/>
+              </a:rPr>
+              <a:t>x</a:t>
+            </a:r>
+            <a:r>
+              <a:rPr lang="mr-IN" sz="2000" dirty="0">
+                <a:latin typeface="Courier" charset="0"/>
+                <a:ea typeface="Courier" charset="0"/>
+                <a:cs typeface="Courier" charset="0"/>
+              </a:rPr>
+              <a:t>)</a:t>
+            </a:r>
+            <a:br>
+              <a:rPr lang="mr-IN" sz="2000" dirty="0">
+                <a:latin typeface="Courier" charset="0"/>
+                <a:ea typeface="Courier" charset="0"/>
+                <a:cs typeface="Courier" charset="0"/>
+              </a:rPr>
+            </a:br>
+            <a:r>
+              <a:rPr lang="mr-IN" sz="2000" dirty="0">
+                <a:latin typeface="Courier" charset="0"/>
+                <a:ea typeface="Courier" charset="0"/>
+                <a:cs typeface="Courier" charset="0"/>
+              </a:rPr>
+              <a:t/>
+            </a:r>
+            <a:br>
+              <a:rPr lang="mr-IN" sz="2000" dirty="0">
+                <a:latin typeface="Courier" charset="0"/>
+                <a:ea typeface="Courier" charset="0"/>
+                <a:cs typeface="Courier" charset="0"/>
+              </a:rPr>
+            </a:br>
+            <a:r>
+              <a:rPr lang="mr-IN" sz="2000" b="1" dirty="0" err="1">
+                <a:solidFill>
+                  <a:srgbClr val="000080"/>
+                </a:solidFill>
+                <a:latin typeface="Courier" charset="0"/>
+                <a:ea typeface="Courier" charset="0"/>
+                <a:cs typeface="Courier" charset="0"/>
+              </a:rPr>
+              <a:t>def</a:t>
+            </a:r>
+            <a:r>
+              <a:rPr lang="mr-IN" sz="2000" b="1" dirty="0">
+                <a:solidFill>
+                  <a:srgbClr val="000080"/>
+                </a:solidFill>
+                <a:latin typeface="Courier" charset="0"/>
+                <a:ea typeface="Courier" charset="0"/>
+                <a:cs typeface="Courier" charset="0"/>
+              </a:rPr>
+              <a:t> </a:t>
+            </a:r>
+            <a:r>
+              <a:rPr lang="mr-IN" sz="2000" dirty="0" err="1">
+                <a:latin typeface="Courier" charset="0"/>
+                <a:ea typeface="Courier" charset="0"/>
+                <a:cs typeface="Courier" charset="0"/>
+              </a:rPr>
+              <a:t>sum</a:t>
+            </a:r>
+            <a:r>
+              <a:rPr lang="mr-IN" sz="2000" dirty="0">
+                <a:latin typeface="Courier" charset="0"/>
+                <a:ea typeface="Courier" charset="0"/>
+                <a:cs typeface="Courier" charset="0"/>
+              </a:rPr>
+              <a:t>(</a:t>
+            </a:r>
+            <a:r>
+              <a:rPr lang="mr-IN" sz="2000" dirty="0" err="1">
+                <a:latin typeface="Courier" charset="0"/>
+                <a:ea typeface="Courier" charset="0"/>
+                <a:cs typeface="Courier" charset="0"/>
+              </a:rPr>
+              <a:t>x</a:t>
+            </a:r>
+            <a:r>
+              <a:rPr lang="mr-IN" sz="2000" dirty="0">
+                <a:latin typeface="Courier" charset="0"/>
+                <a:ea typeface="Courier" charset="0"/>
+                <a:cs typeface="Courier" charset="0"/>
+              </a:rPr>
+              <a:t>: </a:t>
+            </a:r>
+            <a:r>
+              <a:rPr lang="mr-IN" sz="2000" dirty="0" err="1">
+                <a:latin typeface="Courier" charset="0"/>
+                <a:ea typeface="Courier" charset="0"/>
+                <a:cs typeface="Courier" charset="0"/>
+              </a:rPr>
+              <a:t>Int</a:t>
+            </a:r>
+            <a:r>
+              <a:rPr lang="mr-IN" sz="2000" dirty="0">
+                <a:latin typeface="Courier" charset="0"/>
+                <a:ea typeface="Courier" charset="0"/>
+                <a:cs typeface="Courier" charset="0"/>
+              </a:rPr>
+              <a:t>, </a:t>
+            </a:r>
+            <a:r>
+              <a:rPr lang="mr-IN" sz="2000" dirty="0" err="1">
+                <a:latin typeface="Courier" charset="0"/>
+                <a:ea typeface="Courier" charset="0"/>
+                <a:cs typeface="Courier" charset="0"/>
+              </a:rPr>
+              <a:t>y</a:t>
+            </a:r>
+            <a:r>
+              <a:rPr lang="mr-IN" sz="2000" dirty="0">
+                <a:latin typeface="Courier" charset="0"/>
+                <a:ea typeface="Courier" charset="0"/>
+                <a:cs typeface="Courier" charset="0"/>
+              </a:rPr>
+              <a:t>: </a:t>
+            </a:r>
+            <a:r>
+              <a:rPr lang="mr-IN" sz="2000" dirty="0" err="1">
+                <a:latin typeface="Courier" charset="0"/>
+                <a:ea typeface="Courier" charset="0"/>
+                <a:cs typeface="Courier" charset="0"/>
+              </a:rPr>
+              <a:t>Int</a:t>
+            </a:r>
+            <a:r>
+              <a:rPr lang="mr-IN" sz="2000" dirty="0">
+                <a:latin typeface="Courier" charset="0"/>
+                <a:ea typeface="Courier" charset="0"/>
+                <a:cs typeface="Courier" charset="0"/>
+              </a:rPr>
+              <a:t>, </a:t>
+            </a:r>
+            <a:r>
+              <a:rPr lang="mr-IN" sz="2000" dirty="0" err="1">
+                <a:latin typeface="Courier" charset="0"/>
+                <a:ea typeface="Courier" charset="0"/>
+                <a:cs typeface="Courier" charset="0"/>
+              </a:rPr>
+              <a:t>k</a:t>
+            </a:r>
+            <a:r>
+              <a:rPr lang="mr-IN" sz="2000" dirty="0">
+                <a:latin typeface="Courier" charset="0"/>
+                <a:ea typeface="Courier" charset="0"/>
+                <a:cs typeface="Courier" charset="0"/>
+              </a:rPr>
+              <a:t>: </a:t>
+            </a:r>
+            <a:r>
+              <a:rPr lang="mr-IN" sz="2000" dirty="0" err="1">
+                <a:latin typeface="Courier" charset="0"/>
+                <a:ea typeface="Courier" charset="0"/>
+                <a:cs typeface="Courier" charset="0"/>
+              </a:rPr>
+              <a:t>Int</a:t>
+            </a:r>
+            <a:r>
+              <a:rPr lang="mr-IN" sz="2000" dirty="0">
+                <a:latin typeface="Courier" charset="0"/>
+                <a:ea typeface="Courier" charset="0"/>
+                <a:cs typeface="Courier" charset="0"/>
+              </a:rPr>
+              <a:t> =&gt; </a:t>
+            </a:r>
+            <a:r>
+              <a:rPr lang="mr-IN" sz="2000" dirty="0" err="1">
+                <a:latin typeface="Courier" charset="0"/>
+                <a:ea typeface="Courier" charset="0"/>
+                <a:cs typeface="Courier" charset="0"/>
+              </a:rPr>
+              <a:t>Int</a:t>
+            </a:r>
+            <a:r>
+              <a:rPr lang="mr-IN" sz="2000" dirty="0">
+                <a:latin typeface="Courier" charset="0"/>
+                <a:ea typeface="Courier" charset="0"/>
+                <a:cs typeface="Courier" charset="0"/>
+              </a:rPr>
+              <a:t>): </a:t>
+            </a:r>
+            <a:r>
+              <a:rPr lang="mr-IN" sz="2000" dirty="0" err="1">
+                <a:latin typeface="Courier" charset="0"/>
+                <a:ea typeface="Courier" charset="0"/>
+                <a:cs typeface="Courier" charset="0"/>
+              </a:rPr>
+              <a:t>Int</a:t>
+            </a:r>
+            <a:r>
+              <a:rPr lang="mr-IN" sz="2000" dirty="0">
+                <a:latin typeface="Courier" charset="0"/>
+                <a:ea typeface="Courier" charset="0"/>
+                <a:cs typeface="Courier" charset="0"/>
+              </a:rPr>
+              <a:t> = </a:t>
+            </a:r>
+            <a:endParaRPr lang="en-US" sz="2000" dirty="0" smtClean="0">
+              <a:latin typeface="Courier" charset="0"/>
+              <a:ea typeface="Courier" charset="0"/>
+              <a:cs typeface="Courier" charset="0"/>
+            </a:endParaRPr>
+          </a:p>
+          <a:p>
+            <a:r>
+              <a:rPr lang="en-US" sz="2000" dirty="0">
+                <a:latin typeface="Courier" charset="0"/>
+                <a:ea typeface="Courier" charset="0"/>
+                <a:cs typeface="Courier" charset="0"/>
+              </a:rPr>
+              <a:t> </a:t>
+            </a:r>
+            <a:r>
+              <a:rPr lang="en-US" sz="2000" dirty="0" smtClean="0">
+                <a:latin typeface="Courier" charset="0"/>
+                <a:ea typeface="Courier" charset="0"/>
+                <a:cs typeface="Courier" charset="0"/>
+              </a:rPr>
+              <a:t> </a:t>
+            </a:r>
+            <a:r>
+              <a:rPr lang="mr-IN" sz="2000" dirty="0" err="1" smtClean="0">
+                <a:latin typeface="Courier" charset="0"/>
+                <a:ea typeface="Courier" charset="0"/>
+                <a:cs typeface="Courier" charset="0"/>
+              </a:rPr>
+              <a:t>k</a:t>
+            </a:r>
+            <a:r>
+              <a:rPr lang="mr-IN" sz="2000" dirty="0" smtClean="0">
+                <a:latin typeface="Courier" charset="0"/>
+                <a:ea typeface="Courier" charset="0"/>
+                <a:cs typeface="Courier" charset="0"/>
+              </a:rPr>
+              <a:t>(</a:t>
+            </a:r>
+            <a:r>
+              <a:rPr lang="mr-IN" sz="2000" dirty="0" err="1" smtClean="0">
+                <a:latin typeface="Courier" charset="0"/>
+                <a:ea typeface="Courier" charset="0"/>
+                <a:cs typeface="Courier" charset="0"/>
+              </a:rPr>
+              <a:t>x</a:t>
+            </a:r>
+            <a:r>
+              <a:rPr lang="mr-IN" sz="2000" dirty="0" smtClean="0">
+                <a:latin typeface="Courier" charset="0"/>
+                <a:ea typeface="Courier" charset="0"/>
+                <a:cs typeface="Courier" charset="0"/>
+              </a:rPr>
+              <a:t> </a:t>
+            </a:r>
+            <a:r>
+              <a:rPr lang="mr-IN" sz="2000" dirty="0">
+                <a:latin typeface="Courier" charset="0"/>
+                <a:ea typeface="Courier" charset="0"/>
+                <a:cs typeface="Courier" charset="0"/>
+              </a:rPr>
+              <a:t>+ </a:t>
+            </a:r>
+            <a:r>
+              <a:rPr lang="mr-IN" sz="2000" dirty="0" err="1">
+                <a:latin typeface="Courier" charset="0"/>
+                <a:ea typeface="Courier" charset="0"/>
+                <a:cs typeface="Courier" charset="0"/>
+              </a:rPr>
+              <a:t>y</a:t>
+            </a:r>
+            <a:r>
+              <a:rPr lang="mr-IN" sz="2000" dirty="0">
+                <a:latin typeface="Courier" charset="0"/>
+                <a:ea typeface="Courier" charset="0"/>
+                <a:cs typeface="Courier" charset="0"/>
+              </a:rPr>
+              <a:t>)</a:t>
+            </a:r>
+            <a:br>
+              <a:rPr lang="mr-IN" sz="2000" dirty="0">
+                <a:latin typeface="Courier" charset="0"/>
+                <a:ea typeface="Courier" charset="0"/>
+                <a:cs typeface="Courier" charset="0"/>
+              </a:rPr>
+            </a:br>
+            <a:r>
+              <a:rPr lang="mr-IN" sz="2000" dirty="0">
+                <a:latin typeface="Courier" charset="0"/>
+                <a:ea typeface="Courier" charset="0"/>
+                <a:cs typeface="Courier" charset="0"/>
+              </a:rPr>
+              <a:t/>
+            </a:r>
+            <a:br>
+              <a:rPr lang="mr-IN" sz="2000" dirty="0">
+                <a:latin typeface="Courier" charset="0"/>
+                <a:ea typeface="Courier" charset="0"/>
+                <a:cs typeface="Courier" charset="0"/>
+              </a:rPr>
+            </a:br>
+            <a:r>
+              <a:rPr lang="mr-IN" sz="2000" b="1" dirty="0" err="1">
+                <a:solidFill>
+                  <a:srgbClr val="000080"/>
+                </a:solidFill>
+                <a:latin typeface="Courier" charset="0"/>
+                <a:ea typeface="Courier" charset="0"/>
+                <a:cs typeface="Courier" charset="0"/>
+              </a:rPr>
+              <a:t>def</a:t>
+            </a:r>
+            <a:r>
+              <a:rPr lang="mr-IN" sz="2000" b="1" dirty="0">
+                <a:solidFill>
+                  <a:srgbClr val="000080"/>
+                </a:solidFill>
+                <a:latin typeface="Courier" charset="0"/>
+                <a:ea typeface="Courier" charset="0"/>
+                <a:cs typeface="Courier" charset="0"/>
+              </a:rPr>
+              <a:t> </a:t>
+            </a:r>
+            <a:r>
+              <a:rPr lang="mr-IN" sz="2000" dirty="0" err="1">
+                <a:latin typeface="Courier" charset="0"/>
+                <a:ea typeface="Courier" charset="0"/>
+                <a:cs typeface="Courier" charset="0"/>
+              </a:rPr>
+              <a:t>pitagoras</a:t>
+            </a:r>
+            <a:r>
+              <a:rPr lang="mr-IN" sz="2000" dirty="0">
+                <a:latin typeface="Courier" charset="0"/>
+                <a:ea typeface="Courier" charset="0"/>
+                <a:cs typeface="Courier" charset="0"/>
+              </a:rPr>
+              <a:t>(</a:t>
+            </a:r>
+            <a:r>
+              <a:rPr lang="mr-IN" sz="2000" dirty="0" err="1">
+                <a:latin typeface="Courier" charset="0"/>
+                <a:ea typeface="Courier" charset="0"/>
+                <a:cs typeface="Courier" charset="0"/>
+              </a:rPr>
+              <a:t>a</a:t>
+            </a:r>
+            <a:r>
+              <a:rPr lang="mr-IN" sz="2000" dirty="0">
+                <a:latin typeface="Courier" charset="0"/>
+                <a:ea typeface="Courier" charset="0"/>
+                <a:cs typeface="Courier" charset="0"/>
+              </a:rPr>
+              <a:t>: </a:t>
+            </a:r>
+            <a:r>
+              <a:rPr lang="mr-IN" sz="2000" dirty="0" err="1">
+                <a:latin typeface="Courier" charset="0"/>
+                <a:ea typeface="Courier" charset="0"/>
+                <a:cs typeface="Courier" charset="0"/>
+              </a:rPr>
+              <a:t>Int</a:t>
+            </a:r>
+            <a:r>
+              <a:rPr lang="mr-IN" sz="2000" dirty="0">
+                <a:latin typeface="Courier" charset="0"/>
+                <a:ea typeface="Courier" charset="0"/>
+                <a:cs typeface="Courier" charset="0"/>
+              </a:rPr>
+              <a:t>, </a:t>
+            </a:r>
+            <a:r>
+              <a:rPr lang="mr-IN" sz="2000" dirty="0" err="1">
+                <a:latin typeface="Courier" charset="0"/>
+                <a:ea typeface="Courier" charset="0"/>
+                <a:cs typeface="Courier" charset="0"/>
+              </a:rPr>
+              <a:t>b</a:t>
+            </a:r>
+            <a:r>
+              <a:rPr lang="mr-IN" sz="2000" dirty="0">
+                <a:latin typeface="Courier" charset="0"/>
+                <a:ea typeface="Courier" charset="0"/>
+                <a:cs typeface="Courier" charset="0"/>
+              </a:rPr>
+              <a:t>: </a:t>
+            </a:r>
+            <a:r>
+              <a:rPr lang="mr-IN" sz="2000" dirty="0" err="1">
+                <a:latin typeface="Courier" charset="0"/>
+                <a:ea typeface="Courier" charset="0"/>
+                <a:cs typeface="Courier" charset="0"/>
+              </a:rPr>
+              <a:t>Int</a:t>
+            </a:r>
+            <a:r>
+              <a:rPr lang="mr-IN" sz="2000" dirty="0">
+                <a:latin typeface="Courier" charset="0"/>
+                <a:ea typeface="Courier" charset="0"/>
+                <a:cs typeface="Courier" charset="0"/>
+              </a:rPr>
+              <a:t>, </a:t>
+            </a:r>
+            <a:r>
+              <a:rPr lang="mr-IN" sz="2000" dirty="0" err="1">
+                <a:latin typeface="Courier" charset="0"/>
+                <a:ea typeface="Courier" charset="0"/>
+                <a:cs typeface="Courier" charset="0"/>
+              </a:rPr>
+              <a:t>k</a:t>
+            </a:r>
+            <a:r>
+              <a:rPr lang="mr-IN" sz="2000" dirty="0">
+                <a:latin typeface="Courier" charset="0"/>
+                <a:ea typeface="Courier" charset="0"/>
+                <a:cs typeface="Courier" charset="0"/>
+              </a:rPr>
+              <a:t>: </a:t>
+            </a:r>
+            <a:r>
+              <a:rPr lang="mr-IN" sz="2000" dirty="0" err="1">
+                <a:latin typeface="Courier" charset="0"/>
+                <a:ea typeface="Courier" charset="0"/>
+                <a:cs typeface="Courier" charset="0"/>
+              </a:rPr>
+              <a:t>Int</a:t>
+            </a:r>
+            <a:r>
+              <a:rPr lang="mr-IN" sz="2000" dirty="0">
+                <a:latin typeface="Courier" charset="0"/>
+                <a:ea typeface="Courier" charset="0"/>
+                <a:cs typeface="Courier" charset="0"/>
+              </a:rPr>
+              <a:t> =&gt; </a:t>
+            </a:r>
+            <a:r>
+              <a:rPr lang="mr-IN" sz="2000" dirty="0" err="1">
+                <a:latin typeface="Courier" charset="0"/>
+                <a:ea typeface="Courier" charset="0"/>
+                <a:cs typeface="Courier" charset="0"/>
+              </a:rPr>
+              <a:t>Int</a:t>
+            </a:r>
+            <a:r>
+              <a:rPr lang="mr-IN" sz="2000" dirty="0">
+                <a:latin typeface="Courier" charset="0"/>
+                <a:ea typeface="Courier" charset="0"/>
+                <a:cs typeface="Courier" charset="0"/>
+              </a:rPr>
+              <a:t>): </a:t>
+            </a:r>
+            <a:r>
+              <a:rPr lang="mr-IN" sz="2000" dirty="0" err="1">
+                <a:latin typeface="Courier" charset="0"/>
+                <a:ea typeface="Courier" charset="0"/>
+                <a:cs typeface="Courier" charset="0"/>
+              </a:rPr>
+              <a:t>Int</a:t>
+            </a:r>
+            <a:r>
+              <a:rPr lang="mr-IN" sz="2000" dirty="0">
+                <a:latin typeface="Courier" charset="0"/>
+                <a:ea typeface="Courier" charset="0"/>
+                <a:cs typeface="Courier" charset="0"/>
+              </a:rPr>
+              <a:t> =</a:t>
+            </a:r>
+            <a:br>
+              <a:rPr lang="mr-IN" sz="2000" dirty="0">
+                <a:latin typeface="Courier" charset="0"/>
+                <a:ea typeface="Courier" charset="0"/>
+                <a:cs typeface="Courier" charset="0"/>
+              </a:rPr>
+            </a:br>
+            <a:r>
+              <a:rPr lang="mr-IN" sz="2000" dirty="0">
+                <a:latin typeface="Courier" charset="0"/>
+                <a:ea typeface="Courier" charset="0"/>
+                <a:cs typeface="Courier" charset="0"/>
+              </a:rPr>
+              <a:t>  </a:t>
+            </a:r>
+            <a:r>
+              <a:rPr lang="mr-IN" sz="2000" i="1" dirty="0" err="1">
+                <a:latin typeface="Courier" charset="0"/>
+                <a:ea typeface="Courier" charset="0"/>
+                <a:cs typeface="Courier" charset="0"/>
+              </a:rPr>
+              <a:t>square</a:t>
+            </a:r>
+            <a:r>
+              <a:rPr lang="mr-IN" sz="2000" dirty="0">
+                <a:latin typeface="Courier" charset="0"/>
+                <a:ea typeface="Courier" charset="0"/>
+                <a:cs typeface="Courier" charset="0"/>
+              </a:rPr>
+              <a:t>(</a:t>
+            </a:r>
+            <a:r>
+              <a:rPr lang="mr-IN" sz="2000" dirty="0" err="1">
+                <a:latin typeface="Courier" charset="0"/>
+                <a:ea typeface="Courier" charset="0"/>
+                <a:cs typeface="Courier" charset="0"/>
+              </a:rPr>
+              <a:t>a</a:t>
+            </a:r>
+            <a:r>
+              <a:rPr lang="mr-IN" sz="2000" dirty="0">
+                <a:latin typeface="Courier" charset="0"/>
+                <a:ea typeface="Courier" charset="0"/>
+                <a:cs typeface="Courier" charset="0"/>
+              </a:rPr>
+              <a:t>, </a:t>
+            </a:r>
+            <a:r>
+              <a:rPr lang="mr-IN" sz="2000" dirty="0" err="1">
+                <a:latin typeface="Courier" charset="0"/>
+                <a:ea typeface="Courier" charset="0"/>
+                <a:cs typeface="Courier" charset="0"/>
+              </a:rPr>
+              <a:t>aa</a:t>
+            </a:r>
+            <a:r>
+              <a:rPr lang="mr-IN" sz="2000" dirty="0">
+                <a:latin typeface="Courier" charset="0"/>
+                <a:ea typeface="Courier" charset="0"/>
+                <a:cs typeface="Courier" charset="0"/>
+              </a:rPr>
+              <a:t> =&gt;</a:t>
+            </a:r>
+            <a:br>
+              <a:rPr lang="mr-IN" sz="2000" dirty="0">
+                <a:latin typeface="Courier" charset="0"/>
+                <a:ea typeface="Courier" charset="0"/>
+                <a:cs typeface="Courier" charset="0"/>
+              </a:rPr>
+            </a:br>
+            <a:r>
+              <a:rPr lang="mr-IN" sz="2000" dirty="0">
+                <a:latin typeface="Courier" charset="0"/>
+                <a:ea typeface="Courier" charset="0"/>
+                <a:cs typeface="Courier" charset="0"/>
+              </a:rPr>
+              <a:t>    </a:t>
+            </a:r>
+            <a:r>
+              <a:rPr lang="mr-IN" sz="2000" i="1" dirty="0" err="1">
+                <a:latin typeface="Courier" charset="0"/>
+                <a:ea typeface="Courier" charset="0"/>
+                <a:cs typeface="Courier" charset="0"/>
+              </a:rPr>
+              <a:t>square</a:t>
+            </a:r>
+            <a:r>
+              <a:rPr lang="mr-IN" sz="2000" dirty="0">
+                <a:latin typeface="Courier" charset="0"/>
+                <a:ea typeface="Courier" charset="0"/>
+                <a:cs typeface="Courier" charset="0"/>
+              </a:rPr>
+              <a:t>(</a:t>
+            </a:r>
+            <a:r>
+              <a:rPr lang="mr-IN" sz="2000" dirty="0" err="1">
+                <a:latin typeface="Courier" charset="0"/>
+                <a:ea typeface="Courier" charset="0"/>
+                <a:cs typeface="Courier" charset="0"/>
+              </a:rPr>
+              <a:t>b</a:t>
+            </a:r>
+            <a:r>
+              <a:rPr lang="mr-IN" sz="2000" dirty="0">
+                <a:latin typeface="Courier" charset="0"/>
+                <a:ea typeface="Courier" charset="0"/>
+                <a:cs typeface="Courier" charset="0"/>
+              </a:rPr>
+              <a:t>, </a:t>
+            </a:r>
+            <a:r>
+              <a:rPr lang="mr-IN" sz="2000" dirty="0" err="1">
+                <a:latin typeface="Courier" charset="0"/>
+                <a:ea typeface="Courier" charset="0"/>
+                <a:cs typeface="Courier" charset="0"/>
+              </a:rPr>
+              <a:t>bb</a:t>
+            </a:r>
+            <a:r>
+              <a:rPr lang="mr-IN" sz="2000" dirty="0">
+                <a:latin typeface="Courier" charset="0"/>
+                <a:ea typeface="Courier" charset="0"/>
+                <a:cs typeface="Courier" charset="0"/>
+              </a:rPr>
+              <a:t> =&gt;</a:t>
+            </a:r>
+            <a:br>
+              <a:rPr lang="mr-IN" sz="2000" dirty="0">
+                <a:latin typeface="Courier" charset="0"/>
+                <a:ea typeface="Courier" charset="0"/>
+                <a:cs typeface="Courier" charset="0"/>
+              </a:rPr>
+            </a:br>
+            <a:r>
+              <a:rPr lang="mr-IN" sz="2000" dirty="0">
+                <a:latin typeface="Courier" charset="0"/>
+                <a:ea typeface="Courier" charset="0"/>
+                <a:cs typeface="Courier" charset="0"/>
+              </a:rPr>
+              <a:t>      </a:t>
+            </a:r>
+            <a:r>
+              <a:rPr lang="mr-IN" sz="2000" i="1" dirty="0" err="1">
+                <a:latin typeface="Courier" charset="0"/>
+                <a:ea typeface="Courier" charset="0"/>
+                <a:cs typeface="Courier" charset="0"/>
+              </a:rPr>
+              <a:t>sum</a:t>
+            </a:r>
+            <a:r>
+              <a:rPr lang="mr-IN" sz="2000" dirty="0">
+                <a:latin typeface="Courier" charset="0"/>
+                <a:ea typeface="Courier" charset="0"/>
+                <a:cs typeface="Courier" charset="0"/>
+              </a:rPr>
+              <a:t>(</a:t>
+            </a:r>
+            <a:r>
+              <a:rPr lang="mr-IN" sz="2000" dirty="0" err="1">
+                <a:latin typeface="Courier" charset="0"/>
+                <a:ea typeface="Courier" charset="0"/>
+                <a:cs typeface="Courier" charset="0"/>
+              </a:rPr>
+              <a:t>aa</a:t>
+            </a:r>
+            <a:r>
+              <a:rPr lang="mr-IN" sz="2000" dirty="0">
+                <a:latin typeface="Courier" charset="0"/>
+                <a:ea typeface="Courier" charset="0"/>
+                <a:cs typeface="Courier" charset="0"/>
+              </a:rPr>
+              <a:t>, </a:t>
+            </a:r>
+            <a:r>
+              <a:rPr lang="mr-IN" sz="2000" dirty="0" err="1">
+                <a:latin typeface="Courier" charset="0"/>
+                <a:ea typeface="Courier" charset="0"/>
+                <a:cs typeface="Courier" charset="0"/>
+              </a:rPr>
+              <a:t>bb</a:t>
+            </a:r>
+            <a:r>
+              <a:rPr lang="mr-IN" sz="2000" dirty="0">
+                <a:latin typeface="Courier" charset="0"/>
+                <a:ea typeface="Courier" charset="0"/>
+                <a:cs typeface="Courier" charset="0"/>
+              </a:rPr>
+              <a:t>, </a:t>
+            </a:r>
+            <a:r>
+              <a:rPr lang="mr-IN" sz="2000" dirty="0" err="1">
+                <a:latin typeface="Courier" charset="0"/>
+                <a:ea typeface="Courier" charset="0"/>
+                <a:cs typeface="Courier" charset="0"/>
+              </a:rPr>
+              <a:t>k</a:t>
+            </a:r>
+            <a:r>
+              <a:rPr lang="mr-IN" sz="2000" dirty="0">
+                <a:latin typeface="Courier" charset="0"/>
+                <a:ea typeface="Courier" charset="0"/>
+                <a:cs typeface="Courier" charset="0"/>
+              </a:rPr>
+              <a:t>)</a:t>
+            </a:r>
+            <a:br>
+              <a:rPr lang="mr-IN" sz="2000" dirty="0">
+                <a:latin typeface="Courier" charset="0"/>
+                <a:ea typeface="Courier" charset="0"/>
+                <a:cs typeface="Courier" charset="0"/>
+              </a:rPr>
+            </a:br>
+            <a:r>
+              <a:rPr lang="mr-IN" sz="2000" dirty="0">
+                <a:latin typeface="Courier" charset="0"/>
+                <a:ea typeface="Courier" charset="0"/>
+                <a:cs typeface="Courier" charset="0"/>
+              </a:rPr>
+              <a:t>    )</a:t>
+            </a:r>
+            <a:br>
+              <a:rPr lang="mr-IN" sz="2000" dirty="0">
+                <a:latin typeface="Courier" charset="0"/>
+                <a:ea typeface="Courier" charset="0"/>
+                <a:cs typeface="Courier" charset="0"/>
+              </a:rPr>
+            </a:br>
+            <a:r>
+              <a:rPr lang="mr-IN" sz="2000" dirty="0">
+                <a:latin typeface="Courier" charset="0"/>
+                <a:ea typeface="Courier" charset="0"/>
+                <a:cs typeface="Courier" charset="0"/>
+              </a:rPr>
+              <a:t>  </a:t>
+            </a:r>
+            <a:r>
+              <a:rPr lang="mr-IN" sz="2000" dirty="0" smtClean="0">
+                <a:latin typeface="Courier" charset="0"/>
+                <a:ea typeface="Courier" charset="0"/>
+                <a:cs typeface="Courier" charset="0"/>
+              </a:rPr>
+              <a:t>)</a:t>
+            </a:r>
+            <a:endParaRPr lang="en-US" sz="2000" dirty="0" smtClean="0">
+              <a:latin typeface="Courier" charset="0"/>
+              <a:ea typeface="Courier" charset="0"/>
+              <a:cs typeface="Courier" charset="0"/>
+            </a:endParaRPr>
+          </a:p>
+          <a:p>
+            <a:endParaRPr lang="en-US" sz="2000" dirty="0">
+              <a:latin typeface="Courier" charset="0"/>
+              <a:ea typeface="Courier" charset="0"/>
+              <a:cs typeface="Courier" charset="0"/>
+            </a:endParaRPr>
+          </a:p>
+        </p:txBody>
+      </p:sp>
+    </p:spTree>
+    <p:extLst>
+      <p:ext uri="{BB962C8B-B14F-4D97-AF65-F5344CB8AC3E}">
+        <p14:creationId xmlns:p14="http://schemas.microsoft.com/office/powerpoint/2010/main" val="1795022360"/>
+      </p:ext>
+    </p:extLst>
+  </p:cSld>
+  <p:clrMapOvr>
+    <a:masterClrMapping/>
+  </p:clrMapOvr>
+  <p:timing>
+    <p:tnLst>
+      <p:par>
+        <p:cTn id="1" dur="indefinite" restart="never" nodeType="tmRoot"/>
+      </p:par>
+    </p:tnLst>
+  </p:timing>
+</p:sld>
+</file>
+
+<file path=ppt/slides/slide11.xml><?xml version="1.0" encoding="utf-8"?>
+<p:sld xmlns:a="http://schemas.openxmlformats.org/drawingml/2006/main" xmlns:r="http://schemas.openxmlformats.org/officeDocument/2006/relationships" xmlns:p="http://schemas.openxmlformats.org/presentationml/2006/main">
+  <p:cSld>
+    <p:spTree>
+      <p:nvGrpSpPr>
+        <p:cNvPr id="1" name=""/>
+        <p:cNvGrpSpPr/>
+        <p:nvPr/>
+      </p:nvGrpSpPr>
+      <p:grpSpPr>
+        <a:xfrm>
+          <a:off x="0" y="0"/>
+          <a:ext cx="0" cy="0"/>
+          <a:chOff x="0" y="0"/>
+          <a:chExt cx="0" cy="0"/>
+        </a:xfrm>
+      </p:grpSpPr>
+      <p:sp>
+        <p:nvSpPr>
+          <p:cNvPr id="2" name="Title 1"/>
+          <p:cNvSpPr>
+            <a:spLocks noGrp="1"/>
+          </p:cNvSpPr>
+          <p:nvPr>
+            <p:ph type="title"/>
+          </p:nvPr>
+        </p:nvSpPr>
+        <p:spPr>
+          <a:xfrm>
+            <a:off x="596901" y="506124"/>
+            <a:ext cx="10510838" cy="431515"/>
+          </a:xfrm>
+        </p:spPr>
+        <p:txBody>
+          <a:bodyPr/>
+          <a:lstStyle/>
+          <a:p>
+            <a:r>
               <a:rPr lang="en-GB" dirty="0"/>
               <a:t>What is a continuation?</a:t>
             </a:r>
@@ -5452,7 +6683,7 @@
 </p:sld>
 </file>
 
-<file path=ppt/slides/slide11.xml><?xml version="1.0" encoding="utf-8"?>
+<file path=ppt/slides/slide12.xml><?xml version="1.0" encoding="utf-8"?>
 <p:sld xmlns:a="http://schemas.openxmlformats.org/drawingml/2006/main" xmlns:r="http://schemas.openxmlformats.org/officeDocument/2006/relationships" xmlns:p="http://schemas.openxmlformats.org/presentationml/2006/main">
   <p:cSld name="Slide84">
     <p:spTree>
@@ -5648,10 +6879,17 @@
   <p:clrMapOvr>
     <a:masterClrMapping/>
   </p:clrMapOvr>
+  <p:timing>
+    <p:tnLst>
+      <p:par>
+        <p:cTn id="1" dur="indefinite" restart="never" nodeType="tmRoot"/>
+      </p:par>
+    </p:tnLst>
+  </p:timing>
 </p:sld>
 </file>
 
-<file path=ppt/slides/slide12.xml><?xml version="1.0" encoding="utf-8"?>
+<file path=ppt/slides/slide13.xml><?xml version="1.0" encoding="utf-8"?>
 <p:sld xmlns:a="http://schemas.openxmlformats.org/drawingml/2006/main" xmlns:r="http://schemas.openxmlformats.org/officeDocument/2006/relationships" xmlns:p="http://schemas.openxmlformats.org/presentationml/2006/main">
   <p:cSld name="Slide25">
     <p:spTree>
@@ -5862,7 +7100,7 @@
 </p:sld>
 </file>
 
-<file path=ppt/slides/slide13.xml><?xml version="1.0" encoding="utf-8"?>
+<file path=ppt/slides/slide14.xml><?xml version="1.0" encoding="utf-8"?>
 <p:sld xmlns:a="http://schemas.openxmlformats.org/drawingml/2006/main" xmlns:r="http://schemas.openxmlformats.org/officeDocument/2006/relationships" xmlns:p="http://schemas.openxmlformats.org/presentationml/2006/main">
   <p:cSld>
     <p:spTree>
@@ -6040,6 +7278,13 @@
   <p:clrMapOvr>
     <a:masterClrMapping/>
   </p:clrMapOvr>
+  <p:timing>
+    <p:tnLst>
+      <p:par>
+        <p:cTn id="1" dur="indefinite" restart="never" nodeType="tmRoot"/>
+      </p:par>
+    </p:tnLst>
+  </p:timing>
 </p:sld>
 </file>
 
@@ -6114,6 +7359,13 @@
   <p:clrMapOvr>
     <a:masterClrMapping/>
   </p:clrMapOvr>
+  <p:timing>
+    <p:tnLst>
+      <p:par>
+        <p:cTn id="1" dur="indefinite" restart="never" nodeType="tmRoot"/>
+      </p:par>
+    </p:tnLst>
+  </p:timing>
 </p:sld>
 </file>
 
@@ -9723,7 +10975,7 @@
           <a:p>
             <a:r>
               <a:rPr lang="en-US" dirty="0" smtClean="0"/>
-              <a:t>CPS: Continuation Passing Style.</a:t>
+              <a:t>Direct style</a:t>
             </a:r>
             <a:endParaRPr lang="en-US" dirty="0"/>
           </a:p>
@@ -9754,16 +11006,46 @@
           </a:p>
         </p:txBody>
       </p:sp>
+      <p:pic>
+        <p:nvPicPr>
+          <p:cNvPr id="3" name="Picture 2"/>
+          <p:cNvPicPr>
+            <a:picLocks noChangeAspect="1"/>
+          </p:cNvPicPr>
+          <p:nvPr/>
+        </p:nvPicPr>
+        <p:blipFill>
+          <a:blip r:embed="rId3">
+            <a:extLst>
+              <a:ext uri="{28A0092B-C50C-407E-A947-70E740481C1C}">
+                <a14:useLocalDpi xmlns:a14="http://schemas.microsoft.com/office/drawing/2010/main" val="0"/>
+              </a:ext>
+            </a:extLst>
+          </a:blip>
+          <a:stretch>
+            <a:fillRect/>
+          </a:stretch>
+        </p:blipFill>
+        <p:spPr>
+          <a:xfrm>
+            <a:off x="8580438" y="139130"/>
+            <a:ext cx="3124200" cy="2524125"/>
+          </a:xfrm>
+          <a:prstGeom prst="rect">
+            <a:avLst/>
+          </a:prstGeom>
+        </p:spPr>
+      </p:pic>
       <p:sp>
         <p:nvSpPr>
-          <p:cNvPr id="10" name="TextBox 9"/>
+          <p:cNvPr id="5" name="TextBox 4"/>
           <p:cNvSpPr txBox="1"/>
           <p:nvPr/>
         </p:nvSpPr>
         <p:spPr>
           <a:xfrm>
-            <a:off x="648000" y="1872000"/>
-            <a:ext cx="10510838" cy="5709255"/>
+            <a:off x="2345893" y="1900719"/>
+            <a:ext cx="6234545" cy="3477875"/>
           </a:xfrm>
           <a:prstGeom prst="rect">
             <a:avLst/>
@@ -9771,19 +11053,205 @@
           <a:noFill/>
         </p:spPr>
         <p:txBody>
-          <a:bodyPr wrap="square" tIns="0" rtlCol="0">
+          <a:bodyPr wrap="square" rtlCol="0">
             <a:spAutoFit/>
           </a:bodyPr>
           <a:lstStyle/>
           <a:p>
-            <a:endParaRPr lang="en-US" dirty="0" smtClean="0">
+            <a:r>
+              <a:rPr lang="en-US" sz="2000" b="1" dirty="0" err="1">
+                <a:solidFill>
+                  <a:srgbClr val="000080"/>
+                </a:solidFill>
+                <a:latin typeface="Courier" charset="0"/>
+                <a:ea typeface="Courier" charset="0"/>
+                <a:cs typeface="Courier" charset="0"/>
+              </a:rPr>
+              <a:t>def</a:t>
+            </a:r>
+            <a:r>
+              <a:rPr lang="en-US" sz="2000" b="1" dirty="0">
+                <a:solidFill>
+                  <a:srgbClr val="000080"/>
+                </a:solidFill>
+                <a:latin typeface="Courier" charset="0"/>
+                <a:ea typeface="Courier" charset="0"/>
+                <a:cs typeface="Courier" charset="0"/>
+              </a:rPr>
+              <a:t> </a:t>
+            </a:r>
+            <a:r>
+              <a:rPr lang="en-US" sz="2000" dirty="0">
+                <a:latin typeface="Courier" charset="0"/>
+                <a:ea typeface="Courier" charset="0"/>
+                <a:cs typeface="Courier" charset="0"/>
+              </a:rPr>
+              <a:t>square(x: </a:t>
+            </a:r>
+            <a:r>
+              <a:rPr lang="en-US" sz="2000" dirty="0" err="1">
+                <a:latin typeface="Courier" charset="0"/>
+                <a:ea typeface="Courier" charset="0"/>
+                <a:cs typeface="Courier" charset="0"/>
+              </a:rPr>
+              <a:t>Int</a:t>
+            </a:r>
+            <a:r>
+              <a:rPr lang="en-US" sz="2000" dirty="0">
+                <a:latin typeface="Courier" charset="0"/>
+                <a:ea typeface="Courier" charset="0"/>
+                <a:cs typeface="Courier" charset="0"/>
+              </a:rPr>
+              <a:t>): </a:t>
+            </a:r>
+            <a:r>
+              <a:rPr lang="en-US" sz="2000" dirty="0" err="1">
+                <a:latin typeface="Courier" charset="0"/>
+                <a:ea typeface="Courier" charset="0"/>
+                <a:cs typeface="Courier" charset="0"/>
+              </a:rPr>
+              <a:t>Int</a:t>
+            </a:r>
+            <a:r>
+              <a:rPr lang="en-US" sz="2000" dirty="0">
+                <a:latin typeface="Courier" charset="0"/>
+                <a:ea typeface="Courier" charset="0"/>
+                <a:cs typeface="Courier" charset="0"/>
+              </a:rPr>
+              <a:t> = </a:t>
+            </a:r>
+            <a:endParaRPr lang="en-US" sz="2000" dirty="0" smtClean="0">
               <a:latin typeface="Courier" charset="0"/>
               <a:ea typeface="Courier" charset="0"/>
               <a:cs typeface="Courier" charset="0"/>
             </a:endParaRPr>
           </a:p>
           <a:p>
-            <a:endParaRPr lang="en-US" dirty="0" smtClean="0">
+            <a:r>
+              <a:rPr lang="en-US" sz="2000" dirty="0">
+                <a:latin typeface="Courier" charset="0"/>
+                <a:ea typeface="Courier" charset="0"/>
+                <a:cs typeface="Courier" charset="0"/>
+              </a:rPr>
+              <a:t> </a:t>
+            </a:r>
+            <a:r>
+              <a:rPr lang="en-US" sz="2000" dirty="0" smtClean="0">
+                <a:latin typeface="Courier" charset="0"/>
+                <a:ea typeface="Courier" charset="0"/>
+                <a:cs typeface="Courier" charset="0"/>
+              </a:rPr>
+              <a:t> x </a:t>
+            </a:r>
+            <a:r>
+              <a:rPr lang="en-US" sz="2000" dirty="0">
+                <a:latin typeface="Courier" charset="0"/>
+                <a:ea typeface="Courier" charset="0"/>
+                <a:cs typeface="Courier" charset="0"/>
+              </a:rPr>
+              <a:t>* x</a:t>
+            </a:r>
+            <a:br>
+              <a:rPr lang="en-US" sz="2000" dirty="0">
+                <a:latin typeface="Courier" charset="0"/>
+                <a:ea typeface="Courier" charset="0"/>
+                <a:cs typeface="Courier" charset="0"/>
+              </a:rPr>
+            </a:br>
+            <a:r>
+              <a:rPr lang="en-US" sz="2000" dirty="0">
+                <a:latin typeface="Courier" charset="0"/>
+                <a:ea typeface="Courier" charset="0"/>
+                <a:cs typeface="Courier" charset="0"/>
+              </a:rPr>
+              <a:t/>
+            </a:r>
+            <a:br>
+              <a:rPr lang="en-US" sz="2000" dirty="0">
+                <a:latin typeface="Courier" charset="0"/>
+                <a:ea typeface="Courier" charset="0"/>
+                <a:cs typeface="Courier" charset="0"/>
+              </a:rPr>
+            </a:br>
+            <a:r>
+              <a:rPr lang="en-US" sz="2000" b="1" dirty="0" err="1">
+                <a:solidFill>
+                  <a:srgbClr val="000080"/>
+                </a:solidFill>
+                <a:latin typeface="Courier" charset="0"/>
+                <a:ea typeface="Courier" charset="0"/>
+                <a:cs typeface="Courier" charset="0"/>
+              </a:rPr>
+              <a:t>def</a:t>
+            </a:r>
+            <a:r>
+              <a:rPr lang="en-US" sz="2000" b="1" dirty="0">
+                <a:solidFill>
+                  <a:srgbClr val="000080"/>
+                </a:solidFill>
+                <a:latin typeface="Courier" charset="0"/>
+                <a:ea typeface="Courier" charset="0"/>
+                <a:cs typeface="Courier" charset="0"/>
+              </a:rPr>
+              <a:t> </a:t>
+            </a:r>
+            <a:r>
+              <a:rPr lang="en-US" sz="2000" dirty="0">
+                <a:latin typeface="Courier" charset="0"/>
+                <a:ea typeface="Courier" charset="0"/>
+                <a:cs typeface="Courier" charset="0"/>
+              </a:rPr>
+              <a:t>sum(x: </a:t>
+            </a:r>
+            <a:r>
+              <a:rPr lang="en-US" sz="2000" dirty="0" err="1">
+                <a:latin typeface="Courier" charset="0"/>
+                <a:ea typeface="Courier" charset="0"/>
+                <a:cs typeface="Courier" charset="0"/>
+              </a:rPr>
+              <a:t>Int</a:t>
+            </a:r>
+            <a:r>
+              <a:rPr lang="en-US" sz="2000" dirty="0">
+                <a:latin typeface="Courier" charset="0"/>
+                <a:ea typeface="Courier" charset="0"/>
+                <a:cs typeface="Courier" charset="0"/>
+              </a:rPr>
+              <a:t>, y: </a:t>
+            </a:r>
+            <a:r>
+              <a:rPr lang="en-US" sz="2000" dirty="0" err="1">
+                <a:latin typeface="Courier" charset="0"/>
+                <a:ea typeface="Courier" charset="0"/>
+                <a:cs typeface="Courier" charset="0"/>
+              </a:rPr>
+              <a:t>Int</a:t>
+            </a:r>
+            <a:r>
+              <a:rPr lang="en-US" sz="2000" dirty="0">
+                <a:latin typeface="Courier" charset="0"/>
+                <a:ea typeface="Courier" charset="0"/>
+                <a:cs typeface="Courier" charset="0"/>
+              </a:rPr>
+              <a:t>): </a:t>
+            </a:r>
+            <a:r>
+              <a:rPr lang="en-US" sz="2000" dirty="0" err="1">
+                <a:latin typeface="Courier" charset="0"/>
+                <a:ea typeface="Courier" charset="0"/>
+                <a:cs typeface="Courier" charset="0"/>
+              </a:rPr>
+              <a:t>Int</a:t>
+            </a:r>
+            <a:r>
+              <a:rPr lang="en-US" sz="2000" dirty="0">
+                <a:latin typeface="Courier" charset="0"/>
+                <a:ea typeface="Courier" charset="0"/>
+                <a:cs typeface="Courier" charset="0"/>
+              </a:rPr>
+              <a:t> = </a:t>
+            </a:r>
+            <a:endParaRPr lang="en-US" sz="2000" dirty="0" smtClean="0">
               <a:latin typeface="Courier" charset="0"/>
               <a:ea typeface="Courier" charset="0"/>
               <a:cs typeface="Courier" charset="0"/>
@@ -9804,409 +11272,18 @@
                 <a:ea typeface="Courier" charset="0"/>
                 <a:cs typeface="Courier" charset="0"/>
               </a:rPr>
-              <a:t>      </a:t>
-            </a:r>
-            <a:r>
-              <a:rPr lang="mr-IN" sz="2000" i="1" dirty="0" err="1" smtClean="0">
-                <a:solidFill>
-                  <a:srgbClr val="660E7A"/>
-                </a:solidFill>
-                <a:latin typeface="Courier" charset="0"/>
-                <a:ea typeface="Courier" charset="0"/>
-                <a:cs typeface="Courier" charset="0"/>
-              </a:rPr>
-              <a:t>k</a:t>
-            </a:r>
-            <a:r>
-              <a:rPr lang="mr-IN" sz="2000" dirty="0" smtClean="0">
-                <a:latin typeface="Courier" charset="0"/>
-                <a:ea typeface="Courier" charset="0"/>
-                <a:cs typeface="Courier" charset="0"/>
-              </a:rPr>
-              <a:t>(</a:t>
-            </a:r>
-            <a:r>
-              <a:rPr lang="mr-IN" sz="2000" i="1" dirty="0" err="1" smtClean="0">
-                <a:solidFill>
-                  <a:srgbClr val="660E7A"/>
-                </a:solidFill>
-                <a:latin typeface="Courier" charset="0"/>
-                <a:ea typeface="Courier" charset="0"/>
-                <a:cs typeface="Courier" charset="0"/>
-              </a:rPr>
-              <a:t>a</a:t>
-            </a:r>
-            <a:r>
-              <a:rPr lang="en-US" sz="2000" i="1" dirty="0" smtClean="0">
-                <a:solidFill>
-                  <a:srgbClr val="660E7A"/>
-                </a:solidFill>
-                <a:latin typeface="Courier" charset="0"/>
-                <a:ea typeface="Courier" charset="0"/>
-                <a:cs typeface="Courier" charset="0"/>
-              </a:rPr>
-              <a:t>)</a:t>
-            </a:r>
-            <a:r>
-              <a:rPr lang="en-US" sz="2000" dirty="0" smtClean="0">
-                <a:latin typeface="Courier" charset="0"/>
-                <a:ea typeface="Courier" charset="0"/>
-                <a:cs typeface="Courier" charset="0"/>
-              </a:rPr>
-              <a:t> </a:t>
-            </a:r>
-            <a:endParaRPr lang="en-US" sz="2000" dirty="0" smtClean="0">
-              <a:solidFill>
-                <a:srgbClr val="0000FF"/>
-              </a:solidFill>
-              <a:latin typeface="Courier" charset="0"/>
-              <a:ea typeface="Courier" charset="0"/>
-              <a:cs typeface="Courier" charset="0"/>
-            </a:endParaRPr>
-          </a:p>
-          <a:p>
-            <a:endParaRPr lang="en-US" sz="2000" dirty="0">
-              <a:solidFill>
-                <a:srgbClr val="0000FF"/>
-              </a:solidFill>
-              <a:latin typeface="Courier" charset="0"/>
-              <a:ea typeface="Courier" charset="0"/>
-              <a:cs typeface="Courier" charset="0"/>
-            </a:endParaRPr>
-          </a:p>
-          <a:p>
-            <a:endParaRPr lang="en-US" sz="2000" dirty="0" smtClean="0">
-              <a:solidFill>
-                <a:srgbClr val="0000FF"/>
-              </a:solidFill>
-              <a:latin typeface="Courier" charset="0"/>
-              <a:ea typeface="Courier" charset="0"/>
-              <a:cs typeface="Courier" charset="0"/>
-            </a:endParaRPr>
-          </a:p>
-          <a:p>
-            <a:r>
-              <a:rPr lang="mr-IN" sz="2000" b="1" dirty="0" err="1">
-                <a:solidFill>
-                  <a:srgbClr val="000080"/>
-                </a:solidFill>
-                <a:latin typeface="Courier" charset="0"/>
-                <a:ea typeface="Courier" charset="0"/>
-                <a:cs typeface="Courier" charset="0"/>
-              </a:rPr>
-              <a:t>val</a:t>
-            </a:r>
-            <a:r>
-              <a:rPr lang="mr-IN" sz="2000" b="1" dirty="0">
-                <a:solidFill>
-                  <a:srgbClr val="000080"/>
-                </a:solidFill>
-                <a:latin typeface="Courier" charset="0"/>
-                <a:ea typeface="Courier" charset="0"/>
-                <a:cs typeface="Courier" charset="0"/>
-              </a:rPr>
-              <a:t> </a:t>
-            </a:r>
-            <a:r>
-              <a:rPr lang="mr-IN" sz="2000" i="1" dirty="0" err="1">
-                <a:solidFill>
-                  <a:srgbClr val="660E7A"/>
-                </a:solidFill>
-                <a:latin typeface="Courier" charset="0"/>
-                <a:ea typeface="Courier" charset="0"/>
-                <a:cs typeface="Courier" charset="0"/>
-              </a:rPr>
-              <a:t>a</a:t>
-            </a:r>
-            <a:r>
-              <a:rPr lang="mr-IN" sz="2000" i="1" dirty="0">
-                <a:solidFill>
-                  <a:srgbClr val="660E7A"/>
-                </a:solidFill>
-                <a:latin typeface="Courier" charset="0"/>
-                <a:ea typeface="Courier" charset="0"/>
-                <a:cs typeface="Courier" charset="0"/>
-              </a:rPr>
-              <a:t> </a:t>
-            </a:r>
-            <a:r>
-              <a:rPr lang="en-US" sz="2000" i="1" dirty="0" smtClean="0">
-                <a:solidFill>
-                  <a:srgbClr val="660E7A"/>
-                </a:solidFill>
-                <a:latin typeface="Courier" charset="0"/>
-                <a:ea typeface="Courier" charset="0"/>
-                <a:cs typeface="Courier" charset="0"/>
-              </a:rPr>
-              <a:t> </a:t>
-            </a:r>
-            <a:r>
-              <a:rPr lang="mr-IN" sz="2000" dirty="0" smtClean="0">
-                <a:latin typeface="Courier" charset="0"/>
-                <a:ea typeface="Courier" charset="0"/>
-                <a:cs typeface="Courier" charset="0"/>
-              </a:rPr>
-              <a:t>= </a:t>
-            </a:r>
-            <a:r>
-              <a:rPr lang="mr-IN" sz="2000" dirty="0">
-                <a:solidFill>
-                  <a:srgbClr val="0000FF"/>
-                </a:solidFill>
-                <a:latin typeface="Courier" charset="0"/>
-                <a:ea typeface="Courier" charset="0"/>
-                <a:cs typeface="Courier" charset="0"/>
-              </a:rPr>
-              <a:t>4</a:t>
+              <a:t> x </a:t>
+            </a:r>
+            <a:r>
+              <a:rPr lang="en-US" sz="2000" dirty="0">
+                <a:latin typeface="Courier" charset="0"/>
+                <a:ea typeface="Courier" charset="0"/>
+                <a:cs typeface="Courier" charset="0"/>
+              </a:rPr>
+              <a:t>+ y</a:t>
             </a:r>
             <a:br>
-              <a:rPr lang="mr-IN" sz="2000" dirty="0">
-                <a:solidFill>
-                  <a:srgbClr val="0000FF"/>
-                </a:solidFill>
-                <a:latin typeface="Courier" charset="0"/>
-                <a:ea typeface="Courier" charset="0"/>
-                <a:cs typeface="Courier" charset="0"/>
-              </a:rPr>
-            </a:br>
-            <a:r>
-              <a:rPr lang="mr-IN" sz="2000" b="1" dirty="0" err="1">
-                <a:solidFill>
-                  <a:srgbClr val="000080"/>
-                </a:solidFill>
-                <a:latin typeface="Courier" charset="0"/>
-                <a:ea typeface="Courier" charset="0"/>
-                <a:cs typeface="Courier" charset="0"/>
-              </a:rPr>
-              <a:t>val</a:t>
-            </a:r>
-            <a:r>
-              <a:rPr lang="mr-IN" sz="2000" b="1" dirty="0">
-                <a:solidFill>
-                  <a:srgbClr val="000080"/>
-                </a:solidFill>
-                <a:latin typeface="Courier" charset="0"/>
-                <a:ea typeface="Courier" charset="0"/>
-                <a:cs typeface="Courier" charset="0"/>
-              </a:rPr>
-              <a:t> </a:t>
-            </a:r>
-            <a:r>
-              <a:rPr lang="mr-IN" sz="2000" i="1" dirty="0">
-                <a:solidFill>
-                  <a:srgbClr val="660E7A"/>
-                </a:solidFill>
-                <a:latin typeface="Courier" charset="0"/>
-                <a:ea typeface="Courier" charset="0"/>
-                <a:cs typeface="Courier" charset="0"/>
-              </a:rPr>
-              <a:t>k1 </a:t>
-            </a:r>
-            <a:r>
-              <a:rPr lang="mr-IN" sz="2000" dirty="0">
-                <a:latin typeface="Courier" charset="0"/>
-                <a:ea typeface="Courier" charset="0"/>
-                <a:cs typeface="Courier" charset="0"/>
-              </a:rPr>
-              <a:t>= (</a:t>
-            </a:r>
-            <a:r>
-              <a:rPr lang="mr-IN" sz="2000" dirty="0" err="1">
-                <a:latin typeface="Courier" charset="0"/>
-                <a:ea typeface="Courier" charset="0"/>
-                <a:cs typeface="Courier" charset="0"/>
-              </a:rPr>
-              <a:t>x</a:t>
-            </a:r>
-            <a:r>
-              <a:rPr lang="mr-IN" sz="2000" dirty="0">
-                <a:latin typeface="Courier" charset="0"/>
-                <a:ea typeface="Courier" charset="0"/>
-                <a:cs typeface="Courier" charset="0"/>
-              </a:rPr>
-              <a:t>: </a:t>
-            </a:r>
-            <a:r>
-              <a:rPr lang="mr-IN" sz="2000" dirty="0" err="1">
-                <a:latin typeface="Courier" charset="0"/>
-                <a:ea typeface="Courier" charset="0"/>
-                <a:cs typeface="Courier" charset="0"/>
-              </a:rPr>
-              <a:t>Int</a:t>
-            </a:r>
-            <a:r>
-              <a:rPr lang="mr-IN" sz="2000" dirty="0">
-                <a:latin typeface="Courier" charset="0"/>
-                <a:ea typeface="Courier" charset="0"/>
-                <a:cs typeface="Courier" charset="0"/>
-              </a:rPr>
-              <a:t>) =&gt; </a:t>
-            </a:r>
-            <a:r>
-              <a:rPr lang="mr-IN" sz="2000" dirty="0" err="1">
-                <a:latin typeface="Courier" charset="0"/>
-                <a:ea typeface="Courier" charset="0"/>
-                <a:cs typeface="Courier" charset="0"/>
-              </a:rPr>
-              <a:t>x</a:t>
-            </a:r>
-            <a:r>
-              <a:rPr lang="mr-IN" sz="2000" dirty="0">
-                <a:latin typeface="Courier" charset="0"/>
-                <a:ea typeface="Courier" charset="0"/>
-                <a:cs typeface="Courier" charset="0"/>
-              </a:rPr>
-              <a:t> * </a:t>
-            </a:r>
-            <a:r>
-              <a:rPr lang="mr-IN" sz="2000" dirty="0" smtClean="0">
-                <a:solidFill>
-                  <a:srgbClr val="0000FF"/>
-                </a:solidFill>
-                <a:latin typeface="Courier" charset="0"/>
-                <a:ea typeface="Courier" charset="0"/>
-                <a:cs typeface="Courier" charset="0"/>
-              </a:rPr>
-              <a:t>2</a:t>
-            </a:r>
-            <a:endParaRPr lang="en-US" sz="2000" dirty="0" smtClean="0">
-              <a:solidFill>
-                <a:srgbClr val="0000FF"/>
-              </a:solidFill>
-              <a:latin typeface="Courier" charset="0"/>
-              <a:ea typeface="Courier" charset="0"/>
-              <a:cs typeface="Courier" charset="0"/>
-            </a:endParaRPr>
-          </a:p>
-          <a:p>
-            <a:endParaRPr lang="en-US" sz="2000" dirty="0">
-              <a:solidFill>
-                <a:srgbClr val="0000FF"/>
-              </a:solidFill>
-              <a:latin typeface="Courier" charset="0"/>
-              <a:ea typeface="Courier" charset="0"/>
-              <a:cs typeface="Courier" charset="0"/>
-            </a:endParaRPr>
-          </a:p>
-          <a:p>
-            <a:r>
-              <a:rPr lang="mr-IN" sz="2000" b="1" dirty="0" err="1">
-                <a:solidFill>
-                  <a:srgbClr val="000080"/>
-                </a:solidFill>
-                <a:latin typeface="Courier" charset="0"/>
-                <a:ea typeface="Courier" charset="0"/>
-                <a:cs typeface="Courier" charset="0"/>
-              </a:rPr>
-              <a:t>val</a:t>
-            </a:r>
-            <a:r>
-              <a:rPr lang="mr-IN" sz="2000" b="1" dirty="0">
-                <a:solidFill>
-                  <a:srgbClr val="000080"/>
-                </a:solidFill>
-                <a:latin typeface="Courier" charset="0"/>
-                <a:ea typeface="Courier" charset="0"/>
-                <a:cs typeface="Courier" charset="0"/>
-              </a:rPr>
-              <a:t> </a:t>
-            </a:r>
-            <a:r>
-              <a:rPr lang="mr-IN" sz="2000" i="1" dirty="0">
-                <a:solidFill>
-                  <a:srgbClr val="660E7A"/>
-                </a:solidFill>
-                <a:latin typeface="Courier" charset="0"/>
-                <a:ea typeface="Courier" charset="0"/>
-                <a:cs typeface="Courier" charset="0"/>
-              </a:rPr>
-              <a:t>k2 </a:t>
-            </a:r>
-            <a:r>
-              <a:rPr lang="mr-IN" sz="2000" dirty="0">
-                <a:latin typeface="Courier" charset="0"/>
-                <a:ea typeface="Courier" charset="0"/>
-                <a:cs typeface="Courier" charset="0"/>
-              </a:rPr>
-              <a:t>= (</a:t>
-            </a:r>
-            <a:r>
-              <a:rPr lang="mr-IN" sz="2000" dirty="0" err="1">
-                <a:latin typeface="Courier" charset="0"/>
-                <a:ea typeface="Courier" charset="0"/>
-                <a:cs typeface="Courier" charset="0"/>
-              </a:rPr>
-              <a:t>x</a:t>
-            </a:r>
-            <a:r>
-              <a:rPr lang="mr-IN" sz="2000" dirty="0">
-                <a:latin typeface="Courier" charset="0"/>
-                <a:ea typeface="Courier" charset="0"/>
-                <a:cs typeface="Courier" charset="0"/>
-              </a:rPr>
-              <a:t>: </a:t>
-            </a:r>
-            <a:r>
-              <a:rPr lang="mr-IN" sz="2000" dirty="0" err="1">
-                <a:latin typeface="Courier" charset="0"/>
-                <a:ea typeface="Courier" charset="0"/>
-                <a:cs typeface="Courier" charset="0"/>
-              </a:rPr>
-              <a:t>Int</a:t>
-            </a:r>
-            <a:r>
-              <a:rPr lang="mr-IN" sz="2000" dirty="0">
-                <a:latin typeface="Courier" charset="0"/>
-                <a:ea typeface="Courier" charset="0"/>
-                <a:cs typeface="Courier" charset="0"/>
-              </a:rPr>
-              <a:t>) =&gt; </a:t>
-            </a:r>
-            <a:r>
-              <a:rPr lang="mr-IN" sz="2000" dirty="0">
-                <a:solidFill>
-                  <a:srgbClr val="0000FF"/>
-                </a:solidFill>
-                <a:latin typeface="Courier" charset="0"/>
-                <a:ea typeface="Courier" charset="0"/>
-                <a:cs typeface="Courier" charset="0"/>
-              </a:rPr>
-              <a:t>10 </a:t>
-            </a:r>
-            <a:r>
-              <a:rPr lang="mr-IN" sz="2000" dirty="0" smtClean="0">
-                <a:latin typeface="Courier" charset="0"/>
-                <a:ea typeface="Courier" charset="0"/>
-                <a:cs typeface="Courier" charset="0"/>
-              </a:rPr>
-              <a:t>- </a:t>
-            </a:r>
-            <a:r>
-              <a:rPr lang="mr-IN" sz="2000" dirty="0" err="1" smtClean="0">
-                <a:latin typeface="Courier" charset="0"/>
-                <a:ea typeface="Courier" charset="0"/>
-                <a:cs typeface="Courier" charset="0"/>
-              </a:rPr>
-              <a:t>x</a:t>
-            </a:r>
-            <a:r>
-              <a:rPr lang="mr-IN" sz="2000" dirty="0" smtClean="0">
-                <a:latin typeface="Courier" charset="0"/>
-                <a:ea typeface="Courier" charset="0"/>
-                <a:cs typeface="Courier" charset="0"/>
-              </a:rPr>
-              <a:t> </a:t>
-            </a:r>
-            <a:r>
-              <a:rPr lang="mr-IN" sz="2000" dirty="0">
-                <a:latin typeface="Courier" charset="0"/>
-                <a:ea typeface="Courier" charset="0"/>
-                <a:cs typeface="Courier" charset="0"/>
-              </a:rPr>
-              <a:t/>
-            </a:r>
-            <a:br>
-              <a:rPr lang="mr-IN" sz="2000" dirty="0">
+              <a:rPr lang="en-US" sz="2000" dirty="0">
                 <a:latin typeface="Courier" charset="0"/>
                 <a:ea typeface="Courier" charset="0"/>
                 <a:cs typeface="Courier" charset="0"/>
@@ -10220,7 +11297,7 @@
           </a:p>
           <a:p>
             <a:r>
-              <a:rPr lang="mr-IN" sz="2000" b="1" dirty="0" err="1">
+              <a:rPr lang="en-US" sz="2000" b="1" dirty="0" err="1">
                 <a:solidFill>
                   <a:srgbClr val="000080"/>
                 </a:solidFill>
@@ -10228,10 +11305,111 @@
                 <a:ea typeface="Courier" charset="0"/>
                 <a:cs typeface="Courier" charset="0"/>
               </a:rPr>
+              <a:t>def</a:t>
+            </a:r>
+            <a:r>
+              <a:rPr lang="en-US" sz="2000" b="1" dirty="0">
+                <a:solidFill>
+                  <a:srgbClr val="000080"/>
+                </a:solidFill>
+                <a:latin typeface="Courier" charset="0"/>
+                <a:ea typeface="Courier" charset="0"/>
+                <a:cs typeface="Courier" charset="0"/>
+              </a:rPr>
+              <a:t> </a:t>
+            </a:r>
+            <a:r>
+              <a:rPr lang="en-US" sz="2000" dirty="0" err="1">
+                <a:latin typeface="Courier" charset="0"/>
+                <a:ea typeface="Courier" charset="0"/>
+                <a:cs typeface="Courier" charset="0"/>
+              </a:rPr>
+              <a:t>pitagoras</a:t>
+            </a:r>
+            <a:r>
+              <a:rPr lang="en-US" sz="2000" dirty="0">
+                <a:latin typeface="Courier" charset="0"/>
+                <a:ea typeface="Courier" charset="0"/>
+                <a:cs typeface="Courier" charset="0"/>
+              </a:rPr>
+              <a:t>(a: </a:t>
+            </a:r>
+            <a:r>
+              <a:rPr lang="en-US" sz="2000" dirty="0" err="1">
+                <a:latin typeface="Courier" charset="0"/>
+                <a:ea typeface="Courier" charset="0"/>
+                <a:cs typeface="Courier" charset="0"/>
+              </a:rPr>
+              <a:t>Int</a:t>
+            </a:r>
+            <a:r>
+              <a:rPr lang="en-US" sz="2000" dirty="0">
+                <a:latin typeface="Courier" charset="0"/>
+                <a:ea typeface="Courier" charset="0"/>
+                <a:cs typeface="Courier" charset="0"/>
+              </a:rPr>
+              <a:t>, b: </a:t>
+            </a:r>
+            <a:r>
+              <a:rPr lang="en-US" sz="2000" dirty="0" err="1">
+                <a:latin typeface="Courier" charset="0"/>
+                <a:ea typeface="Courier" charset="0"/>
+                <a:cs typeface="Courier" charset="0"/>
+              </a:rPr>
+              <a:t>Int</a:t>
+            </a:r>
+            <a:r>
+              <a:rPr lang="en-US" sz="2000" dirty="0">
+                <a:latin typeface="Courier" charset="0"/>
+                <a:ea typeface="Courier" charset="0"/>
+                <a:cs typeface="Courier" charset="0"/>
+              </a:rPr>
+              <a:t>): </a:t>
+            </a:r>
+            <a:r>
+              <a:rPr lang="en-US" sz="2000" dirty="0" err="1">
+                <a:latin typeface="Courier" charset="0"/>
+                <a:ea typeface="Courier" charset="0"/>
+                <a:cs typeface="Courier" charset="0"/>
+              </a:rPr>
+              <a:t>Int</a:t>
+            </a:r>
+            <a:r>
+              <a:rPr lang="en-US" sz="2000" dirty="0">
+                <a:latin typeface="Courier" charset="0"/>
+                <a:ea typeface="Courier" charset="0"/>
+                <a:cs typeface="Courier" charset="0"/>
+              </a:rPr>
+              <a:t> = {</a:t>
+            </a:r>
+            <a:br>
+              <a:rPr lang="en-US" sz="2000" dirty="0">
+                <a:latin typeface="Courier" charset="0"/>
+                <a:ea typeface="Courier" charset="0"/>
+                <a:cs typeface="Courier" charset="0"/>
+              </a:rPr>
+            </a:br>
+            <a:r>
+              <a:rPr lang="en-US" sz="2000" dirty="0">
+                <a:latin typeface="Courier" charset="0"/>
+                <a:ea typeface="Courier" charset="0"/>
+                <a:cs typeface="Courier" charset="0"/>
+              </a:rPr>
+              <a:t>  </a:t>
+            </a:r>
+            <a:r>
+              <a:rPr lang="en-US" sz="2000" b="1" dirty="0" err="1">
+                <a:solidFill>
+                  <a:srgbClr val="000080"/>
+                </a:solidFill>
+                <a:latin typeface="Courier" charset="0"/>
+                <a:ea typeface="Courier" charset="0"/>
+                <a:cs typeface="Courier" charset="0"/>
+              </a:rPr>
               <a:t>val</a:t>
             </a:r>
             <a:r>
-              <a:rPr lang="mr-IN" sz="2000" b="1" dirty="0">
+              <a:rPr lang="en-US" sz="2000" b="1" dirty="0">
                 <a:solidFill>
                   <a:srgbClr val="000080"/>
                 </a:solidFill>
@@ -10242,103 +11420,44 @@
               <a:t> </a:t>
             </a:r>
             <a:r>
-              <a:rPr lang="mr-IN" sz="2000" i="1" dirty="0">
-                <a:solidFill>
-                  <a:srgbClr val="660E7A"/>
-                </a:solidFill>
-                <a:latin typeface="Courier" charset="0"/>
-                <a:ea typeface="Courier" charset="0"/>
-                <a:cs typeface="Courier" charset="0"/>
-              </a:rPr>
-              <a:t>k3 </a:t>
-            </a:r>
-            <a:r>
-              <a:rPr lang="mr-IN" sz="2000" dirty="0">
-                <a:latin typeface="Courier" charset="0"/>
-                <a:ea typeface="Courier" charset="0"/>
-                <a:cs typeface="Courier" charset="0"/>
-              </a:rPr>
-              <a:t>= (</a:t>
-            </a:r>
-            <a:r>
-              <a:rPr lang="mr-IN" sz="2000" dirty="0" err="1">
-                <a:latin typeface="Courier" charset="0"/>
-                <a:ea typeface="Courier" charset="0"/>
-                <a:cs typeface="Courier" charset="0"/>
-              </a:rPr>
-              <a:t>x</a:t>
-            </a:r>
-            <a:r>
-              <a:rPr lang="mr-IN" sz="2000" dirty="0">
-                <a:latin typeface="Courier" charset="0"/>
-                <a:ea typeface="Courier" charset="0"/>
-                <a:cs typeface="Courier" charset="0"/>
-              </a:rPr>
-              <a:t>: </a:t>
-            </a:r>
-            <a:r>
-              <a:rPr lang="mr-IN" sz="2000" dirty="0" err="1">
-                <a:latin typeface="Courier" charset="0"/>
-                <a:ea typeface="Courier" charset="0"/>
-                <a:cs typeface="Courier" charset="0"/>
-              </a:rPr>
-              <a:t>Int</a:t>
-            </a:r>
-            <a:r>
-              <a:rPr lang="mr-IN" sz="2000" dirty="0">
-                <a:latin typeface="Courier" charset="0"/>
-                <a:ea typeface="Courier" charset="0"/>
-                <a:cs typeface="Courier" charset="0"/>
-              </a:rPr>
-              <a:t>) =&gt; </a:t>
-            </a:r>
-            <a:r>
-              <a:rPr lang="mr-IN" sz="2000" dirty="0" err="1">
-                <a:latin typeface="Courier" charset="0"/>
-                <a:ea typeface="Courier" charset="0"/>
-                <a:cs typeface="Courier" charset="0"/>
-              </a:rPr>
-              <a:t>x</a:t>
-            </a:r>
-            <a:r>
-              <a:rPr lang="mr-IN" sz="2000" dirty="0">
-                <a:latin typeface="Courier" charset="0"/>
-                <a:ea typeface="Courier" charset="0"/>
-                <a:cs typeface="Courier" charset="0"/>
-              </a:rPr>
-              <a:t> + </a:t>
-            </a:r>
-            <a:r>
-              <a:rPr lang="mr-IN" sz="2000" dirty="0">
-                <a:solidFill>
-                  <a:srgbClr val="0000FF"/>
-                </a:solidFill>
-                <a:latin typeface="Courier" charset="0"/>
-                <a:ea typeface="Courier" charset="0"/>
-                <a:cs typeface="Courier" charset="0"/>
-              </a:rPr>
-              <a:t>1</a:t>
-            </a:r>
-            <a:endParaRPr lang="en-US" sz="2000" dirty="0">
-              <a:solidFill>
-                <a:srgbClr val="0000FF"/>
-              </a:solidFill>
-              <a:latin typeface="Courier" charset="0"/>
-              <a:ea typeface="Courier" charset="0"/>
-              <a:cs typeface="Courier" charset="0"/>
-            </a:endParaRPr>
-          </a:p>
-          <a:p>
-            <a:endParaRPr lang="en-US" sz="2000" dirty="0" smtClean="0">
-              <a:solidFill>
-                <a:srgbClr val="0000FF"/>
-              </a:solidFill>
-              <a:latin typeface="Courier" charset="0"/>
-              <a:ea typeface="Courier" charset="0"/>
-              <a:cs typeface="Courier" charset="0"/>
-            </a:endParaRPr>
-          </a:p>
-          <a:p>
+              <a:rPr lang="en-US" sz="2000" dirty="0">
+                <a:latin typeface="Courier" charset="0"/>
+                <a:ea typeface="Courier" charset="0"/>
+                <a:cs typeface="Courier" charset="0"/>
+              </a:rPr>
+              <a:t>aa = </a:t>
+            </a:r>
+            <a:r>
+              <a:rPr lang="en-US" sz="2000" i="1" dirty="0">
+                <a:latin typeface="Courier" charset="0"/>
+                <a:ea typeface="Courier" charset="0"/>
+                <a:cs typeface="Courier" charset="0"/>
+              </a:rPr>
+              <a:t>square</a:t>
+            </a:r>
+            <a:r>
+              <a:rPr lang="en-US" sz="2000" dirty="0">
+                <a:latin typeface="Courier" charset="0"/>
+                <a:ea typeface="Courier" charset="0"/>
+                <a:cs typeface="Courier" charset="0"/>
+              </a:rPr>
+              <a:t>(a)</a:t>
+            </a:r>
+            <a:br>
+              <a:rPr lang="en-US" sz="2000" dirty="0">
+                <a:latin typeface="Courier" charset="0"/>
+                <a:ea typeface="Courier" charset="0"/>
+                <a:cs typeface="Courier" charset="0"/>
+              </a:rPr>
+            </a:br>
+            <a:r>
+              <a:rPr lang="en-US" sz="2000" dirty="0">
+                <a:latin typeface="Courier" charset="0"/>
+                <a:ea typeface="Courier" charset="0"/>
+                <a:cs typeface="Courier" charset="0"/>
+              </a:rPr>
+              <a:t>  </a:t>
+            </a:r>
             <a:r>
               <a:rPr lang="en-US" sz="2000" b="1" dirty="0" err="1">
                 <a:solidFill>
@@ -10362,15 +11481,20 @@
               <a:t> </a:t>
             </a:r>
             <a:r>
+              <a:rPr lang="en-US" sz="2000" dirty="0">
+                <a:latin typeface="Courier" charset="0"/>
+                <a:ea typeface="Courier" charset="0"/>
+                <a:cs typeface="Courier" charset="0"/>
+              </a:rPr>
+              <a:t>bb = </a:t>
+            </a:r>
+            <a:r>
               <a:rPr lang="en-US" sz="2000" i="1" dirty="0">
-                <a:solidFill>
-                  <a:srgbClr val="660E7A"/>
-                </a:solidFill>
-                <a:latin typeface="Courier" charset="0"/>
-                <a:ea typeface="Courier" charset="0"/>
-                <a:cs typeface="Courier" charset="0"/>
-              </a:rPr>
-              <a:t>k </a:t>
+                <a:latin typeface="Courier" charset="0"/>
+                <a:ea typeface="Courier" charset="0"/>
+                <a:cs typeface="Courier" charset="0"/>
+              </a:rPr>
+              <a:t>square</a:t>
             </a:r>
             <a:r>
               <a:rPr lang="en-US" sz="2000" dirty="0">
@@ -10378,18 +11502,30 @@
                 <a:ea typeface="Courier" charset="0"/>
                 <a:cs typeface="Courier" charset="0"/>
               </a:rPr>
-              <a:t>= </a:t>
+              <a:t>(b)</a:t>
+            </a:r>
+            <a:br>
+              <a:rPr lang="en-US" sz="2000" dirty="0">
+                <a:latin typeface="Courier" charset="0"/>
+                <a:ea typeface="Courier" charset="0"/>
+                <a:cs typeface="Courier" charset="0"/>
+              </a:rPr>
+            </a:br>
+            <a:r>
+              <a:rPr lang="en-US" sz="2000" dirty="0">
+                <a:latin typeface="Courier" charset="0"/>
+                <a:ea typeface="Courier" charset="0"/>
+                <a:cs typeface="Courier" charset="0"/>
+              </a:rPr>
+              <a:t>  </a:t>
             </a:r>
             <a:r>
               <a:rPr lang="en-US" sz="2000" i="1" dirty="0">
-                <a:solidFill>
-                  <a:srgbClr val="660E7A"/>
-                </a:solidFill>
-                <a:latin typeface="Courier" charset="0"/>
-                <a:ea typeface="Courier" charset="0"/>
-                <a:cs typeface="Courier" charset="0"/>
-              </a:rPr>
-              <a:t>k3 </a:t>
+                <a:latin typeface="Courier" charset="0"/>
+                <a:ea typeface="Courier" charset="0"/>
+                <a:cs typeface="Courier" charset="0"/>
+              </a:rPr>
+              <a:t>sum</a:t>
             </a:r>
             <a:r>
               <a:rPr lang="en-US" sz="2000" dirty="0">
@@ -10397,233 +11533,28 @@
                 <a:ea typeface="Courier" charset="0"/>
                 <a:cs typeface="Courier" charset="0"/>
               </a:rPr>
-              <a:t>compose </a:t>
-            </a:r>
-            <a:r>
-              <a:rPr lang="en-US" sz="2000" i="1" dirty="0">
-                <a:solidFill>
-                  <a:srgbClr val="660E7A"/>
-                </a:solidFill>
-                <a:latin typeface="Courier" charset="0"/>
-                <a:ea typeface="Courier" charset="0"/>
-                <a:cs typeface="Courier" charset="0"/>
-              </a:rPr>
-              <a:t>k2 </a:t>
-            </a:r>
-            <a:r>
+              <a:t>(aa, bb)</a:t>
+            </a:r>
+            <a:br>
               <a:rPr lang="en-US" sz="2000" dirty="0">
                 <a:latin typeface="Courier" charset="0"/>
                 <a:ea typeface="Courier" charset="0"/>
                 <a:cs typeface="Courier" charset="0"/>
               </a:rPr>
-              <a:t>compose </a:t>
-            </a:r>
-            <a:r>
-              <a:rPr lang="en-US" sz="2000" i="1" dirty="0">
-                <a:solidFill>
-                  <a:srgbClr val="660E7A"/>
-                </a:solidFill>
-                <a:latin typeface="Courier" charset="0"/>
-                <a:ea typeface="Courier" charset="0"/>
-                <a:cs typeface="Courier" charset="0"/>
-              </a:rPr>
-              <a:t>k1</a:t>
-            </a:r>
-            <a:br>
-              <a:rPr lang="en-US" sz="2000" i="1" dirty="0">
-                <a:solidFill>
-                  <a:srgbClr val="660E7A"/>
-                </a:solidFill>
-                <a:latin typeface="Courier" charset="0"/>
-                <a:ea typeface="Courier" charset="0"/>
-                <a:cs typeface="Courier" charset="0"/>
-              </a:rPr>
             </a:br>
-            <a:endParaRPr lang="en-US" sz="2000" dirty="0">
-              <a:solidFill>
-                <a:srgbClr val="0000FF"/>
-              </a:solidFill>
-              <a:latin typeface="Courier" charset="0"/>
-              <a:ea typeface="Courier" charset="0"/>
-              <a:cs typeface="Courier" charset="0"/>
-            </a:endParaRPr>
-          </a:p>
-          <a:p>
-            <a:endParaRPr lang="en-US" sz="2000" dirty="0" smtClean="0">
-              <a:solidFill>
-                <a:srgbClr val="0000FF"/>
-              </a:solidFill>
-              <a:latin typeface="Courier" charset="0"/>
-              <a:ea typeface="Courier" charset="0"/>
-              <a:cs typeface="Courier" charset="0"/>
-            </a:endParaRPr>
-          </a:p>
-          <a:p>
+            <a:r>
+              <a:rPr lang="en-US" sz="2000" dirty="0" smtClean="0">
+                <a:latin typeface="Courier" charset="0"/>
+                <a:ea typeface="Courier" charset="0"/>
+                <a:cs typeface="Courier" charset="0"/>
+              </a:rPr>
+              <a:t>}</a:t>
+            </a:r>
             <a:endParaRPr lang="en-US" sz="2000" dirty="0">
               <a:latin typeface="Courier" charset="0"/>
               <a:ea typeface="Courier" charset="0"/>
               <a:cs typeface="Courier" charset="0"/>
             </a:endParaRPr>
-          </a:p>
-          <a:p>
-            <a:endParaRPr lang="en-US" dirty="0" smtClean="0">
-              <a:latin typeface="Courier" charset="0"/>
-              <a:ea typeface="Courier" charset="0"/>
-              <a:cs typeface="Courier" charset="0"/>
-            </a:endParaRPr>
-          </a:p>
-          <a:p>
-            <a:endParaRPr lang="en-US" dirty="0" smtClean="0">
-              <a:latin typeface="Courier" charset="0"/>
-              <a:ea typeface="Courier" charset="0"/>
-              <a:cs typeface="Courier" charset="0"/>
-            </a:endParaRPr>
-          </a:p>
-          <a:p>
-            <a:endParaRPr lang="en-US" dirty="0">
-              <a:latin typeface="Courier" charset="0"/>
-              <a:ea typeface="Courier" charset="0"/>
-              <a:cs typeface="Courier" charset="0"/>
-            </a:endParaRPr>
-          </a:p>
-        </p:txBody>
-      </p:sp>
-      <p:sp>
-        <p:nvSpPr>
-          <p:cNvPr id="9" name="TextBox 8"/>
-          <p:cNvSpPr txBox="1"/>
-          <p:nvPr/>
-        </p:nvSpPr>
-        <p:spPr>
-          <a:xfrm>
-            <a:off x="596902" y="1260000"/>
-            <a:ext cx="6053901" cy="400110"/>
-          </a:xfrm>
-          <a:prstGeom prst="rect">
-            <a:avLst/>
-          </a:prstGeom>
-          <a:noFill/>
-        </p:spPr>
-        <p:txBody>
-          <a:bodyPr wrap="none" rtlCol="0">
-            <a:spAutoFit/>
-          </a:bodyPr>
-          <a:lstStyle/>
-          <a:p>
-            <a:r>
-              <a:rPr lang="en-US" sz="2000" dirty="0" smtClean="0"/>
-              <a:t>A continuation is </a:t>
-            </a:r>
-            <a:r>
-              <a:rPr lang="en-US" sz="2000" dirty="0" smtClean="0"/>
-              <a:t>the context surrounding </a:t>
-            </a:r>
-            <a:r>
-              <a:rPr lang="en-US" sz="2000" dirty="0" smtClean="0"/>
-              <a:t>an </a:t>
-            </a:r>
-            <a:r>
-              <a:rPr lang="en-US" sz="2000" dirty="0" smtClean="0"/>
-              <a:t>expression.</a:t>
-            </a:r>
-          </a:p>
-        </p:txBody>
-      </p:sp>
-      <p:sp>
-        <p:nvSpPr>
-          <p:cNvPr id="7" name="Rectangle 6"/>
-          <p:cNvSpPr/>
-          <p:nvPr/>
-        </p:nvSpPr>
-        <p:spPr>
-          <a:xfrm>
-            <a:off x="2464386" y="2346992"/>
-            <a:ext cx="612000" cy="410059"/>
-          </a:xfrm>
-          <a:prstGeom prst="rect">
-            <a:avLst/>
-          </a:prstGeom>
-          <a:solidFill>
-            <a:srgbClr val="00B050">
-              <a:alpha val="49000"/>
-            </a:srgbClr>
-          </a:solidFill>
-        </p:spPr>
-        <p:style>
-          <a:lnRef idx="2">
-            <a:schemeClr val="accent1">
-              <a:shade val="50000"/>
-            </a:schemeClr>
-          </a:lnRef>
-          <a:fillRef idx="1">
-            <a:schemeClr val="accent1"/>
-          </a:fillRef>
-          <a:effectRef idx="0">
-            <a:schemeClr val="accent1"/>
-          </a:effectRef>
-          <a:fontRef idx="minor">
-            <a:schemeClr val="lt1"/>
-          </a:fontRef>
-        </p:style>
-        <p:txBody>
-          <a:bodyPr lIns="36000" rtlCol="0" anchor="ctr"/>
-          <a:lstStyle/>
-          <a:p>
-            <a:pPr algn="ctr"/>
-            <a:r>
-              <a:rPr lang="en-US" smtClean="0"/>
-              <a:t> </a:t>
-            </a:r>
-            <a:endParaRPr lang="en-US"/>
-          </a:p>
-        </p:txBody>
-      </p:sp>
-      <p:sp>
-        <p:nvSpPr>
-          <p:cNvPr id="8" name="Rectangle 7"/>
-          <p:cNvSpPr/>
-          <p:nvPr/>
-        </p:nvSpPr>
-        <p:spPr>
-          <a:xfrm>
-            <a:off x="1063637" y="2346993"/>
-            <a:ext cx="612000" cy="410059"/>
-          </a:xfrm>
-          <a:prstGeom prst="rect">
-            <a:avLst/>
-          </a:prstGeom>
-          <a:solidFill>
-            <a:srgbClr val="00B050">
-              <a:alpha val="49000"/>
-            </a:srgbClr>
-          </a:solidFill>
-        </p:spPr>
-        <p:style>
-          <a:lnRef idx="2">
-            <a:schemeClr val="accent1">
-              <a:shade val="50000"/>
-            </a:schemeClr>
-          </a:lnRef>
-          <a:fillRef idx="1">
-            <a:schemeClr val="accent1"/>
-          </a:fillRef>
-          <a:effectRef idx="0">
-            <a:schemeClr val="accent1"/>
-          </a:effectRef>
-          <a:fontRef idx="minor">
-            <a:schemeClr val="lt1"/>
-          </a:fontRef>
-        </p:style>
-        <p:txBody>
-          <a:bodyPr lIns="36000" rtlCol="0" anchor="ctr"/>
-          <a:lstStyle/>
-          <a:p>
-            <a:pPr algn="ctr"/>
-            <a:r>
-              <a:rPr lang="en-US" smtClean="0"/>
-              <a:t> </a:t>
-            </a:r>
-            <a:endParaRPr lang="en-US"/>
           </a:p>
         </p:txBody>
       </p:sp>

</xml_diff>

<commit_message>
adding tree naive example
</commit_message>
<xml_diff>
--- a/docs/diy-continuations.pptx
+++ b/docs/diy-continuations.pptx
@@ -161,7 +161,7 @@
           <p:cNvPr id="2" name="Header Placeholder 1">
             <a:extLst>
               <a:ext uri="{FF2B5EF4-FFF2-40B4-BE49-F238E27FC236}">
-                <a16:creationId xmlns="" xmlns:a16="http://schemas.microsoft.com/office/drawing/2014/main" id="{2307D236-EC24-49D4-9F92-5F62A454C349}"/>
+                <a16:creationId xmlns:a16="http://schemas.microsoft.com/office/drawing/2014/main" xmlns="" id="{2307D236-EC24-49D4-9F92-5F62A454C349}"/>
               </a:ext>
             </a:extLst>
           </p:cNvPr>
@@ -198,7 +198,7 @@
           <p:cNvPr id="3" name="Date Placeholder 2">
             <a:extLst>
               <a:ext uri="{FF2B5EF4-FFF2-40B4-BE49-F238E27FC236}">
-                <a16:creationId xmlns="" xmlns:a16="http://schemas.microsoft.com/office/drawing/2014/main" id="{C4A8361D-062B-4882-9622-898F34F418C6}"/>
+                <a16:creationId xmlns:a16="http://schemas.microsoft.com/office/drawing/2014/main" xmlns="" id="{C4A8361D-062B-4882-9622-898F34F418C6}"/>
               </a:ext>
             </a:extLst>
           </p:cNvPr>
@@ -228,7 +228,7 @@
           <a:p>
             <a:fld id="{B5239E4C-5DBC-4EE5-94B9-2B43250ABC54}" type="datetimeFigureOut">
               <a:rPr lang="en-US"/>
-              <a:t>1/29/19</a:t>
+              <a:t>1/30/19</a:t>
             </a:fld>
             <a:endParaRPr lang="en-US"/>
           </a:p>
@@ -239,7 +239,7 @@
           <p:cNvPr id="4" name="Footer Placeholder 3">
             <a:extLst>
               <a:ext uri="{FF2B5EF4-FFF2-40B4-BE49-F238E27FC236}">
-                <a16:creationId xmlns="" xmlns:a16="http://schemas.microsoft.com/office/drawing/2014/main" id="{18BBC38B-3F86-4712-96E2-845CD03C99AD}"/>
+                <a16:creationId xmlns:a16="http://schemas.microsoft.com/office/drawing/2014/main" xmlns="" id="{18BBC38B-3F86-4712-96E2-845CD03C99AD}"/>
               </a:ext>
             </a:extLst>
           </p:cNvPr>
@@ -276,7 +276,7 @@
           <p:cNvPr id="5" name="Slide Number Placeholder 4">
             <a:extLst>
               <a:ext uri="{FF2B5EF4-FFF2-40B4-BE49-F238E27FC236}">
-                <a16:creationId xmlns="" xmlns:a16="http://schemas.microsoft.com/office/drawing/2014/main" id="{A2B4E439-A684-4CF1-8B15-24CE3577A4ED}"/>
+                <a16:creationId xmlns:a16="http://schemas.microsoft.com/office/drawing/2014/main" xmlns="" id="{A2B4E439-A684-4CF1-8B15-24CE3577A4ED}"/>
               </a:ext>
             </a:extLst>
           </p:cNvPr>
@@ -316,7 +316,7 @@
           <p:cNvPr id="6" name="Header Placeholder 1">
             <a:extLst>
               <a:ext uri="{FF2B5EF4-FFF2-40B4-BE49-F238E27FC236}">
-                <a16:creationId xmlns="" xmlns:a16="http://schemas.microsoft.com/office/drawing/2014/main" id="{1652160D-6E4D-493F-A1B8-94436B8D302F}"/>
+                <a16:creationId xmlns:a16="http://schemas.microsoft.com/office/drawing/2014/main" xmlns="" id="{1652160D-6E4D-493F-A1B8-94436B8D302F}"/>
               </a:ext>
             </a:extLst>
           </p:cNvPr>
@@ -380,7 +380,7 @@
           <p:cNvPr id="7" name="Date Placeholder 2">
             <a:extLst>
               <a:ext uri="{FF2B5EF4-FFF2-40B4-BE49-F238E27FC236}">
-                <a16:creationId xmlns="" xmlns:a16="http://schemas.microsoft.com/office/drawing/2014/main" id="{003E91D0-8A5F-4EA7-944D-1242EC30F080}"/>
+                <a16:creationId xmlns:a16="http://schemas.microsoft.com/office/drawing/2014/main" xmlns="" id="{003E91D0-8A5F-4EA7-944D-1242EC30F080}"/>
               </a:ext>
             </a:extLst>
           </p:cNvPr>
@@ -456,7 +456,7 @@
                   <a:uFillTx/>
                 </a:defRPr>
               </a:pPr>
-              <a:t>29/01/2019</a:t>
+              <a:t>30/01/2019</a:t>
             </a:fld>
             <a:endParaRPr lang="en-GB" sz="1200" b="0" i="0" u="none" strike="noStrike" kern="1200" cap="none" spc="0" baseline="0">
               <a:solidFill>
@@ -473,7 +473,7 @@
           <p:cNvPr id="8" name="Footer Placeholder 3">
             <a:extLst>
               <a:ext uri="{FF2B5EF4-FFF2-40B4-BE49-F238E27FC236}">
-                <a16:creationId xmlns="" xmlns:a16="http://schemas.microsoft.com/office/drawing/2014/main" id="{2CECAB09-B1CA-488D-9468-1238D693C4A6}"/>
+                <a16:creationId xmlns:a16="http://schemas.microsoft.com/office/drawing/2014/main" xmlns="" id="{2CECAB09-B1CA-488D-9468-1238D693C4A6}"/>
               </a:ext>
             </a:extLst>
           </p:cNvPr>
@@ -537,7 +537,7 @@
           <p:cNvPr id="9" name="Slide Number Placeholder 4">
             <a:extLst>
               <a:ext uri="{FF2B5EF4-FFF2-40B4-BE49-F238E27FC236}">
-                <a16:creationId xmlns="" xmlns:a16="http://schemas.microsoft.com/office/drawing/2014/main" id="{DBEF0D69-B2F4-4FE0-A167-B7409C881861}"/>
+                <a16:creationId xmlns:a16="http://schemas.microsoft.com/office/drawing/2014/main" xmlns="" id="{DBEF0D69-B2F4-4FE0-A167-B7409C881861}"/>
               </a:ext>
             </a:extLst>
           </p:cNvPr>
@@ -640,7 +640,7 @@
           <p:cNvPr id="8" name="Header Placeholder 1">
             <a:extLst>
               <a:ext uri="{FF2B5EF4-FFF2-40B4-BE49-F238E27FC236}">
-                <a16:creationId xmlns="" xmlns:a16="http://schemas.microsoft.com/office/drawing/2014/main" id="{E3CA4944-91DB-419C-9B85-6B2E48A4C49C}"/>
+                <a16:creationId xmlns:a16="http://schemas.microsoft.com/office/drawing/2014/main" xmlns="" id="{E3CA4944-91DB-419C-9B85-6B2E48A4C49C}"/>
               </a:ext>
             </a:extLst>
           </p:cNvPr>
@@ -701,7 +701,7 @@
           <p:cNvPr id="9" name="Date Placeholder 2">
             <a:extLst>
               <a:ext uri="{FF2B5EF4-FFF2-40B4-BE49-F238E27FC236}">
-                <a16:creationId xmlns="" xmlns:a16="http://schemas.microsoft.com/office/drawing/2014/main" id="{FF35B9FD-E9C3-4A4E-A232-9C350D013696}"/>
+                <a16:creationId xmlns:a16="http://schemas.microsoft.com/office/drawing/2014/main" xmlns="" id="{FF35B9FD-E9C3-4A4E-A232-9C350D013696}"/>
               </a:ext>
             </a:extLst>
           </p:cNvPr>
@@ -756,7 +756,7 @@
             <a:fld id="{5C40661A-FF99-43E9-8625-B04CCA98DB49}" type="datetime1">
               <a:rPr lang="en-US"/>
               <a:pPr lvl="0"/>
-              <a:t>1/29/19</a:t>
+              <a:t>1/30/19</a:t>
             </a:fld>
             <a:endParaRPr lang="en-US"/>
           </a:p>
@@ -767,7 +767,7 @@
           <p:cNvPr id="10" name="Slide Image Placeholder 3">
             <a:extLst>
               <a:ext uri="{FF2B5EF4-FFF2-40B4-BE49-F238E27FC236}">
-                <a16:creationId xmlns="" xmlns:a16="http://schemas.microsoft.com/office/drawing/2014/main" id="{0F45E758-102C-4252-9457-BDC346B25C98}"/>
+                <a16:creationId xmlns:a16="http://schemas.microsoft.com/office/drawing/2014/main" xmlns="" id="{0F45E758-102C-4252-9457-BDC346B25C98}"/>
               </a:ext>
             </a:extLst>
           </p:cNvPr>
@@ -800,7 +800,7 @@
           <p:cNvPr id="11" name="Notes Placeholder 4">
             <a:extLst>
               <a:ext uri="{FF2B5EF4-FFF2-40B4-BE49-F238E27FC236}">
-                <a16:creationId xmlns="" xmlns:a16="http://schemas.microsoft.com/office/drawing/2014/main" id="{D3DF7A88-849E-422C-BEA7-E1BD76F24FDF}"/>
+                <a16:creationId xmlns:a16="http://schemas.microsoft.com/office/drawing/2014/main" xmlns="" id="{D3DF7A88-849E-422C-BEA7-E1BD76F24FDF}"/>
               </a:ext>
             </a:extLst>
           </p:cNvPr>
@@ -872,7 +872,7 @@
           <p:cNvPr id="12" name="Footer Placeholder 5">
             <a:extLst>
               <a:ext uri="{FF2B5EF4-FFF2-40B4-BE49-F238E27FC236}">
-                <a16:creationId xmlns="" xmlns:a16="http://schemas.microsoft.com/office/drawing/2014/main" id="{4FE82BAE-4F41-4154-A441-5B43502F6C33}"/>
+                <a16:creationId xmlns:a16="http://schemas.microsoft.com/office/drawing/2014/main" xmlns="" id="{4FE82BAE-4F41-4154-A441-5B43502F6C33}"/>
               </a:ext>
             </a:extLst>
           </p:cNvPr>
@@ -933,7 +933,7 @@
           <p:cNvPr id="13" name="Slide Number Placeholder 6">
             <a:extLst>
               <a:ext uri="{FF2B5EF4-FFF2-40B4-BE49-F238E27FC236}">
-                <a16:creationId xmlns="" xmlns:a16="http://schemas.microsoft.com/office/drawing/2014/main" id="{CED64587-65A8-466C-BB0B-B812D794A53D}"/>
+                <a16:creationId xmlns:a16="http://schemas.microsoft.com/office/drawing/2014/main" xmlns="" id="{CED64587-65A8-466C-BB0B-B812D794A53D}"/>
               </a:ext>
             </a:extLst>
           </p:cNvPr>
@@ -1052,7 +1052,7 @@
           <a:p>
             <a:fld id="{1387469C-9F68-4097-95C7-42011AAA5201}" type="datetimeFigureOut">
               <a:rPr lang="en-US"/>
-              <a:t>1/29/19</a:t>
+              <a:t>1/30/19</a:t>
             </a:fld>
             <a:endParaRPr lang="en-US"/>
           </a:p>
@@ -1390,7 +1390,7 @@
           <p:cNvPr id="2" name="Slide Image Placeholder 1">
             <a:extLst>
               <a:ext uri="{FF2B5EF4-FFF2-40B4-BE49-F238E27FC236}">
-                <a16:creationId xmlns="" xmlns:a16="http://schemas.microsoft.com/office/drawing/2014/main" id="{C9CBAAC4-33AD-4986-92DF-2C3148E7E13C}"/>
+                <a16:creationId xmlns:a16="http://schemas.microsoft.com/office/drawing/2014/main" xmlns="" id="{C9CBAAC4-33AD-4986-92DF-2C3148E7E13C}"/>
               </a:ext>
             </a:extLst>
           </p:cNvPr>
@@ -1420,7 +1420,7 @@
           <p:cNvPr id="3" name="Notes Placeholder 2">
             <a:extLst>
               <a:ext uri="{FF2B5EF4-FFF2-40B4-BE49-F238E27FC236}">
-                <a16:creationId xmlns="" xmlns:a16="http://schemas.microsoft.com/office/drawing/2014/main" id="{0A794444-6664-48A2-ADFA-6C7059D629F0}"/>
+                <a16:creationId xmlns:a16="http://schemas.microsoft.com/office/drawing/2014/main" xmlns="" id="{0A794444-6664-48A2-ADFA-6C7059D629F0}"/>
               </a:ext>
             </a:extLst>
           </p:cNvPr>
@@ -1456,7 +1456,7 @@
           <p:cNvPr id="4" name="Slide Number Placeholder 3">
             <a:extLst>
               <a:ext uri="{FF2B5EF4-FFF2-40B4-BE49-F238E27FC236}">
-                <a16:creationId xmlns="" xmlns:a16="http://schemas.microsoft.com/office/drawing/2014/main" id="{590AE690-482B-4756-ACDC-87FC96C8FC33}"/>
+                <a16:creationId xmlns:a16="http://schemas.microsoft.com/office/drawing/2014/main" xmlns="" id="{590AE690-482B-4756-ACDC-87FC96C8FC33}"/>
               </a:ext>
             </a:extLst>
           </p:cNvPr>
@@ -1580,7 +1580,7 @@
           <p:cNvPr id="2" name="Slide Image Placeholder 1">
             <a:extLst>
               <a:ext uri="{FF2B5EF4-FFF2-40B4-BE49-F238E27FC236}">
-                <a16:creationId xmlns="" xmlns:a16="http://schemas.microsoft.com/office/drawing/2014/main" id="{46C272AF-405B-4A53-B2DC-4BB6F2F865FC}"/>
+                <a16:creationId xmlns:a16="http://schemas.microsoft.com/office/drawing/2014/main" xmlns="" id="{46C272AF-405B-4A53-B2DC-4BB6F2F865FC}"/>
               </a:ext>
             </a:extLst>
           </p:cNvPr>
@@ -1610,7 +1610,7 @@
           <p:cNvPr id="3" name="Notes Placeholder 2">
             <a:extLst>
               <a:ext uri="{FF2B5EF4-FFF2-40B4-BE49-F238E27FC236}">
-                <a16:creationId xmlns="" xmlns:a16="http://schemas.microsoft.com/office/drawing/2014/main" id="{20E471A3-2DC4-47C1-8171-FAD24340FC84}"/>
+                <a16:creationId xmlns:a16="http://schemas.microsoft.com/office/drawing/2014/main" xmlns="" id="{20E471A3-2DC4-47C1-8171-FAD24340FC84}"/>
               </a:ext>
             </a:extLst>
           </p:cNvPr>
@@ -1646,7 +1646,7 @@
           <p:cNvPr id="4" name="Slide Number Placeholder 3">
             <a:extLst>
               <a:ext uri="{FF2B5EF4-FFF2-40B4-BE49-F238E27FC236}">
-                <a16:creationId xmlns="" xmlns:a16="http://schemas.microsoft.com/office/drawing/2014/main" id="{EEB30ADB-B6E3-4FC0-9F1A-2842C9223A2F}"/>
+                <a16:creationId xmlns:a16="http://schemas.microsoft.com/office/drawing/2014/main" xmlns="" id="{EEB30ADB-B6E3-4FC0-9F1A-2842C9223A2F}"/>
               </a:ext>
             </a:extLst>
           </p:cNvPr>
@@ -1799,11 +1799,23 @@
           <a:p>
             <a:r>
               <a:rPr lang="en-US" dirty="0" smtClean="0"/>
+              <a:t>This expression is composed of</a:t>
+            </a:r>
+            <a:r>
+              <a:rPr lang="en-US" baseline="0" dirty="0" smtClean="0"/>
+              <a:t> simpler expressions, </a:t>
+            </a:r>
+            <a:r>
+              <a:rPr lang="en-US" dirty="0" smtClean="0"/>
               <a:t>How</a:t>
             </a:r>
             <a:r>
               <a:rPr lang="en-US" baseline="0" dirty="0" smtClean="0"/>
-              <a:t> do you </a:t>
+              <a:t> </a:t>
+            </a:r>
+            <a:r>
+              <a:rPr lang="en-US" baseline="0" dirty="0" smtClean="0"/>
+              <a:t>do you </a:t>
             </a:r>
             <a:r>
               <a:rPr lang="en-US" baseline="0" dirty="0" err="1" smtClean="0"/>
@@ -1811,7 +1823,11 @@
             </a:r>
             <a:r>
               <a:rPr lang="en-US" baseline="0" dirty="0" smtClean="0"/>
-              <a:t> this expression?</a:t>
+              <a:t> this expression</a:t>
+            </a:r>
+            <a:r>
+              <a:rPr lang="en-US" baseline="0" dirty="0" smtClean="0"/>
+              <a:t>? After we have a strategy for evaluating (lazy / higher) we reduce to normal form every expression after there is nothing left to reduce </a:t>
             </a:r>
             <a:endParaRPr lang="en-US" dirty="0" smtClean="0"/>
           </a:p>
@@ -2567,13 +2583,8 @@
             </a:pPr>
             <a:r>
               <a:rPr lang="en-US" baseline="0" dirty="0" smtClean="0"/>
-              <a:t>Turning inside out our world</a:t>
-            </a:r>
-            <a:r>
-              <a:rPr lang="en-US" baseline="0" dirty="0" smtClean="0"/>
-              <a:t>. Or better Turning outside in</a:t>
-            </a:r>
-            <a:endParaRPr lang="en-US" baseline="0" dirty="0" smtClean="0"/>
+              <a:t>Turning inside out our world. Or better Turning outside in</a:t>
+            </a:r>
           </a:p>
           <a:p>
             <a:pPr marL="0" marR="0" indent="0" algn="l" defTabSz="914400" rtl="0" eaLnBrk="1" fontAlgn="auto" latinLnBrk="0" hangingPunct="1">
@@ -2776,7 +2787,7 @@
           <p:cNvPr id="2" name="Title 1">
             <a:extLst>
               <a:ext uri="{FF2B5EF4-FFF2-40B4-BE49-F238E27FC236}">
-                <a16:creationId xmlns="" xmlns:a16="http://schemas.microsoft.com/office/drawing/2014/main" id="{C224CFBF-8D11-468E-BBC8-4C90355576F3}"/>
+                <a16:creationId xmlns:a16="http://schemas.microsoft.com/office/drawing/2014/main" xmlns="" id="{C224CFBF-8D11-468E-BBC8-4C90355576F3}"/>
               </a:ext>
             </a:extLst>
           </p:cNvPr>
@@ -2815,7 +2826,7 @@
           <p:cNvPr id="3" name="Subtitle 2">
             <a:extLst>
               <a:ext uri="{FF2B5EF4-FFF2-40B4-BE49-F238E27FC236}">
-                <a16:creationId xmlns="" xmlns:a16="http://schemas.microsoft.com/office/drawing/2014/main" id="{730B18E8-D1BB-4220-BD5E-A3355BF002A2}"/>
+                <a16:creationId xmlns:a16="http://schemas.microsoft.com/office/drawing/2014/main" xmlns="" id="{730B18E8-D1BB-4220-BD5E-A3355BF002A2}"/>
               </a:ext>
             </a:extLst>
           </p:cNvPr>
@@ -2857,7 +2868,7 @@
           <p:cNvPr id="4" name="Picture 4">
             <a:extLst>
               <a:ext uri="{FF2B5EF4-FFF2-40B4-BE49-F238E27FC236}">
-                <a16:creationId xmlns="" xmlns:a16="http://schemas.microsoft.com/office/drawing/2014/main" id="{1F38BF83-9CAE-4C45-9EFD-A6BA12B190C9}"/>
+                <a16:creationId xmlns:a16="http://schemas.microsoft.com/office/drawing/2014/main" xmlns="" id="{1F38BF83-9CAE-4C45-9EFD-A6BA12B190C9}"/>
               </a:ext>
             </a:extLst>
           </p:cNvPr>
@@ -2922,7 +2933,7 @@
           <p:cNvPr id="2" name="Picture 3">
             <a:extLst>
               <a:ext uri="{FF2B5EF4-FFF2-40B4-BE49-F238E27FC236}">
-                <a16:creationId xmlns="" xmlns:a16="http://schemas.microsoft.com/office/drawing/2014/main" id="{7CFB1FD7-D423-4AA6-BC9F-CEE35A35C7A9}"/>
+                <a16:creationId xmlns:a16="http://schemas.microsoft.com/office/drawing/2014/main" xmlns="" id="{7CFB1FD7-D423-4AA6-BC9F-CEE35A35C7A9}"/>
               </a:ext>
             </a:extLst>
           </p:cNvPr>
@@ -2956,7 +2967,7 @@
           <p:cNvPr id="3" name="TextBox 5">
             <a:extLst>
               <a:ext uri="{FF2B5EF4-FFF2-40B4-BE49-F238E27FC236}">
-                <a16:creationId xmlns="" xmlns:a16="http://schemas.microsoft.com/office/drawing/2014/main" id="{2B5BA3C6-F5B9-4BA3-9D83-0648A80C37D0}"/>
+                <a16:creationId xmlns:a16="http://schemas.microsoft.com/office/drawing/2014/main" xmlns="" id="{2B5BA3C6-F5B9-4BA3-9D83-0648A80C37D0}"/>
               </a:ext>
             </a:extLst>
           </p:cNvPr>
@@ -3020,7 +3031,7 @@
           <p:cNvPr id="4" name="Title 1">
             <a:extLst>
               <a:ext uri="{FF2B5EF4-FFF2-40B4-BE49-F238E27FC236}">
-                <a16:creationId xmlns="" xmlns:a16="http://schemas.microsoft.com/office/drawing/2014/main" id="{2388E442-17E8-4F61-9A6A-C188E334C77C}"/>
+                <a16:creationId xmlns:a16="http://schemas.microsoft.com/office/drawing/2014/main" xmlns="" id="{2388E442-17E8-4F61-9A6A-C188E334C77C}"/>
               </a:ext>
             </a:extLst>
           </p:cNvPr>
@@ -3059,7 +3070,7 @@
           <p:cNvPr id="5" name="Content Placeholder 2">
             <a:extLst>
               <a:ext uri="{FF2B5EF4-FFF2-40B4-BE49-F238E27FC236}">
-                <a16:creationId xmlns="" xmlns:a16="http://schemas.microsoft.com/office/drawing/2014/main" id="{CB968BC8-66AB-472B-8797-AB0AB0FBF575}"/>
+                <a16:creationId xmlns:a16="http://schemas.microsoft.com/office/drawing/2014/main" xmlns="" id="{CB968BC8-66AB-472B-8797-AB0AB0FBF575}"/>
               </a:ext>
             </a:extLst>
           </p:cNvPr>
@@ -3127,7 +3138,7 @@
           <p:cNvPr id="6" name="Text Placeholder 4">
             <a:extLst>
               <a:ext uri="{FF2B5EF4-FFF2-40B4-BE49-F238E27FC236}">
-                <a16:creationId xmlns="" xmlns:a16="http://schemas.microsoft.com/office/drawing/2014/main" id="{710437BF-7B3C-4944-9438-F0E72485DA57}"/>
+                <a16:creationId xmlns:a16="http://schemas.microsoft.com/office/drawing/2014/main" xmlns="" id="{710437BF-7B3C-4944-9438-F0E72485DA57}"/>
               </a:ext>
             </a:extLst>
           </p:cNvPr>
@@ -3201,7 +3212,7 @@
           <p:cNvPr id="2" name="Title 1">
             <a:extLst>
               <a:ext uri="{FF2B5EF4-FFF2-40B4-BE49-F238E27FC236}">
-                <a16:creationId xmlns="" xmlns:a16="http://schemas.microsoft.com/office/drawing/2014/main" id="{8DA21D0E-6F86-42A8-AD0F-EAD1F500A7BE}"/>
+                <a16:creationId xmlns:a16="http://schemas.microsoft.com/office/drawing/2014/main" xmlns="" id="{8DA21D0E-6F86-42A8-AD0F-EAD1F500A7BE}"/>
               </a:ext>
             </a:extLst>
           </p:cNvPr>
@@ -3240,7 +3251,7 @@
           <p:cNvPr id="3" name="Content Placeholder 2">
             <a:extLst>
               <a:ext uri="{FF2B5EF4-FFF2-40B4-BE49-F238E27FC236}">
-                <a16:creationId xmlns="" xmlns:a16="http://schemas.microsoft.com/office/drawing/2014/main" id="{A41E4711-D31B-427D-B501-9EF6C1BEE633}"/>
+                <a16:creationId xmlns:a16="http://schemas.microsoft.com/office/drawing/2014/main" xmlns="" id="{A41E4711-D31B-427D-B501-9EF6C1BEE633}"/>
               </a:ext>
             </a:extLst>
           </p:cNvPr>
@@ -3308,7 +3319,7 @@
           <p:cNvPr id="4" name="Content Placeholder 3">
             <a:extLst>
               <a:ext uri="{FF2B5EF4-FFF2-40B4-BE49-F238E27FC236}">
-                <a16:creationId xmlns="" xmlns:a16="http://schemas.microsoft.com/office/drawing/2014/main" id="{9935EB66-D1B6-426D-AB4C-AE5AD7BF3FBD}"/>
+                <a16:creationId xmlns:a16="http://schemas.microsoft.com/office/drawing/2014/main" xmlns="" id="{9935EB66-D1B6-426D-AB4C-AE5AD7BF3FBD}"/>
               </a:ext>
             </a:extLst>
           </p:cNvPr>
@@ -3376,7 +3387,7 @@
           <p:cNvPr id="5" name="TextBox 7">
             <a:extLst>
               <a:ext uri="{FF2B5EF4-FFF2-40B4-BE49-F238E27FC236}">
-                <a16:creationId xmlns="" xmlns:a16="http://schemas.microsoft.com/office/drawing/2014/main" id="{31379DFD-2E96-489A-AFFA-0FACA2B04512}"/>
+                <a16:creationId xmlns:a16="http://schemas.microsoft.com/office/drawing/2014/main" xmlns="" id="{31379DFD-2E96-489A-AFFA-0FACA2B04512}"/>
               </a:ext>
             </a:extLst>
           </p:cNvPr>
@@ -3440,7 +3451,7 @@
           <p:cNvPr id="6" name="Text Placeholder 4">
             <a:extLst>
               <a:ext uri="{FF2B5EF4-FFF2-40B4-BE49-F238E27FC236}">
-                <a16:creationId xmlns="" xmlns:a16="http://schemas.microsoft.com/office/drawing/2014/main" id="{ECF1529D-7B77-4B9A-8DBA-249C98CB5320}"/>
+                <a16:creationId xmlns:a16="http://schemas.microsoft.com/office/drawing/2014/main" xmlns="" id="{ECF1529D-7B77-4B9A-8DBA-249C98CB5320}"/>
               </a:ext>
             </a:extLst>
           </p:cNvPr>
@@ -3483,7 +3494,7 @@
           <p:cNvPr id="7" name="Picture 9">
             <a:extLst>
               <a:ext uri="{FF2B5EF4-FFF2-40B4-BE49-F238E27FC236}">
-                <a16:creationId xmlns="" xmlns:a16="http://schemas.microsoft.com/office/drawing/2014/main" id="{9247F1E8-A1CE-4134-8393-70EBEBD08233}"/>
+                <a16:creationId xmlns:a16="http://schemas.microsoft.com/office/drawing/2014/main" xmlns="" id="{9247F1E8-A1CE-4134-8393-70EBEBD08233}"/>
               </a:ext>
             </a:extLst>
           </p:cNvPr>
@@ -3527,7 +3538,7 @@
 </file>
 
 <file path=ppt/slideLayouts/slideLayout4.xml><?xml version="1.0" encoding="utf-8"?>
-<p:sldLayout xmlns:a="http://schemas.openxmlformats.org/drawingml/2006/main" xmlns:r="http://schemas.openxmlformats.org/officeDocument/2006/relationships" xmlns:p="http://schemas.openxmlformats.org/presentationml/2006/main" preserve="1">
+<p:sldLayout xmlns:a="http://schemas.openxmlformats.org/drawingml/2006/main" xmlns:r="http://schemas.openxmlformats.org/officeDocument/2006/relationships" xmlns:p="http://schemas.openxmlformats.org/presentationml/2006/main" preserve="1" userDrawn="1">
   <p:cSld name="Title Only">
     <p:spTree>
       <p:nvGrpSpPr>
@@ -3548,7 +3559,7 @@
           <p:cNvPr id="2" name="Title 1">
             <a:extLst>
               <a:ext uri="{FF2B5EF4-FFF2-40B4-BE49-F238E27FC236}">
-                <a16:creationId xmlns="" xmlns:a16="http://schemas.microsoft.com/office/drawing/2014/main" id="{5EDF7764-C8B7-4A0C-A362-F9A3AEAD5E62}"/>
+                <a16:creationId xmlns:a16="http://schemas.microsoft.com/office/drawing/2014/main" xmlns="" id="{5EDF7764-C8B7-4A0C-A362-F9A3AEAD5E62}"/>
               </a:ext>
             </a:extLst>
           </p:cNvPr>
@@ -3556,13 +3567,13 @@
             <a:spLocks noGrp="1"/>
           </p:cNvSpPr>
           <p:nvPr>
-            <p:ph type="title"/>
+            <p:ph type="title" hasCustomPrompt="1"/>
           </p:nvPr>
         </p:nvSpPr>
         <p:spPr>
           <a:xfrm>
-            <a:off x="596902" y="584201"/>
-            <a:ext cx="10510835" cy="1017590"/>
+            <a:off x="593728" y="612555"/>
+            <a:ext cx="10510835" cy="468100"/>
           </a:xfrm>
         </p:spPr>
         <p:txBody>
@@ -3575,10 +3586,14 @@
           <a:p>
             <a:pPr lvl="0"/>
             <a:r>
-              <a:rPr lang="en-US"/>
-              <a:t>Click to edit Master title style</a:t>
-            </a:r>
-            <a:endParaRPr lang="en-GB"/>
+              <a:rPr lang="en-US" dirty="0"/>
+              <a:t>Click to edit Master title </a:t>
+            </a:r>
+            <a:r>
+              <a:rPr lang="en-US" dirty="0" smtClean="0"/>
+              <a:t>style with code</a:t>
+            </a:r>
+            <a:endParaRPr lang="en-GB" dirty="0"/>
           </a:p>
         </p:txBody>
       </p:sp>
@@ -3587,7 +3602,7 @@
           <p:cNvPr id="3" name="TextBox 5">
             <a:extLst>
               <a:ext uri="{FF2B5EF4-FFF2-40B4-BE49-F238E27FC236}">
-                <a16:creationId xmlns="" xmlns:a16="http://schemas.microsoft.com/office/drawing/2014/main" id="{1054F63D-6497-4C73-8EDA-4BDCB9B86FED}"/>
+                <a16:creationId xmlns:a16="http://schemas.microsoft.com/office/drawing/2014/main" xmlns="" id="{1054F63D-6497-4C73-8EDA-4BDCB9B86FED}"/>
               </a:ext>
             </a:extLst>
           </p:cNvPr>
@@ -3646,12 +3661,239 @@
           </a:p>
         </p:txBody>
       </p:sp>
+      <p:pic>
+        <p:nvPicPr>
+          <p:cNvPr id="5" name="Picture 6">
+            <a:extLst>
+              <a:ext uri="{FF2B5EF4-FFF2-40B4-BE49-F238E27FC236}">
+                <a16:creationId xmlns:a16="http://schemas.microsoft.com/office/drawing/2014/main" xmlns="" id="{9B53228E-179F-4E23-9F82-58F06247C891}"/>
+              </a:ext>
+            </a:extLst>
+          </p:cNvPr>
+          <p:cNvPicPr>
+            <a:picLocks noChangeAspect="1"/>
+          </p:cNvPicPr>
+          <p:nvPr/>
+        </p:nvPicPr>
+        <p:blipFill>
+          <a:blip r:embed="rId2"/>
+          <a:stretch>
+            <a:fillRect/>
+          </a:stretch>
+        </p:blipFill>
+        <p:spPr>
+          <a:xfrm>
+            <a:off x="10058573" y="5502054"/>
+            <a:ext cx="1052337" cy="645365"/>
+          </a:xfrm>
+          <a:prstGeom prst="rect">
+            <a:avLst/>
+          </a:prstGeom>
+          <a:noFill/>
+          <a:ln cap="flat">
+            <a:noFill/>
+          </a:ln>
+        </p:spPr>
+      </p:pic>
+      <p:sp>
+        <p:nvSpPr>
+          <p:cNvPr id="6" name="TextBox 5"/>
+          <p:cNvSpPr txBox="1"/>
+          <p:nvPr userDrawn="1"/>
+        </p:nvSpPr>
+        <p:spPr>
+          <a:xfrm>
+            <a:off x="583047" y="1080656"/>
+            <a:ext cx="10510834" cy="4935602"/>
+          </a:xfrm>
+          <a:prstGeom prst="rect">
+            <a:avLst/>
+          </a:prstGeom>
+          <a:noFill/>
+        </p:spPr>
+        <p:txBody>
+          <a:bodyPr wrap="square" rtlCol="0">
+            <a:noAutofit/>
+          </a:bodyPr>
+          <a:lstStyle/>
+          <a:p>
+            <a:r>
+              <a:rPr lang="en-US" sz="2000" kern="0" baseline="0" dirty="0" err="1" smtClean="0">
+                <a:latin typeface="Currier" charset="0"/>
+              </a:rPr>
+              <a:t>val</a:t>
+            </a:r>
+            <a:r>
+              <a:rPr lang="en-US" sz="2000" kern="0" baseline="0" dirty="0" smtClean="0">
+                <a:latin typeface="Currier" charset="0"/>
+              </a:rPr>
+              <a:t> a = (x: </a:t>
+            </a:r>
+            <a:r>
+              <a:rPr lang="en-US" sz="2000" kern="0" baseline="0" dirty="0" err="1" smtClean="0">
+                <a:latin typeface="Currier" charset="0"/>
+              </a:rPr>
+              <a:t>Int</a:t>
+            </a:r>
+            <a:r>
+              <a:rPr lang="en-US" sz="2000" kern="0" baseline="0" dirty="0" smtClean="0">
+                <a:latin typeface="Currier" charset="0"/>
+              </a:rPr>
+              <a:t>) =&gt; x</a:t>
+            </a:r>
+          </a:p>
+          <a:p>
+            <a:endParaRPr lang="en-US" sz="2000" kern="0" baseline="0" dirty="0" smtClean="0">
+              <a:latin typeface="Currier" charset="0"/>
+            </a:endParaRPr>
+          </a:p>
+          <a:p>
+            <a:endParaRPr lang="en-US" sz="2000" kern="0" baseline="0" dirty="0">
+              <a:latin typeface="Currier" charset="0"/>
+            </a:endParaRPr>
+          </a:p>
+        </p:txBody>
+      </p:sp>
+    </p:spTree>
+    <p:extLst>
+      <p:ext uri="{BB962C8B-B14F-4D97-AF65-F5344CB8AC3E}">
+        <p14:creationId xmlns:p14="http://schemas.microsoft.com/office/powerpoint/2010/main" val="4186863719"/>
+      </p:ext>
+    </p:extLst>
+  </p:cSld>
+  <p:clrMapOvr>
+    <a:masterClrMapping/>
+  </p:clrMapOvr>
+  <p:hf sldNum="0" hdr="0" ftr="0" dt="0"/>
+</p:sldLayout>
+</file>
+
+<file path=ppt/slideLayouts/slideLayout5.xml><?xml version="1.0" encoding="utf-8"?>
+<p:sldLayout xmlns:a="http://schemas.openxmlformats.org/drawingml/2006/main" xmlns:r="http://schemas.openxmlformats.org/officeDocument/2006/relationships" xmlns:p="http://schemas.openxmlformats.org/presentationml/2006/main" preserve="1">
+  <p:cSld name="1_Title Only">
+    <p:spTree>
+      <p:nvGrpSpPr>
+        <p:cNvPr id="1" name=""/>
+        <p:cNvGrpSpPr/>
+        <p:nvPr/>
+      </p:nvGrpSpPr>
+      <p:grpSpPr>
+        <a:xfrm>
+          <a:off x="0" y="0"/>
+          <a:ext cx="0" cy="0"/>
+          <a:chOff x="0" y="0"/>
+          <a:chExt cx="0" cy="0"/>
+        </a:xfrm>
+      </p:grpSpPr>
+      <p:sp>
+        <p:nvSpPr>
+          <p:cNvPr id="2" name="Title 1">
+            <a:extLst>
+              <a:ext uri="{FF2B5EF4-FFF2-40B4-BE49-F238E27FC236}">
+                <a16:creationId xmlns:a16="http://schemas.microsoft.com/office/drawing/2014/main" xmlns="" id="{5EDF7764-C8B7-4A0C-A362-F9A3AEAD5E62}"/>
+              </a:ext>
+            </a:extLst>
+          </p:cNvPr>
+          <p:cNvSpPr txBox="1">
+            <a:spLocks noGrp="1"/>
+          </p:cNvSpPr>
+          <p:nvPr>
+            <p:ph type="title"/>
+          </p:nvPr>
+        </p:nvSpPr>
+        <p:spPr>
+          <a:xfrm>
+            <a:off x="596902" y="584201"/>
+            <a:ext cx="10510835" cy="1017590"/>
+          </a:xfrm>
+        </p:spPr>
+        <p:txBody>
+          <a:bodyPr/>
+          <a:lstStyle>
+            <a:lvl1pPr>
+              <a:defRPr/>
+            </a:lvl1pPr>
+          </a:lstStyle>
+          <a:p>
+            <a:pPr lvl="0"/>
+            <a:r>
+              <a:rPr lang="en-US" dirty="0"/>
+              <a:t>Click to edit Master title style</a:t>
+            </a:r>
+            <a:endParaRPr lang="en-GB" dirty="0"/>
+          </a:p>
+        </p:txBody>
+      </p:sp>
+      <p:sp>
+        <p:nvSpPr>
+          <p:cNvPr id="3" name="TextBox 5">
+            <a:extLst>
+              <a:ext uri="{FF2B5EF4-FFF2-40B4-BE49-F238E27FC236}">
+                <a16:creationId xmlns:a16="http://schemas.microsoft.com/office/drawing/2014/main" xmlns="" id="{1054F63D-6497-4C73-8EDA-4BDCB9B86FED}"/>
+              </a:ext>
+            </a:extLst>
+          </p:cNvPr>
+          <p:cNvSpPr txBox="1"/>
+          <p:nvPr/>
+        </p:nvSpPr>
+        <p:spPr>
+          <a:xfrm>
+            <a:off x="5542114" y="6016258"/>
+            <a:ext cx="620420" cy="256690"/>
+          </a:xfrm>
+          <a:prstGeom prst="rect">
+            <a:avLst/>
+          </a:prstGeom>
+          <a:noFill/>
+          <a:ln cap="flat">
+            <a:noFill/>
+          </a:ln>
+        </p:spPr>
+        <p:txBody>
+          <a:bodyPr vert="horz" wrap="square" lIns="117043" tIns="58521" rIns="117043" bIns="58521" anchor="b" anchorCtr="1" compatLnSpc="1">
+            <a:spAutoFit/>
+          </a:bodyPr>
+          <a:lstStyle/>
+          <a:p>
+            <a:pPr marL="0" marR="0" lvl="0" indent="0" algn="ctr" defTabSz="1170432" rtl="0" fontAlgn="auto" hangingPunct="1">
+              <a:lnSpc>
+                <a:spcPct val="100000"/>
+              </a:lnSpc>
+              <a:spcBef>
+                <a:spcPts val="0"/>
+              </a:spcBef>
+              <a:spcAft>
+                <a:spcPts val="0"/>
+              </a:spcAft>
+              <a:buNone/>
+              <a:tabLst/>
+              <a:defRPr sz="1800" b="0" i="0" u="none" strike="noStrike" kern="0" cap="none" spc="0" baseline="0">
+                <a:solidFill>
+                  <a:srgbClr val="000000"/>
+                </a:solidFill>
+                <a:uFillTx/>
+              </a:defRPr>
+            </a:pPr>
+            <a:fld id="{29F150FC-8660-449A-A71B-10D000A89E7F}" type="slidenum">
+              <a:t>‹#›</a:t>
+            </a:fld>
+            <a:endParaRPr lang="en-US" sz="900" b="0" i="0" u="none" strike="noStrike" kern="1200" cap="none" spc="0" baseline="0">
+              <a:solidFill>
+                <a:srgbClr val="323232"/>
+              </a:solidFill>
+              <a:uFillTx/>
+              <a:latin typeface="Sky Text Medium"/>
+              <a:ea typeface="Sky Text"/>
+            </a:endParaRPr>
+          </a:p>
+        </p:txBody>
+      </p:sp>
       <p:sp>
         <p:nvSpPr>
           <p:cNvPr id="4" name="Text Placeholder 4">
             <a:extLst>
               <a:ext uri="{FF2B5EF4-FFF2-40B4-BE49-F238E27FC236}">
-                <a16:creationId xmlns="" xmlns:a16="http://schemas.microsoft.com/office/drawing/2014/main" id="{A35768B9-0CFF-4DE1-8FC7-6C6460CDD2E3}"/>
+                <a16:creationId xmlns:a16="http://schemas.microsoft.com/office/drawing/2014/main" xmlns="" id="{A35768B9-0CFF-4DE1-8FC7-6C6460CDD2E3}"/>
               </a:ext>
             </a:extLst>
           </p:cNvPr>
@@ -3683,7 +3925,7 @@
           <a:p>
             <a:pPr lvl="0"/>
             <a:r>
-              <a:rPr lang="en-US"/>
+              <a:rPr lang="en-US" dirty="0"/>
               <a:t>Click to edit Master text styles</a:t>
             </a:r>
           </a:p>
@@ -3694,7 +3936,7 @@
           <p:cNvPr id="5" name="Picture 6">
             <a:extLst>
               <a:ext uri="{FF2B5EF4-FFF2-40B4-BE49-F238E27FC236}">
-                <a16:creationId xmlns="" xmlns:a16="http://schemas.microsoft.com/office/drawing/2014/main" id="{9B53228E-179F-4E23-9F82-58F06247C891}"/>
+                <a16:creationId xmlns:a16="http://schemas.microsoft.com/office/drawing/2014/main" xmlns="" id="{9B53228E-179F-4E23-9F82-58F06247C891}"/>
               </a:ext>
             </a:extLst>
           </p:cNvPr>
@@ -3724,11 +3966,7 @@
         </p:spPr>
       </p:pic>
     </p:spTree>
-    <p:extLst>
-      <p:ext uri="{BB962C8B-B14F-4D97-AF65-F5344CB8AC3E}">
-        <p14:creationId xmlns:p14="http://schemas.microsoft.com/office/powerpoint/2010/main" val="4186863719"/>
-      </p:ext>
-    </p:extLst>
+    <p:extLst/>
   </p:cSld>
   <p:clrMapOvr>
     <a:masterClrMapping/>
@@ -3737,7 +3975,7 @@
 </p:sldLayout>
 </file>
 
-<file path=ppt/slideLayouts/slideLayout5.xml><?xml version="1.0" encoding="utf-8"?>
+<file path=ppt/slideLayouts/slideLayout6.xml><?xml version="1.0" encoding="utf-8"?>
 <p:sldLayout xmlns:a="http://schemas.openxmlformats.org/drawingml/2006/main" xmlns:r="http://schemas.openxmlformats.org/officeDocument/2006/relationships" xmlns:p="http://schemas.openxmlformats.org/presentationml/2006/main" type="blank" preserve="1">
   <p:cSld name="Blank">
     <p:spTree>
@@ -3759,7 +3997,7 @@
           <p:cNvPr id="2" name="TextBox 3">
             <a:extLst>
               <a:ext uri="{FF2B5EF4-FFF2-40B4-BE49-F238E27FC236}">
-                <a16:creationId xmlns="" xmlns:a16="http://schemas.microsoft.com/office/drawing/2014/main" id="{B65F637C-89CC-408A-A6B7-5E62AC56BEBF}"/>
+                <a16:creationId xmlns:a16="http://schemas.microsoft.com/office/drawing/2014/main" xmlns="" id="{B65F637C-89CC-408A-A6B7-5E62AC56BEBF}"/>
               </a:ext>
             </a:extLst>
           </p:cNvPr>
@@ -3823,7 +4061,7 @@
           <p:cNvPr id="3" name="Picture 4">
             <a:extLst>
               <a:ext uri="{FF2B5EF4-FFF2-40B4-BE49-F238E27FC236}">
-                <a16:creationId xmlns="" xmlns:a16="http://schemas.microsoft.com/office/drawing/2014/main" id="{21196BCA-DFA4-465A-A2F2-ECBB1F3B1315}"/>
+                <a16:creationId xmlns:a16="http://schemas.microsoft.com/office/drawing/2014/main" xmlns="" id="{21196BCA-DFA4-465A-A2F2-ECBB1F3B1315}"/>
               </a:ext>
             </a:extLst>
           </p:cNvPr>
@@ -3866,7 +4104,7 @@
 </p:sldLayout>
 </file>
 
-<file path=ppt/slideLayouts/slideLayout6.xml><?xml version="1.0" encoding="utf-8"?>
+<file path=ppt/slideLayouts/slideLayout7.xml><?xml version="1.0" encoding="utf-8"?>
 <p:sldLayout xmlns:a="http://schemas.openxmlformats.org/drawingml/2006/main" xmlns:r="http://schemas.openxmlformats.org/officeDocument/2006/relationships" xmlns:p="http://schemas.openxmlformats.org/presentationml/2006/main" preserve="1">
   <p:cSld name="Section Break Colour">
     <p:bg>
@@ -3904,7 +4142,7 @@
           <p:cNvPr id="2" name="Title 1">
             <a:extLst>
               <a:ext uri="{FF2B5EF4-FFF2-40B4-BE49-F238E27FC236}">
-                <a16:creationId xmlns="" xmlns:a16="http://schemas.microsoft.com/office/drawing/2014/main" id="{6311E8A6-A582-4771-9A94-FCDA8648B504}"/>
+                <a16:creationId xmlns:a16="http://schemas.microsoft.com/office/drawing/2014/main" xmlns="" id="{6311E8A6-A582-4771-9A94-FCDA8648B504}"/>
               </a:ext>
             </a:extLst>
           </p:cNvPr>
@@ -3986,7 +4224,7 @@
           <p:cNvPr id="2" name="Title Placeholder 1">
             <a:extLst>
               <a:ext uri="{FF2B5EF4-FFF2-40B4-BE49-F238E27FC236}">
-                <a16:creationId xmlns="" xmlns:a16="http://schemas.microsoft.com/office/drawing/2014/main" id="{1EC8E5B4-7946-4318-A239-806DA6EEF846}"/>
+                <a16:creationId xmlns:a16="http://schemas.microsoft.com/office/drawing/2014/main" xmlns="" id="{1EC8E5B4-7946-4318-A239-806DA6EEF846}"/>
               </a:ext>
             </a:extLst>
           </p:cNvPr>
@@ -4030,7 +4268,7 @@
           <p:cNvPr id="3" name="Text Placeholder 2">
             <a:extLst>
               <a:ext uri="{FF2B5EF4-FFF2-40B4-BE49-F238E27FC236}">
-                <a16:creationId xmlns="" xmlns:a16="http://schemas.microsoft.com/office/drawing/2014/main" id="{6F332652-3AB5-4321-83D8-6D63FC3AEFDD}"/>
+                <a16:creationId xmlns:a16="http://schemas.microsoft.com/office/drawing/2014/main" xmlns="" id="{6F332652-3AB5-4321-83D8-6D63FC3AEFDD}"/>
               </a:ext>
             </a:extLst>
           </p:cNvPr>
@@ -4097,8 +4335,9 @@
     <p:sldLayoutId id="2147483650" r:id="rId2"/>
     <p:sldLayoutId id="2147483651" r:id="rId3"/>
     <p:sldLayoutId id="2147483652" r:id="rId4"/>
-    <p:sldLayoutId id="2147483653" r:id="rId5"/>
-    <p:sldLayoutId id="2147483654" r:id="rId6"/>
+    <p:sldLayoutId id="2147483655" r:id="rId5"/>
+    <p:sldLayoutId id="2147483653" r:id="rId6"/>
+    <p:sldLayoutId id="2147483654" r:id="rId7"/>
   </p:sldLayoutIdLst>
   <p:txStyles>
     <p:titleStyle>
@@ -4436,7 +4675,7 @@
           <p:cNvPr id="2" name="Title 1">
             <a:extLst>
               <a:ext uri="{FF2B5EF4-FFF2-40B4-BE49-F238E27FC236}">
-                <a16:creationId xmlns="" xmlns:a16="http://schemas.microsoft.com/office/drawing/2014/main" id="{DB10B8D4-3832-41C7-B84A-ABB5BD1158E3}"/>
+                <a16:creationId xmlns:a16="http://schemas.microsoft.com/office/drawing/2014/main" xmlns="" id="{DB10B8D4-3832-41C7-B84A-ABB5BD1158E3}"/>
               </a:ext>
             </a:extLst>
           </p:cNvPr>
@@ -4471,7 +4710,7 @@
           <p:cNvPr id="3" name="Subtitle 2">
             <a:extLst>
               <a:ext uri="{FF2B5EF4-FFF2-40B4-BE49-F238E27FC236}">
-                <a16:creationId xmlns="" xmlns:a16="http://schemas.microsoft.com/office/drawing/2014/main" id="{5C97C450-884A-416F-8121-97A271368A81}"/>
+                <a16:creationId xmlns:a16="http://schemas.microsoft.com/office/drawing/2014/main" xmlns="" id="{5C97C450-884A-416F-8121-97A271368A81}"/>
               </a:ext>
             </a:extLst>
           </p:cNvPr>
@@ -6769,7 +7008,7 @@
           <p:cNvPr id="2" name="Title 5">
             <a:extLst>
               <a:ext uri="{FF2B5EF4-FFF2-40B4-BE49-F238E27FC236}">
-                <a16:creationId xmlns="" xmlns:a16="http://schemas.microsoft.com/office/drawing/2014/main" id="{3BC9B16F-E2BE-48B8-9923-22A13B9A6782}"/>
+                <a16:creationId xmlns:a16="http://schemas.microsoft.com/office/drawing/2014/main" xmlns="" id="{3BC9B16F-E2BE-48B8-9923-22A13B9A6782}"/>
               </a:ext>
             </a:extLst>
           </p:cNvPr>
@@ -6819,7 +7058,7 @@
           <p:cNvPr id="3" name="Content Placeholder 6">
             <a:extLst>
               <a:ext uri="{FF2B5EF4-FFF2-40B4-BE49-F238E27FC236}">
-                <a16:creationId xmlns="" xmlns:a16="http://schemas.microsoft.com/office/drawing/2014/main" id="{356BB5C8-5364-4FB9-A0B5-3A6FAF1CC5D7}"/>
+                <a16:creationId xmlns:a16="http://schemas.microsoft.com/office/drawing/2014/main" xmlns="" id="{356BB5C8-5364-4FB9-A0B5-3A6FAF1CC5D7}"/>
               </a:ext>
             </a:extLst>
           </p:cNvPr>
@@ -6903,7 +7142,7 @@
           <p:cNvPr id="4" name="Text Placeholder 1">
             <a:extLst>
               <a:ext uri="{FF2B5EF4-FFF2-40B4-BE49-F238E27FC236}">
-                <a16:creationId xmlns="" xmlns:a16="http://schemas.microsoft.com/office/drawing/2014/main" id="{AD200C66-4FD0-40D9-978A-EC271B267A15}"/>
+                <a16:creationId xmlns:a16="http://schemas.microsoft.com/office/drawing/2014/main" xmlns="" id="{AD200C66-4FD0-40D9-978A-EC271B267A15}"/>
               </a:ext>
             </a:extLst>
           </p:cNvPr>
@@ -6975,7 +7214,7 @@
           <p:cNvPr id="2" name="Title 5">
             <a:extLst>
               <a:ext uri="{FF2B5EF4-FFF2-40B4-BE49-F238E27FC236}">
-                <a16:creationId xmlns="" xmlns:a16="http://schemas.microsoft.com/office/drawing/2014/main" id="{727F1B19-99A4-4BCA-A689-5D0744656C2E}"/>
+                <a16:creationId xmlns:a16="http://schemas.microsoft.com/office/drawing/2014/main" xmlns="" id="{727F1B19-99A4-4BCA-A689-5D0744656C2E}"/>
               </a:ext>
             </a:extLst>
           </p:cNvPr>
@@ -7025,7 +7264,7 @@
           <p:cNvPr id="3" name="Content Placeholder 6">
             <a:extLst>
               <a:ext uri="{FF2B5EF4-FFF2-40B4-BE49-F238E27FC236}">
-                <a16:creationId xmlns="" xmlns:a16="http://schemas.microsoft.com/office/drawing/2014/main" id="{F90994B4-8C03-4713-B379-AC294BDEC253}"/>
+                <a16:creationId xmlns:a16="http://schemas.microsoft.com/office/drawing/2014/main" xmlns="" id="{F90994B4-8C03-4713-B379-AC294BDEC253}"/>
               </a:ext>
             </a:extLst>
           </p:cNvPr>
@@ -7070,7 +7309,7 @@
           <p:cNvPr id="4" name="Content Placeholder 2">
             <a:extLst>
               <a:ext uri="{FF2B5EF4-FFF2-40B4-BE49-F238E27FC236}">
-                <a16:creationId xmlns="" xmlns:a16="http://schemas.microsoft.com/office/drawing/2014/main" id="{AA65BADF-8AA7-4853-9BDB-8596A08BA6FC}"/>
+                <a16:creationId xmlns:a16="http://schemas.microsoft.com/office/drawing/2014/main" xmlns="" id="{AA65BADF-8AA7-4853-9BDB-8596A08BA6FC}"/>
               </a:ext>
             </a:extLst>
           </p:cNvPr>
@@ -7121,7 +7360,7 @@
           <p:cNvPr id="5" name="Text Placeholder 1">
             <a:extLst>
               <a:ext uri="{FF2B5EF4-FFF2-40B4-BE49-F238E27FC236}">
-                <a16:creationId xmlns="" xmlns:a16="http://schemas.microsoft.com/office/drawing/2014/main" id="{2B5B7BA6-E957-4B32-B370-611541E9491B}"/>
+                <a16:creationId xmlns:a16="http://schemas.microsoft.com/office/drawing/2014/main" xmlns="" id="{2B5B7BA6-E957-4B32-B370-611541E9491B}"/>
               </a:ext>
             </a:extLst>
           </p:cNvPr>
@@ -7186,7 +7425,7 @@
           <p:cNvPr id="2" name="Title 5">
             <a:extLst>
               <a:ext uri="{FF2B5EF4-FFF2-40B4-BE49-F238E27FC236}">
-                <a16:creationId xmlns="" xmlns:a16="http://schemas.microsoft.com/office/drawing/2014/main" id="{7900ACDE-C559-44BB-A95E-7492D895082D}"/>
+                <a16:creationId xmlns:a16="http://schemas.microsoft.com/office/drawing/2014/main" xmlns="" id="{7900ACDE-C559-44BB-A95E-7492D895082D}"/>
               </a:ext>
             </a:extLst>
           </p:cNvPr>
@@ -7266,7 +7505,7 @@
           <p:cNvPr id="2" name="Title 1">
             <a:extLst>
               <a:ext uri="{FF2B5EF4-FFF2-40B4-BE49-F238E27FC236}">
-                <a16:creationId xmlns="" xmlns:a16="http://schemas.microsoft.com/office/drawing/2014/main" id="{76F90B01-370B-4350-9BFD-4E55240D90A6}"/>
+                <a16:creationId xmlns:a16="http://schemas.microsoft.com/office/drawing/2014/main" xmlns="" id="{76F90B01-370B-4350-9BFD-4E55240D90A6}"/>
               </a:ext>
             </a:extLst>
           </p:cNvPr>
@@ -7388,7 +7627,7 @@
           <p:cNvPr id="2" name="Title 1">
             <a:extLst>
               <a:ext uri="{FF2B5EF4-FFF2-40B4-BE49-F238E27FC236}">
-                <a16:creationId xmlns="" xmlns:a16="http://schemas.microsoft.com/office/drawing/2014/main" id="{2EE8C7BA-FED5-4928-BEC3-33D09F746945}"/>
+                <a16:creationId xmlns:a16="http://schemas.microsoft.com/office/drawing/2014/main" xmlns="" id="{2EE8C7BA-FED5-4928-BEC3-33D09F746945}"/>
               </a:ext>
             </a:extLst>
           </p:cNvPr>
@@ -11867,7 +12106,21 @@
       </a:bgFillStyleLst>
     </a:fmtScheme>
   </a:themeElements>
-  <a:objectDefaults/>
+  <a:objectDefaults>
+    <a:txDef>
+      <a:spPr>
+        <a:noFill/>
+      </a:spPr>
+      <a:bodyPr wrap="square" rtlCol="0">
+        <a:noAutofit/>
+      </a:bodyPr>
+      <a:lstStyle>
+        <a:defPPr>
+          <a:defRPr dirty="0" err="1" smtClean="0"/>
+        </a:defPPr>
+      </a:lstStyle>
+    </a:txDef>
+  </a:objectDefaults>
   <a:extraClrSchemeLst/>
   <a:extLst>
     <a:ext uri="{05A4C25C-085E-4340-85A3-A5531E510DB2}">

</xml_diff>